<commit_message>
[feat] - zastosowanie informatyki
</commit_message>
<xml_diff>
--- a/ZASTOSOWANIE_INFORMATYKI/1A-gr_2/Zastosowanie informatyki - 1A gr. 2-plik2.pptx
+++ b/ZASTOSOWANIE_INFORMATYKI/1A-gr_2/Zastosowanie informatyki - 1A gr. 2-plik2.pptx
@@ -2,61 +2,73 @@
 <file path=ppt/presentation.xml><?xml version="1.0" encoding="utf-8"?>
 <p:presentation xmlns:a="http://schemas.openxmlformats.org/drawingml/2006/main" xmlns:r="http://schemas.openxmlformats.org/officeDocument/2006/relationships" xmlns:mc="http://schemas.openxmlformats.org/markup-compatibility/2006" xmlns:mv="urn:schemas-microsoft-com:mac:vml" xmlns:p="http://schemas.openxmlformats.org/presentationml/2006/main" xmlns:c="http://schemas.openxmlformats.org/drawingml/2006/chart" xmlns:dgm="http://schemas.openxmlformats.org/drawingml/2006/diagram" xmlns:o="urn:schemas-microsoft-com:office:office" xmlns:v="urn:schemas-microsoft-com:vml" xmlns:pvml="urn:schemas-microsoft-com:office:powerpoint" xmlns:com="http://schemas.openxmlformats.org/drawingml/2006/compatibility" xmlns:p14="http://schemas.microsoft.com/office/powerpoint/2010/main" xmlns:p15="http://schemas.microsoft.com/office/powerpoint/2012/main" xmlns:ahyp="http://schemas.microsoft.com/office/drawing/2018/hyperlinkcolor" autoCompressPictures="0" embedTrueTypeFonts="1" strictFirstAndLastChars="0" saveSubsetFonts="1">
   <p:sldMasterIdLst>
-    <p:sldMasterId id="2147483659" r:id="rId4"/>
+    <p:sldMasterId id="2147483659" r:id="rId5"/>
   </p:sldMasterIdLst>
   <p:notesMasterIdLst>
-    <p:notesMasterId r:id="rId5"/>
+    <p:notesMasterId r:id="rId6"/>
   </p:notesMasterIdLst>
   <p:sldIdLst>
-    <p:sldId id="256" r:id="rId6"/>
-    <p:sldId id="257" r:id="rId7"/>
-    <p:sldId id="258" r:id="rId8"/>
-    <p:sldId id="259" r:id="rId9"/>
-    <p:sldId id="260" r:id="rId10"/>
-    <p:sldId id="261" r:id="rId11"/>
-    <p:sldId id="262" r:id="rId12"/>
-    <p:sldId id="263" r:id="rId13"/>
-    <p:sldId id="264" r:id="rId14"/>
-    <p:sldId id="265" r:id="rId15"/>
-    <p:sldId id="266" r:id="rId16"/>
-    <p:sldId id="267" r:id="rId17"/>
-    <p:sldId id="268" r:id="rId18"/>
-    <p:sldId id="269" r:id="rId19"/>
-    <p:sldId id="270" r:id="rId20"/>
-    <p:sldId id="271" r:id="rId21"/>
-    <p:sldId id="272" r:id="rId22"/>
-    <p:sldId id="273" r:id="rId23"/>
-    <p:sldId id="274" r:id="rId24"/>
-    <p:sldId id="275" r:id="rId25"/>
-    <p:sldId id="276" r:id="rId26"/>
-    <p:sldId id="277" r:id="rId27"/>
-    <p:sldId id="278" r:id="rId28"/>
-    <p:sldId id="279" r:id="rId29"/>
-    <p:sldId id="280" r:id="rId30"/>
-    <p:sldId id="281" r:id="rId31"/>
-    <p:sldId id="282" r:id="rId32"/>
+    <p:sldId id="256" r:id="rId7"/>
+    <p:sldId id="257" r:id="rId8"/>
+    <p:sldId id="258" r:id="rId9"/>
+    <p:sldId id="259" r:id="rId10"/>
+    <p:sldId id="260" r:id="rId11"/>
+    <p:sldId id="261" r:id="rId12"/>
+    <p:sldId id="262" r:id="rId13"/>
+    <p:sldId id="263" r:id="rId14"/>
+    <p:sldId id="264" r:id="rId15"/>
+    <p:sldId id="265" r:id="rId16"/>
+    <p:sldId id="266" r:id="rId17"/>
+    <p:sldId id="267" r:id="rId18"/>
+    <p:sldId id="268" r:id="rId19"/>
+    <p:sldId id="269" r:id="rId20"/>
+    <p:sldId id="270" r:id="rId21"/>
+    <p:sldId id="271" r:id="rId22"/>
+    <p:sldId id="272" r:id="rId23"/>
+    <p:sldId id="273" r:id="rId24"/>
+    <p:sldId id="274" r:id="rId25"/>
+    <p:sldId id="275" r:id="rId26"/>
+    <p:sldId id="276" r:id="rId27"/>
+    <p:sldId id="277" r:id="rId28"/>
+    <p:sldId id="278" r:id="rId29"/>
+    <p:sldId id="279" r:id="rId30"/>
+    <p:sldId id="280" r:id="rId31"/>
+    <p:sldId id="281" r:id="rId32"/>
+    <p:sldId id="282" r:id="rId33"/>
+    <p:sldId id="283" r:id="rId34"/>
+    <p:sldId id="284" r:id="rId35"/>
+    <p:sldId id="285" r:id="rId36"/>
+    <p:sldId id="286" r:id="rId37"/>
+    <p:sldId id="287" r:id="rId38"/>
   </p:sldIdLst>
   <p:sldSz cy="5143500" cx="9144000"/>
   <p:notesSz cx="6858000" cy="9144000"/>
   <p:embeddedFontLst>
     <p:embeddedFont>
       <p:font typeface="Raleway"/>
-      <p:regular r:id="rId33"/>
-      <p:bold r:id="rId34"/>
-      <p:italic r:id="rId35"/>
-      <p:boldItalic r:id="rId36"/>
+      <p:regular r:id="rId39"/>
+      <p:bold r:id="rId40"/>
+      <p:italic r:id="rId41"/>
+      <p:boldItalic r:id="rId42"/>
     </p:embeddedFont>
     <p:embeddedFont>
       <p:font typeface="Lato"/>
-      <p:regular r:id="rId37"/>
-      <p:bold r:id="rId38"/>
-      <p:italic r:id="rId39"/>
-      <p:boldItalic r:id="rId40"/>
+      <p:regular r:id="rId43"/>
+      <p:bold r:id="rId44"/>
+      <p:italic r:id="rId45"/>
+      <p:boldItalic r:id="rId46"/>
     </p:embeddedFont>
     <p:embeddedFont>
       <p:font typeface="Tahoma"/>
-      <p:regular r:id="rId41"/>
-      <p:bold r:id="rId42"/>
+      <p:regular r:id="rId47"/>
+      <p:bold r:id="rId48"/>
+    </p:embeddedFont>
+    <p:embeddedFont>
+      <p:font typeface="Roboto Mono"/>
+      <p:regular r:id="rId49"/>
+      <p:bold r:id="rId50"/>
+      <p:italic r:id="rId51"/>
+      <p:boldItalic r:id="rId52"/>
     </p:embeddedFont>
   </p:embeddedFontLst>
   <p:defaultTextStyle>
@@ -2713,6 +2725,204 @@
 </p:notes>
 </file>
 
+<file path=ppt/notesSlides/notesSlide28.xml><?xml version="1.0" encoding="utf-8"?>
+<p:notes xmlns:a="http://schemas.openxmlformats.org/drawingml/2006/main" xmlns:r="http://schemas.openxmlformats.org/officeDocument/2006/relationships" xmlns:mc="http://schemas.openxmlformats.org/markup-compatibility/2006" xmlns:mv="urn:schemas-microsoft-com:mac:vml" xmlns:p="http://schemas.openxmlformats.org/presentationml/2006/main" xmlns:c="http://schemas.openxmlformats.org/drawingml/2006/chart" xmlns:dgm="http://schemas.openxmlformats.org/drawingml/2006/diagram" xmlns:o="urn:schemas-microsoft-com:office:office" xmlns:v="urn:schemas-microsoft-com:vml" xmlns:pvml="urn:schemas-microsoft-com:office:powerpoint" xmlns:com="http://schemas.openxmlformats.org/drawingml/2006/compatibility" xmlns:p14="http://schemas.microsoft.com/office/powerpoint/2010/main" xmlns:p15="http://schemas.microsoft.com/office/powerpoint/2012/main" xmlns:ahyp="http://schemas.microsoft.com/office/drawing/2018/hyperlinkcolor" showMasterPhAnim="0" showMasterSp="0">
+  <p:cSld>
+    <p:spTree>
+      <p:nvGrpSpPr>
+        <p:cNvPr id="244" name="Shape 244"/>
+        <p:cNvGrpSpPr/>
+        <p:nvPr/>
+      </p:nvGrpSpPr>
+      <p:grpSpPr>
+        <a:xfrm>
+          <a:off x="0" y="0"/>
+          <a:ext cx="0" cy="0"/>
+          <a:chOff x="0" y="0"/>
+          <a:chExt cx="0" cy="0"/>
+        </a:xfrm>
+      </p:grpSpPr>
+      <p:sp>
+        <p:nvSpPr>
+          <p:cNvPr id="245" name="Google Shape;245;g3a13cfc4c8f_0_5:notes"/>
+          <p:cNvSpPr/>
+          <p:nvPr>
+            <p:ph idx="2" type="sldImg"/>
+          </p:nvPr>
+        </p:nvSpPr>
+        <p:spPr>
+          <a:xfrm>
+            <a:off x="381300" y="685800"/>
+            <a:ext cx="6096000" cy="3429000"/>
+          </a:xfrm>
+          <a:custGeom>
+            <a:rect b="b" l="l" r="r" t="t"/>
+            <a:pathLst>
+              <a:path extrusionOk="0" h="120000" w="120000">
+                <a:moveTo>
+                  <a:pt x="0" y="0"/>
+                </a:moveTo>
+                <a:lnTo>
+                  <a:pt x="120000" y="0"/>
+                </a:lnTo>
+                <a:lnTo>
+                  <a:pt x="120000" y="120000"/>
+                </a:lnTo>
+                <a:lnTo>
+                  <a:pt x="0" y="120000"/>
+                </a:lnTo>
+                <a:close/>
+              </a:path>
+            </a:pathLst>
+          </a:custGeom>
+        </p:spPr>
+      </p:sp>
+      <p:sp>
+        <p:nvSpPr>
+          <p:cNvPr id="246" name="Google Shape;246;g3a13cfc4c8f_0_5:notes"/>
+          <p:cNvSpPr txBox="1"/>
+          <p:nvPr>
+            <p:ph idx="1" type="body"/>
+          </p:nvPr>
+        </p:nvSpPr>
+        <p:spPr>
+          <a:xfrm>
+            <a:off x="685800" y="4343400"/>
+            <a:ext cx="5486400" cy="4114800"/>
+          </a:xfrm>
+          <a:prstGeom prst="rect">
+            <a:avLst/>
+          </a:prstGeom>
+        </p:spPr>
+        <p:txBody>
+          <a:bodyPr anchorCtr="0" anchor="t" bIns="91425" lIns="91425" spcFirstLastPara="1" rIns="91425" wrap="square" tIns="91425">
+            <a:noAutofit/>
+          </a:bodyPr>
+          <a:lstStyle/>
+          <a:p>
+            <a:pPr indent="0" lvl="0" marL="0" rtl="0" algn="l">
+              <a:spcBef>
+                <a:spcPts val="0"/>
+              </a:spcBef>
+              <a:spcAft>
+                <a:spcPts val="0"/>
+              </a:spcAft>
+              <a:buNone/>
+            </a:pPr>
+            <a:r>
+              <a:t/>
+            </a:r>
+            <a:endParaRPr/>
+          </a:p>
+        </p:txBody>
+      </p:sp>
+    </p:spTree>
+  </p:cSld>
+  <p:clrMapOvr>
+    <a:masterClrMapping/>
+  </p:clrMapOvr>
+</p:notes>
+</file>
+
+<file path=ppt/notesSlides/notesSlide29.xml><?xml version="1.0" encoding="utf-8"?>
+<p:notes xmlns:a="http://schemas.openxmlformats.org/drawingml/2006/main" xmlns:r="http://schemas.openxmlformats.org/officeDocument/2006/relationships" xmlns:mc="http://schemas.openxmlformats.org/markup-compatibility/2006" xmlns:mv="urn:schemas-microsoft-com:mac:vml" xmlns:p="http://schemas.openxmlformats.org/presentationml/2006/main" xmlns:c="http://schemas.openxmlformats.org/drawingml/2006/chart" xmlns:dgm="http://schemas.openxmlformats.org/drawingml/2006/diagram" xmlns:o="urn:schemas-microsoft-com:office:office" xmlns:v="urn:schemas-microsoft-com:vml" xmlns:pvml="urn:schemas-microsoft-com:office:powerpoint" xmlns:com="http://schemas.openxmlformats.org/drawingml/2006/compatibility" xmlns:p14="http://schemas.microsoft.com/office/powerpoint/2010/main" xmlns:p15="http://schemas.microsoft.com/office/powerpoint/2012/main" xmlns:ahyp="http://schemas.microsoft.com/office/drawing/2018/hyperlinkcolor" showMasterPhAnim="0" showMasterSp="0">
+  <p:cSld>
+    <p:spTree>
+      <p:nvGrpSpPr>
+        <p:cNvPr id="250" name="Shape 250"/>
+        <p:cNvGrpSpPr/>
+        <p:nvPr/>
+      </p:nvGrpSpPr>
+      <p:grpSpPr>
+        <a:xfrm>
+          <a:off x="0" y="0"/>
+          <a:ext cx="0" cy="0"/>
+          <a:chOff x="0" y="0"/>
+          <a:chExt cx="0" cy="0"/>
+        </a:xfrm>
+      </p:grpSpPr>
+      <p:sp>
+        <p:nvSpPr>
+          <p:cNvPr id="251" name="Google Shape;251;g3a35a0ca6c5_0_1:notes"/>
+          <p:cNvSpPr/>
+          <p:nvPr>
+            <p:ph idx="2" type="sldImg"/>
+          </p:nvPr>
+        </p:nvSpPr>
+        <p:spPr>
+          <a:xfrm>
+            <a:off x="381300" y="685800"/>
+            <a:ext cx="6096000" cy="3429000"/>
+          </a:xfrm>
+          <a:custGeom>
+            <a:rect b="b" l="l" r="r" t="t"/>
+            <a:pathLst>
+              <a:path extrusionOk="0" h="120000" w="120000">
+                <a:moveTo>
+                  <a:pt x="0" y="0"/>
+                </a:moveTo>
+                <a:lnTo>
+                  <a:pt x="120000" y="0"/>
+                </a:lnTo>
+                <a:lnTo>
+                  <a:pt x="120000" y="120000"/>
+                </a:lnTo>
+                <a:lnTo>
+                  <a:pt x="0" y="120000"/>
+                </a:lnTo>
+                <a:close/>
+              </a:path>
+            </a:pathLst>
+          </a:custGeom>
+        </p:spPr>
+      </p:sp>
+      <p:sp>
+        <p:nvSpPr>
+          <p:cNvPr id="252" name="Google Shape;252;g3a35a0ca6c5_0_1:notes"/>
+          <p:cNvSpPr txBox="1"/>
+          <p:nvPr>
+            <p:ph idx="1" type="body"/>
+          </p:nvPr>
+        </p:nvSpPr>
+        <p:spPr>
+          <a:xfrm>
+            <a:off x="685800" y="4343400"/>
+            <a:ext cx="5486400" cy="4114800"/>
+          </a:xfrm>
+          <a:prstGeom prst="rect">
+            <a:avLst/>
+          </a:prstGeom>
+        </p:spPr>
+        <p:txBody>
+          <a:bodyPr anchorCtr="0" anchor="t" bIns="91425" lIns="91425" spcFirstLastPara="1" rIns="91425" wrap="square" tIns="91425">
+            <a:noAutofit/>
+          </a:bodyPr>
+          <a:lstStyle/>
+          <a:p>
+            <a:pPr indent="0" lvl="0" marL="0" rtl="0" algn="l">
+              <a:spcBef>
+                <a:spcPts val="0"/>
+              </a:spcBef>
+              <a:spcAft>
+                <a:spcPts val="0"/>
+              </a:spcAft>
+              <a:buNone/>
+            </a:pPr>
+            <a:r>
+              <a:t/>
+            </a:r>
+            <a:endParaRPr/>
+          </a:p>
+        </p:txBody>
+      </p:sp>
+    </p:spTree>
+  </p:cSld>
+  <p:clrMapOvr>
+    <a:masterClrMapping/>
+  </p:clrMapOvr>
+</p:notes>
+</file>
+
 <file path=ppt/notesSlides/notesSlide3.xml><?xml version="1.0" encoding="utf-8"?>
 <p:notes xmlns:a="http://schemas.openxmlformats.org/drawingml/2006/main" xmlns:r="http://schemas.openxmlformats.org/officeDocument/2006/relationships" xmlns:mc="http://schemas.openxmlformats.org/markup-compatibility/2006" xmlns:mv="urn:schemas-microsoft-com:mac:vml" xmlns:p="http://schemas.openxmlformats.org/presentationml/2006/main" xmlns:c="http://schemas.openxmlformats.org/drawingml/2006/chart" xmlns:dgm="http://schemas.openxmlformats.org/drawingml/2006/diagram" xmlns:o="urn:schemas-microsoft-com:office:office" xmlns:v="urn:schemas-microsoft-com:vml" xmlns:pvml="urn:schemas-microsoft-com:office:powerpoint" xmlns:com="http://schemas.openxmlformats.org/drawingml/2006/compatibility" xmlns:p14="http://schemas.microsoft.com/office/powerpoint/2010/main" xmlns:p15="http://schemas.microsoft.com/office/powerpoint/2012/main" xmlns:ahyp="http://schemas.microsoft.com/office/drawing/2018/hyperlinkcolor" showMasterPhAnim="0" showMasterSp="0">
   <p:cSld>
@@ -2768,6 +2978,303 @@
       <p:sp>
         <p:nvSpPr>
           <p:cNvPr id="96" name="Google Shape;96;g39edc685857_0_85:notes"/>
+          <p:cNvSpPr txBox="1"/>
+          <p:nvPr>
+            <p:ph idx="1" type="body"/>
+          </p:nvPr>
+        </p:nvSpPr>
+        <p:spPr>
+          <a:xfrm>
+            <a:off x="685800" y="4343400"/>
+            <a:ext cx="5486400" cy="4114800"/>
+          </a:xfrm>
+          <a:prstGeom prst="rect">
+            <a:avLst/>
+          </a:prstGeom>
+        </p:spPr>
+        <p:txBody>
+          <a:bodyPr anchorCtr="0" anchor="t" bIns="91425" lIns="91425" spcFirstLastPara="1" rIns="91425" wrap="square" tIns="91425">
+            <a:noAutofit/>
+          </a:bodyPr>
+          <a:lstStyle/>
+          <a:p>
+            <a:pPr indent="0" lvl="0" marL="0" rtl="0" algn="l">
+              <a:spcBef>
+                <a:spcPts val="0"/>
+              </a:spcBef>
+              <a:spcAft>
+                <a:spcPts val="0"/>
+              </a:spcAft>
+              <a:buNone/>
+            </a:pPr>
+            <a:r>
+              <a:t/>
+            </a:r>
+            <a:endParaRPr/>
+          </a:p>
+        </p:txBody>
+      </p:sp>
+    </p:spTree>
+  </p:cSld>
+  <p:clrMapOvr>
+    <a:masterClrMapping/>
+  </p:clrMapOvr>
+</p:notes>
+</file>
+
+<file path=ppt/notesSlides/notesSlide30.xml><?xml version="1.0" encoding="utf-8"?>
+<p:notes xmlns:a="http://schemas.openxmlformats.org/drawingml/2006/main" xmlns:r="http://schemas.openxmlformats.org/officeDocument/2006/relationships" xmlns:mc="http://schemas.openxmlformats.org/markup-compatibility/2006" xmlns:mv="urn:schemas-microsoft-com:mac:vml" xmlns:p="http://schemas.openxmlformats.org/presentationml/2006/main" xmlns:c="http://schemas.openxmlformats.org/drawingml/2006/chart" xmlns:dgm="http://schemas.openxmlformats.org/drawingml/2006/diagram" xmlns:o="urn:schemas-microsoft-com:office:office" xmlns:v="urn:schemas-microsoft-com:vml" xmlns:pvml="urn:schemas-microsoft-com:office:powerpoint" xmlns:com="http://schemas.openxmlformats.org/drawingml/2006/compatibility" xmlns:p14="http://schemas.microsoft.com/office/powerpoint/2010/main" xmlns:p15="http://schemas.microsoft.com/office/powerpoint/2012/main" xmlns:ahyp="http://schemas.microsoft.com/office/drawing/2018/hyperlinkcolor" showMasterPhAnim="0" showMasterSp="0">
+  <p:cSld>
+    <p:spTree>
+      <p:nvGrpSpPr>
+        <p:cNvPr id="256" name="Shape 256"/>
+        <p:cNvGrpSpPr/>
+        <p:nvPr/>
+      </p:nvGrpSpPr>
+      <p:grpSpPr>
+        <a:xfrm>
+          <a:off x="0" y="0"/>
+          <a:ext cx="0" cy="0"/>
+          <a:chOff x="0" y="0"/>
+          <a:chExt cx="0" cy="0"/>
+        </a:xfrm>
+      </p:grpSpPr>
+      <p:sp>
+        <p:nvSpPr>
+          <p:cNvPr id="257" name="Google Shape;257;g3a35a0ca6c5_0_7:notes"/>
+          <p:cNvSpPr/>
+          <p:nvPr>
+            <p:ph idx="2" type="sldImg"/>
+          </p:nvPr>
+        </p:nvSpPr>
+        <p:spPr>
+          <a:xfrm>
+            <a:off x="381300" y="685800"/>
+            <a:ext cx="6096000" cy="3429000"/>
+          </a:xfrm>
+          <a:custGeom>
+            <a:rect b="b" l="l" r="r" t="t"/>
+            <a:pathLst>
+              <a:path extrusionOk="0" h="120000" w="120000">
+                <a:moveTo>
+                  <a:pt x="0" y="0"/>
+                </a:moveTo>
+                <a:lnTo>
+                  <a:pt x="120000" y="0"/>
+                </a:lnTo>
+                <a:lnTo>
+                  <a:pt x="120000" y="120000"/>
+                </a:lnTo>
+                <a:lnTo>
+                  <a:pt x="0" y="120000"/>
+                </a:lnTo>
+                <a:close/>
+              </a:path>
+            </a:pathLst>
+          </a:custGeom>
+        </p:spPr>
+      </p:sp>
+      <p:sp>
+        <p:nvSpPr>
+          <p:cNvPr id="258" name="Google Shape;258;g3a35a0ca6c5_0_7:notes"/>
+          <p:cNvSpPr txBox="1"/>
+          <p:nvPr>
+            <p:ph idx="1" type="body"/>
+          </p:nvPr>
+        </p:nvSpPr>
+        <p:spPr>
+          <a:xfrm>
+            <a:off x="685800" y="4343400"/>
+            <a:ext cx="5486400" cy="4114800"/>
+          </a:xfrm>
+          <a:prstGeom prst="rect">
+            <a:avLst/>
+          </a:prstGeom>
+        </p:spPr>
+        <p:txBody>
+          <a:bodyPr anchorCtr="0" anchor="t" bIns="91425" lIns="91425" spcFirstLastPara="1" rIns="91425" wrap="square" tIns="91425">
+            <a:noAutofit/>
+          </a:bodyPr>
+          <a:lstStyle/>
+          <a:p>
+            <a:pPr indent="0" lvl="0" marL="0" rtl="0" algn="l">
+              <a:spcBef>
+                <a:spcPts val="0"/>
+              </a:spcBef>
+              <a:spcAft>
+                <a:spcPts val="0"/>
+              </a:spcAft>
+              <a:buNone/>
+            </a:pPr>
+            <a:r>
+              <a:t/>
+            </a:r>
+            <a:endParaRPr/>
+          </a:p>
+        </p:txBody>
+      </p:sp>
+    </p:spTree>
+  </p:cSld>
+  <p:clrMapOvr>
+    <a:masterClrMapping/>
+  </p:clrMapOvr>
+</p:notes>
+</file>
+
+<file path=ppt/notesSlides/notesSlide31.xml><?xml version="1.0" encoding="utf-8"?>
+<p:notes xmlns:a="http://schemas.openxmlformats.org/drawingml/2006/main" xmlns:r="http://schemas.openxmlformats.org/officeDocument/2006/relationships" xmlns:mc="http://schemas.openxmlformats.org/markup-compatibility/2006" xmlns:mv="urn:schemas-microsoft-com:mac:vml" xmlns:p="http://schemas.openxmlformats.org/presentationml/2006/main" xmlns:c="http://schemas.openxmlformats.org/drawingml/2006/chart" xmlns:dgm="http://schemas.openxmlformats.org/drawingml/2006/diagram" xmlns:o="urn:schemas-microsoft-com:office:office" xmlns:v="urn:schemas-microsoft-com:vml" xmlns:pvml="urn:schemas-microsoft-com:office:powerpoint" xmlns:com="http://schemas.openxmlformats.org/drawingml/2006/compatibility" xmlns:p14="http://schemas.microsoft.com/office/powerpoint/2010/main" xmlns:p15="http://schemas.microsoft.com/office/powerpoint/2012/main" xmlns:ahyp="http://schemas.microsoft.com/office/drawing/2018/hyperlinkcolor" showMasterPhAnim="0" showMasterSp="0">
+  <p:cSld>
+    <p:spTree>
+      <p:nvGrpSpPr>
+        <p:cNvPr id="262" name="Shape 262"/>
+        <p:cNvGrpSpPr/>
+        <p:nvPr/>
+      </p:nvGrpSpPr>
+      <p:grpSpPr>
+        <a:xfrm>
+          <a:off x="0" y="0"/>
+          <a:ext cx="0" cy="0"/>
+          <a:chOff x="0" y="0"/>
+          <a:chExt cx="0" cy="0"/>
+        </a:xfrm>
+      </p:grpSpPr>
+      <p:sp>
+        <p:nvSpPr>
+          <p:cNvPr id="263" name="Google Shape;263;g3a35a0ca6c5_0_15:notes"/>
+          <p:cNvSpPr/>
+          <p:nvPr>
+            <p:ph idx="2" type="sldImg"/>
+          </p:nvPr>
+        </p:nvSpPr>
+        <p:spPr>
+          <a:xfrm>
+            <a:off x="381300" y="685800"/>
+            <a:ext cx="6096000" cy="3429000"/>
+          </a:xfrm>
+          <a:custGeom>
+            <a:rect b="b" l="l" r="r" t="t"/>
+            <a:pathLst>
+              <a:path extrusionOk="0" h="120000" w="120000">
+                <a:moveTo>
+                  <a:pt x="0" y="0"/>
+                </a:moveTo>
+                <a:lnTo>
+                  <a:pt x="120000" y="0"/>
+                </a:lnTo>
+                <a:lnTo>
+                  <a:pt x="120000" y="120000"/>
+                </a:lnTo>
+                <a:lnTo>
+                  <a:pt x="0" y="120000"/>
+                </a:lnTo>
+                <a:close/>
+              </a:path>
+            </a:pathLst>
+          </a:custGeom>
+        </p:spPr>
+      </p:sp>
+      <p:sp>
+        <p:nvSpPr>
+          <p:cNvPr id="264" name="Google Shape;264;g3a35a0ca6c5_0_15:notes"/>
+          <p:cNvSpPr txBox="1"/>
+          <p:nvPr>
+            <p:ph idx="1" type="body"/>
+          </p:nvPr>
+        </p:nvSpPr>
+        <p:spPr>
+          <a:xfrm>
+            <a:off x="685800" y="4343400"/>
+            <a:ext cx="5486400" cy="4114800"/>
+          </a:xfrm>
+          <a:prstGeom prst="rect">
+            <a:avLst/>
+          </a:prstGeom>
+        </p:spPr>
+        <p:txBody>
+          <a:bodyPr anchorCtr="0" anchor="t" bIns="91425" lIns="91425" spcFirstLastPara="1" rIns="91425" wrap="square" tIns="91425">
+            <a:noAutofit/>
+          </a:bodyPr>
+          <a:lstStyle/>
+          <a:p>
+            <a:pPr indent="0" lvl="0" marL="0" rtl="0" algn="l">
+              <a:spcBef>
+                <a:spcPts val="0"/>
+              </a:spcBef>
+              <a:spcAft>
+                <a:spcPts val="0"/>
+              </a:spcAft>
+              <a:buNone/>
+            </a:pPr>
+            <a:r>
+              <a:t/>
+            </a:r>
+            <a:endParaRPr/>
+          </a:p>
+        </p:txBody>
+      </p:sp>
+    </p:spTree>
+  </p:cSld>
+  <p:clrMapOvr>
+    <a:masterClrMapping/>
+  </p:clrMapOvr>
+</p:notes>
+</file>
+
+<file path=ppt/notesSlides/notesSlide32.xml><?xml version="1.0" encoding="utf-8"?>
+<p:notes xmlns:a="http://schemas.openxmlformats.org/drawingml/2006/main" xmlns:r="http://schemas.openxmlformats.org/officeDocument/2006/relationships" xmlns:mc="http://schemas.openxmlformats.org/markup-compatibility/2006" xmlns:mv="urn:schemas-microsoft-com:mac:vml" xmlns:p="http://schemas.openxmlformats.org/presentationml/2006/main" xmlns:c="http://schemas.openxmlformats.org/drawingml/2006/chart" xmlns:dgm="http://schemas.openxmlformats.org/drawingml/2006/diagram" xmlns:o="urn:schemas-microsoft-com:office:office" xmlns:v="urn:schemas-microsoft-com:vml" xmlns:pvml="urn:schemas-microsoft-com:office:powerpoint" xmlns:com="http://schemas.openxmlformats.org/drawingml/2006/compatibility" xmlns:p14="http://schemas.microsoft.com/office/powerpoint/2010/main" xmlns:p15="http://schemas.microsoft.com/office/powerpoint/2012/main" xmlns:ahyp="http://schemas.microsoft.com/office/drawing/2018/hyperlinkcolor" showMasterPhAnim="0" showMasterSp="0">
+  <p:cSld>
+    <p:spTree>
+      <p:nvGrpSpPr>
+        <p:cNvPr id="268" name="Shape 268"/>
+        <p:cNvGrpSpPr/>
+        <p:nvPr/>
+      </p:nvGrpSpPr>
+      <p:grpSpPr>
+        <a:xfrm>
+          <a:off x="0" y="0"/>
+          <a:ext cx="0" cy="0"/>
+          <a:chOff x="0" y="0"/>
+          <a:chExt cx="0" cy="0"/>
+        </a:xfrm>
+      </p:grpSpPr>
+      <p:sp>
+        <p:nvSpPr>
+          <p:cNvPr id="269" name="Google Shape;269;g3a35a0ca6c5_0_31:notes"/>
+          <p:cNvSpPr/>
+          <p:nvPr>
+            <p:ph idx="2" type="sldImg"/>
+          </p:nvPr>
+        </p:nvSpPr>
+        <p:spPr>
+          <a:xfrm>
+            <a:off x="381300" y="685800"/>
+            <a:ext cx="6096000" cy="3429000"/>
+          </a:xfrm>
+          <a:custGeom>
+            <a:rect b="b" l="l" r="r" t="t"/>
+            <a:pathLst>
+              <a:path extrusionOk="0" h="120000" w="120000">
+                <a:moveTo>
+                  <a:pt x="0" y="0"/>
+                </a:moveTo>
+                <a:lnTo>
+                  <a:pt x="120000" y="0"/>
+                </a:lnTo>
+                <a:lnTo>
+                  <a:pt x="120000" y="120000"/>
+                </a:lnTo>
+                <a:lnTo>
+                  <a:pt x="0" y="120000"/>
+                </a:lnTo>
+                <a:close/>
+              </a:path>
+            </a:pathLst>
+          </a:custGeom>
+        </p:spPr>
+      </p:sp>
+      <p:sp>
+        <p:nvSpPr>
+          <p:cNvPr id="270" name="Google Shape;270;g3a35a0ca6c5_0_31:notes"/>
           <p:cNvSpPr txBox="1"/>
           <p:nvPr>
             <p:ph idx="1" type="body"/>
@@ -18045,6 +18552,814 @@
 </p:sld>
 </file>
 
+<file path=ppt/slides/slide28.xml><?xml version="1.0" encoding="utf-8"?>
+<p:sld xmlns:a="http://schemas.openxmlformats.org/drawingml/2006/main" xmlns:r="http://schemas.openxmlformats.org/officeDocument/2006/relationships" xmlns:mc="http://schemas.openxmlformats.org/markup-compatibility/2006" xmlns:mv="urn:schemas-microsoft-com:mac:vml" xmlns:p="http://schemas.openxmlformats.org/presentationml/2006/main" xmlns:c="http://schemas.openxmlformats.org/drawingml/2006/chart" xmlns:dgm="http://schemas.openxmlformats.org/drawingml/2006/diagram" xmlns:o="urn:schemas-microsoft-com:office:office" xmlns:v="urn:schemas-microsoft-com:vml" xmlns:pvml="urn:schemas-microsoft-com:office:powerpoint" xmlns:com="http://schemas.openxmlformats.org/drawingml/2006/compatibility" xmlns:p14="http://schemas.microsoft.com/office/powerpoint/2010/main" xmlns:p15="http://schemas.microsoft.com/office/powerpoint/2012/main" xmlns:ahyp="http://schemas.microsoft.com/office/drawing/2018/hyperlinkcolor">
+  <p:cSld>
+    <p:spTree>
+      <p:nvGrpSpPr>
+        <p:cNvPr id="247" name="Shape 247"/>
+        <p:cNvGrpSpPr/>
+        <p:nvPr/>
+      </p:nvGrpSpPr>
+      <p:grpSpPr>
+        <a:xfrm>
+          <a:off x="0" y="0"/>
+          <a:ext cx="0" cy="0"/>
+          <a:chOff x="0" y="0"/>
+          <a:chExt cx="0" cy="0"/>
+        </a:xfrm>
+      </p:grpSpPr>
+      <p:sp>
+        <p:nvSpPr>
+          <p:cNvPr id="248" name="Google Shape;248;p40"/>
+          <p:cNvSpPr txBox="1"/>
+          <p:nvPr>
+            <p:ph type="title"/>
+          </p:nvPr>
+        </p:nvSpPr>
+        <p:spPr>
+          <a:xfrm>
+            <a:off x="729450" y="1318650"/>
+            <a:ext cx="7688700" cy="535200"/>
+          </a:xfrm>
+          <a:prstGeom prst="rect">
+            <a:avLst/>
+          </a:prstGeom>
+        </p:spPr>
+        <p:txBody>
+          <a:bodyPr anchorCtr="0" anchor="t" bIns="91425" lIns="91425" spcFirstLastPara="1" rIns="91425" wrap="square" tIns="91425">
+            <a:noAutofit/>
+          </a:bodyPr>
+          <a:lstStyle/>
+          <a:p>
+            <a:pPr indent="0" lvl="0" marL="0" rtl="0" algn="l">
+              <a:spcBef>
+                <a:spcPts val="0"/>
+              </a:spcBef>
+              <a:spcAft>
+                <a:spcPts val="0"/>
+              </a:spcAft>
+              <a:buSzPts val="990"/>
+              <a:buNone/>
+            </a:pPr>
+            <a:r>
+              <a:rPr lang="pl" sz="2440">
+                <a:latin typeface="Tahoma"/>
+                <a:ea typeface="Tahoma"/>
+                <a:cs typeface="Tahoma"/>
+                <a:sym typeface="Tahoma"/>
+              </a:rPr>
+              <a:t>GIT</a:t>
+            </a:r>
+            <a:endParaRPr sz="2440">
+              <a:latin typeface="Tahoma"/>
+              <a:ea typeface="Tahoma"/>
+              <a:cs typeface="Tahoma"/>
+              <a:sym typeface="Tahoma"/>
+            </a:endParaRPr>
+          </a:p>
+        </p:txBody>
+      </p:sp>
+      <p:sp>
+        <p:nvSpPr>
+          <p:cNvPr id="249" name="Google Shape;249;p40"/>
+          <p:cNvSpPr txBox="1"/>
+          <p:nvPr>
+            <p:ph idx="1" type="body"/>
+          </p:nvPr>
+        </p:nvSpPr>
+        <p:spPr>
+          <a:xfrm>
+            <a:off x="729450" y="2078875"/>
+            <a:ext cx="7688700" cy="2261100"/>
+          </a:xfrm>
+          <a:prstGeom prst="rect">
+            <a:avLst/>
+          </a:prstGeom>
+        </p:spPr>
+        <p:txBody>
+          <a:bodyPr anchorCtr="0" anchor="t" bIns="91425" lIns="91425" spcFirstLastPara="1" rIns="91425" wrap="square" tIns="91425">
+            <a:normAutofit/>
+          </a:bodyPr>
+          <a:lstStyle/>
+          <a:p>
+            <a:pPr indent="0" lvl="0" marL="0" rtl="0" algn="l">
+              <a:spcBef>
+                <a:spcPts val="0"/>
+              </a:spcBef>
+              <a:spcAft>
+                <a:spcPts val="1200"/>
+              </a:spcAft>
+              <a:buNone/>
+            </a:pPr>
+            <a:r>
+              <a:rPr lang="pl" sz="1400">
+                <a:solidFill>
+                  <a:srgbClr val="000000"/>
+                </a:solidFill>
+                <a:latin typeface="Tahoma"/>
+                <a:ea typeface="Tahoma"/>
+                <a:cs typeface="Tahoma"/>
+                <a:sym typeface="Tahoma"/>
+              </a:rPr>
+              <a:t>Git to </a:t>
+            </a:r>
+            <a:r>
+              <a:rPr b="1" lang="pl" sz="1400">
+                <a:solidFill>
+                  <a:srgbClr val="7F6000"/>
+                </a:solidFill>
+                <a:latin typeface="Tahoma"/>
+                <a:ea typeface="Tahoma"/>
+                <a:cs typeface="Tahoma"/>
+                <a:sym typeface="Tahoma"/>
+              </a:rPr>
+              <a:t>system kontroli wersji</a:t>
+            </a:r>
+            <a:r>
+              <a:rPr lang="pl" sz="1400">
+                <a:solidFill>
+                  <a:srgbClr val="7F6000"/>
+                </a:solidFill>
+                <a:latin typeface="Tahoma"/>
+                <a:ea typeface="Tahoma"/>
+                <a:cs typeface="Tahoma"/>
+                <a:sym typeface="Tahoma"/>
+              </a:rPr>
+              <a:t> </a:t>
+            </a:r>
+            <a:r>
+              <a:rPr lang="pl" sz="1400">
+                <a:solidFill>
+                  <a:srgbClr val="000000"/>
+                </a:solidFill>
+                <a:latin typeface="Tahoma"/>
+                <a:ea typeface="Tahoma"/>
+                <a:cs typeface="Tahoma"/>
+                <a:sym typeface="Tahoma"/>
+              </a:rPr>
+              <a:t>(ang. </a:t>
+            </a:r>
+            <a:r>
+              <a:rPr i="1" lang="pl" sz="1400">
+                <a:solidFill>
+                  <a:srgbClr val="000000"/>
+                </a:solidFill>
+                <a:latin typeface="Tahoma"/>
+                <a:ea typeface="Tahoma"/>
+                <a:cs typeface="Tahoma"/>
+                <a:sym typeface="Tahoma"/>
+              </a:rPr>
+              <a:t>Version Control System</a:t>
+            </a:r>
+            <a:r>
+              <a:rPr lang="pl" sz="1400">
+                <a:solidFill>
+                  <a:srgbClr val="000000"/>
+                </a:solidFill>
+                <a:latin typeface="Tahoma"/>
+                <a:ea typeface="Tahoma"/>
+                <a:cs typeface="Tahoma"/>
+                <a:sym typeface="Tahoma"/>
+              </a:rPr>
+              <a:t>), używany do </a:t>
+            </a:r>
+            <a:r>
+              <a:rPr b="1" lang="pl" sz="1400">
+                <a:solidFill>
+                  <a:srgbClr val="7F6000"/>
+                </a:solidFill>
+                <a:latin typeface="Tahoma"/>
+                <a:ea typeface="Tahoma"/>
+                <a:cs typeface="Tahoma"/>
+                <a:sym typeface="Tahoma"/>
+              </a:rPr>
+              <a:t>śledzenia zmian w plikach</a:t>
+            </a:r>
+            <a:r>
+              <a:rPr lang="pl" sz="1400">
+                <a:solidFill>
+                  <a:srgbClr val="7F6000"/>
+                </a:solidFill>
+                <a:latin typeface="Tahoma"/>
+                <a:ea typeface="Tahoma"/>
+                <a:cs typeface="Tahoma"/>
+                <a:sym typeface="Tahoma"/>
+              </a:rPr>
+              <a:t>,</a:t>
+            </a:r>
+            <a:r>
+              <a:rPr lang="pl" sz="1400">
+                <a:solidFill>
+                  <a:srgbClr val="000000"/>
+                </a:solidFill>
+                <a:latin typeface="Tahoma"/>
+                <a:ea typeface="Tahoma"/>
+                <a:cs typeface="Tahoma"/>
+                <a:sym typeface="Tahoma"/>
+              </a:rPr>
+              <a:t> głównie w projektach programistycznych. Dzięki niemu możesz współpracować z innymi, wracać do wcześniejszych wersji plików i zarządzać historią projektu.</a:t>
+            </a:r>
+            <a:endParaRPr sz="1600">
+              <a:latin typeface="Tahoma"/>
+              <a:ea typeface="Tahoma"/>
+              <a:cs typeface="Tahoma"/>
+              <a:sym typeface="Tahoma"/>
+            </a:endParaRPr>
+          </a:p>
+        </p:txBody>
+      </p:sp>
+    </p:spTree>
+  </p:cSld>
+  <p:clrMapOvr>
+    <a:masterClrMapping/>
+  </p:clrMapOvr>
+</p:sld>
+</file>
+
+<file path=ppt/slides/slide29.xml><?xml version="1.0" encoding="utf-8"?>
+<p:sld xmlns:a="http://schemas.openxmlformats.org/drawingml/2006/main" xmlns:r="http://schemas.openxmlformats.org/officeDocument/2006/relationships" xmlns:mc="http://schemas.openxmlformats.org/markup-compatibility/2006" xmlns:mv="urn:schemas-microsoft-com:mac:vml" xmlns:p="http://schemas.openxmlformats.org/presentationml/2006/main" xmlns:c="http://schemas.openxmlformats.org/drawingml/2006/chart" xmlns:dgm="http://schemas.openxmlformats.org/drawingml/2006/diagram" xmlns:o="urn:schemas-microsoft-com:office:office" xmlns:v="urn:schemas-microsoft-com:vml" xmlns:pvml="urn:schemas-microsoft-com:office:powerpoint" xmlns:com="http://schemas.openxmlformats.org/drawingml/2006/compatibility" xmlns:p14="http://schemas.microsoft.com/office/powerpoint/2010/main" xmlns:p15="http://schemas.microsoft.com/office/powerpoint/2012/main" xmlns:ahyp="http://schemas.microsoft.com/office/drawing/2018/hyperlinkcolor">
+  <p:cSld>
+    <p:spTree>
+      <p:nvGrpSpPr>
+        <p:cNvPr id="253" name="Shape 253"/>
+        <p:cNvGrpSpPr/>
+        <p:nvPr/>
+      </p:nvGrpSpPr>
+      <p:grpSpPr>
+        <a:xfrm>
+          <a:off x="0" y="0"/>
+          <a:ext cx="0" cy="0"/>
+          <a:chOff x="0" y="0"/>
+          <a:chExt cx="0" cy="0"/>
+        </a:xfrm>
+      </p:grpSpPr>
+      <p:sp>
+        <p:nvSpPr>
+          <p:cNvPr id="254" name="Google Shape;254;p41"/>
+          <p:cNvSpPr txBox="1"/>
+          <p:nvPr>
+            <p:ph type="title"/>
+          </p:nvPr>
+        </p:nvSpPr>
+        <p:spPr>
+          <a:xfrm>
+            <a:off x="729450" y="1318650"/>
+            <a:ext cx="7688700" cy="535200"/>
+          </a:xfrm>
+          <a:prstGeom prst="rect">
+            <a:avLst/>
+          </a:prstGeom>
+        </p:spPr>
+        <p:txBody>
+          <a:bodyPr anchorCtr="0" anchor="t" bIns="91425" lIns="91425" spcFirstLastPara="1" rIns="91425" wrap="square" tIns="91425">
+            <a:noAutofit/>
+          </a:bodyPr>
+          <a:lstStyle/>
+          <a:p>
+            <a:pPr indent="0" lvl="0" marL="0" rtl="0" algn="l">
+              <a:lnSpc>
+                <a:spcPct val="115000"/>
+              </a:lnSpc>
+              <a:spcBef>
+                <a:spcPts val="1400"/>
+              </a:spcBef>
+              <a:spcAft>
+                <a:spcPts val="400"/>
+              </a:spcAft>
+              <a:buNone/>
+            </a:pPr>
+            <a:r>
+              <a:rPr lang="pl" sz="2400">
+                <a:solidFill>
+                  <a:srgbClr val="000000"/>
+                </a:solidFill>
+                <a:latin typeface="Tahoma"/>
+                <a:ea typeface="Tahoma"/>
+                <a:cs typeface="Tahoma"/>
+                <a:sym typeface="Tahoma"/>
+              </a:rPr>
+              <a:t>Najważniejsze cechy Gita</a:t>
+            </a:r>
+            <a:endParaRPr sz="2400">
+              <a:latin typeface="Tahoma"/>
+              <a:ea typeface="Tahoma"/>
+              <a:cs typeface="Tahoma"/>
+              <a:sym typeface="Tahoma"/>
+            </a:endParaRPr>
+          </a:p>
+        </p:txBody>
+      </p:sp>
+      <p:sp>
+        <p:nvSpPr>
+          <p:cNvPr id="255" name="Google Shape;255;p41"/>
+          <p:cNvSpPr txBox="1"/>
+          <p:nvPr>
+            <p:ph idx="1" type="body"/>
+          </p:nvPr>
+        </p:nvSpPr>
+        <p:spPr>
+          <a:xfrm>
+            <a:off x="729450" y="2078875"/>
+            <a:ext cx="7688700" cy="2261100"/>
+          </a:xfrm>
+          <a:prstGeom prst="rect">
+            <a:avLst/>
+          </a:prstGeom>
+        </p:spPr>
+        <p:txBody>
+          <a:bodyPr anchorCtr="0" anchor="t" bIns="91425" lIns="91425" spcFirstLastPara="1" rIns="91425" wrap="square" tIns="91425">
+            <a:noAutofit/>
+          </a:bodyPr>
+          <a:lstStyle/>
+          <a:p>
+            <a:pPr indent="0" lvl="0" marL="0" rtl="0" algn="l">
+              <a:lnSpc>
+                <a:spcPct val="100000"/>
+              </a:lnSpc>
+              <a:spcBef>
+                <a:spcPts val="0"/>
+              </a:spcBef>
+              <a:spcAft>
+                <a:spcPts val="0"/>
+              </a:spcAft>
+              <a:buNone/>
+            </a:pPr>
+            <a:r>
+              <a:rPr b="1" lang="pl" sz="1400">
+                <a:solidFill>
+                  <a:srgbClr val="1C4587"/>
+                </a:solidFill>
+                <a:latin typeface="Tahoma"/>
+                <a:ea typeface="Tahoma"/>
+                <a:cs typeface="Tahoma"/>
+                <a:sym typeface="Tahoma"/>
+              </a:rPr>
+              <a:t>Śledzenie zmian</a:t>
+            </a:r>
+            <a:endParaRPr b="1" sz="1400">
+              <a:solidFill>
+                <a:srgbClr val="1C4587"/>
+              </a:solidFill>
+              <a:latin typeface="Tahoma"/>
+              <a:ea typeface="Tahoma"/>
+              <a:cs typeface="Tahoma"/>
+              <a:sym typeface="Tahoma"/>
+            </a:endParaRPr>
+          </a:p>
+          <a:p>
+            <a:pPr indent="-317500" lvl="1" marL="914400" rtl="0" algn="l">
+              <a:lnSpc>
+                <a:spcPct val="100000"/>
+              </a:lnSpc>
+              <a:spcBef>
+                <a:spcPts val="0"/>
+              </a:spcBef>
+              <a:spcAft>
+                <a:spcPts val="0"/>
+              </a:spcAft>
+              <a:buClr>
+                <a:srgbClr val="000000"/>
+              </a:buClr>
+              <a:buSzPts val="1400"/>
+              <a:buFont typeface="Tahoma"/>
+              <a:buChar char="○"/>
+            </a:pPr>
+            <a:r>
+              <a:rPr lang="pl" sz="1400">
+                <a:solidFill>
+                  <a:srgbClr val="000000"/>
+                </a:solidFill>
+                <a:latin typeface="Tahoma"/>
+                <a:ea typeface="Tahoma"/>
+                <a:cs typeface="Tahoma"/>
+                <a:sym typeface="Tahoma"/>
+              </a:rPr>
+              <a:t>Git zapisuje historię zmian plików.</a:t>
+            </a:r>
+            <a:endParaRPr sz="1400">
+              <a:solidFill>
+                <a:srgbClr val="000000"/>
+              </a:solidFill>
+              <a:latin typeface="Tahoma"/>
+              <a:ea typeface="Tahoma"/>
+              <a:cs typeface="Tahoma"/>
+              <a:sym typeface="Tahoma"/>
+            </a:endParaRPr>
+          </a:p>
+          <a:p>
+            <a:pPr indent="-317500" lvl="1" marL="914400" rtl="0" algn="l">
+              <a:lnSpc>
+                <a:spcPct val="100000"/>
+              </a:lnSpc>
+              <a:spcBef>
+                <a:spcPts val="0"/>
+              </a:spcBef>
+              <a:spcAft>
+                <a:spcPts val="0"/>
+              </a:spcAft>
+              <a:buClr>
+                <a:srgbClr val="000000"/>
+              </a:buClr>
+              <a:buSzPts val="1400"/>
+              <a:buFont typeface="Tahoma"/>
+              <a:buChar char="○"/>
+            </a:pPr>
+            <a:r>
+              <a:rPr lang="pl" sz="1400">
+                <a:solidFill>
+                  <a:srgbClr val="000000"/>
+                </a:solidFill>
+                <a:latin typeface="Tahoma"/>
+                <a:ea typeface="Tahoma"/>
+                <a:cs typeface="Tahoma"/>
+                <a:sym typeface="Tahoma"/>
+              </a:rPr>
+              <a:t>Możesz zobaczyć, kto i kiedy zmienił dany fragment kodu.</a:t>
+            </a:r>
+            <a:endParaRPr sz="1400">
+              <a:solidFill>
+                <a:srgbClr val="000000"/>
+              </a:solidFill>
+              <a:latin typeface="Tahoma"/>
+              <a:ea typeface="Tahoma"/>
+              <a:cs typeface="Tahoma"/>
+              <a:sym typeface="Tahoma"/>
+            </a:endParaRPr>
+          </a:p>
+          <a:p>
+            <a:pPr indent="0" lvl="0" marL="0" rtl="0" algn="l">
+              <a:lnSpc>
+                <a:spcPct val="100000"/>
+              </a:lnSpc>
+              <a:spcBef>
+                <a:spcPts val="0"/>
+              </a:spcBef>
+              <a:spcAft>
+                <a:spcPts val="0"/>
+              </a:spcAft>
+              <a:buNone/>
+            </a:pPr>
+            <a:r>
+              <a:t/>
+            </a:r>
+            <a:endParaRPr sz="1400">
+              <a:solidFill>
+                <a:srgbClr val="000000"/>
+              </a:solidFill>
+              <a:latin typeface="Tahoma"/>
+              <a:ea typeface="Tahoma"/>
+              <a:cs typeface="Tahoma"/>
+              <a:sym typeface="Tahoma"/>
+            </a:endParaRPr>
+          </a:p>
+          <a:p>
+            <a:pPr indent="0" lvl="0" marL="0" rtl="0" algn="l">
+              <a:lnSpc>
+                <a:spcPct val="100000"/>
+              </a:lnSpc>
+              <a:spcBef>
+                <a:spcPts val="0"/>
+              </a:spcBef>
+              <a:spcAft>
+                <a:spcPts val="0"/>
+              </a:spcAft>
+              <a:buNone/>
+            </a:pPr>
+            <a:r>
+              <a:rPr b="1" lang="pl" sz="1400">
+                <a:solidFill>
+                  <a:srgbClr val="1C4587"/>
+                </a:solidFill>
+                <a:latin typeface="Tahoma"/>
+                <a:ea typeface="Tahoma"/>
+                <a:cs typeface="Tahoma"/>
+                <a:sym typeface="Tahoma"/>
+              </a:rPr>
+              <a:t>Gałęzie (</a:t>
+            </a:r>
+            <a:r>
+              <a:rPr b="1" i="1" lang="pl" sz="1400">
+                <a:solidFill>
+                  <a:srgbClr val="1C4587"/>
+                </a:solidFill>
+                <a:latin typeface="Tahoma"/>
+                <a:ea typeface="Tahoma"/>
+                <a:cs typeface="Tahoma"/>
+                <a:sym typeface="Tahoma"/>
+              </a:rPr>
+              <a:t>branches</a:t>
+            </a:r>
+            <a:r>
+              <a:rPr b="1" lang="pl" sz="1400">
+                <a:solidFill>
+                  <a:srgbClr val="1C4587"/>
+                </a:solidFill>
+                <a:latin typeface="Tahoma"/>
+                <a:ea typeface="Tahoma"/>
+                <a:cs typeface="Tahoma"/>
+                <a:sym typeface="Tahoma"/>
+              </a:rPr>
+              <a:t>)</a:t>
+            </a:r>
+            <a:endParaRPr b="1" sz="1400">
+              <a:solidFill>
+                <a:srgbClr val="1C4587"/>
+              </a:solidFill>
+              <a:latin typeface="Tahoma"/>
+              <a:ea typeface="Tahoma"/>
+              <a:cs typeface="Tahoma"/>
+              <a:sym typeface="Tahoma"/>
+            </a:endParaRPr>
+          </a:p>
+          <a:p>
+            <a:pPr indent="-317500" lvl="1" marL="914400" rtl="0" algn="l">
+              <a:lnSpc>
+                <a:spcPct val="100000"/>
+              </a:lnSpc>
+              <a:spcBef>
+                <a:spcPts val="0"/>
+              </a:spcBef>
+              <a:spcAft>
+                <a:spcPts val="0"/>
+              </a:spcAft>
+              <a:buClr>
+                <a:srgbClr val="000000"/>
+              </a:buClr>
+              <a:buSzPts val="1400"/>
+              <a:buFont typeface="Tahoma"/>
+              <a:buChar char="○"/>
+            </a:pPr>
+            <a:r>
+              <a:rPr lang="pl" sz="1400">
+                <a:solidFill>
+                  <a:srgbClr val="000000"/>
+                </a:solidFill>
+                <a:latin typeface="Tahoma"/>
+                <a:ea typeface="Tahoma"/>
+                <a:cs typeface="Tahoma"/>
+                <a:sym typeface="Tahoma"/>
+              </a:rPr>
+              <a:t>Pozwalają na tworzenie równoległych wersji projektu.</a:t>
+            </a:r>
+            <a:endParaRPr sz="1400">
+              <a:solidFill>
+                <a:srgbClr val="000000"/>
+              </a:solidFill>
+              <a:latin typeface="Tahoma"/>
+              <a:ea typeface="Tahoma"/>
+              <a:cs typeface="Tahoma"/>
+              <a:sym typeface="Tahoma"/>
+            </a:endParaRPr>
+          </a:p>
+          <a:p>
+            <a:pPr indent="-317500" lvl="1" marL="914400" rtl="0" algn="l">
+              <a:lnSpc>
+                <a:spcPct val="100000"/>
+              </a:lnSpc>
+              <a:spcBef>
+                <a:spcPts val="0"/>
+              </a:spcBef>
+              <a:spcAft>
+                <a:spcPts val="0"/>
+              </a:spcAft>
+              <a:buClr>
+                <a:srgbClr val="000000"/>
+              </a:buClr>
+              <a:buSzPts val="1400"/>
+              <a:buFont typeface="Tahoma"/>
+              <a:buChar char="○"/>
+            </a:pPr>
+            <a:r>
+              <a:rPr lang="pl" sz="1400">
+                <a:solidFill>
+                  <a:srgbClr val="000000"/>
+                </a:solidFill>
+                <a:latin typeface="Tahoma"/>
+                <a:ea typeface="Tahoma"/>
+                <a:cs typeface="Tahoma"/>
+                <a:sym typeface="Tahoma"/>
+              </a:rPr>
+              <a:t>Możesz testować nowe funkcje bez psucia głównej wersji (</a:t>
+            </a:r>
+            <a:r>
+              <a:rPr i="1" lang="pl" sz="1400">
+                <a:solidFill>
+                  <a:srgbClr val="000000"/>
+                </a:solidFill>
+                <a:latin typeface="Tahoma"/>
+                <a:ea typeface="Tahoma"/>
+                <a:cs typeface="Tahoma"/>
+                <a:sym typeface="Tahoma"/>
+              </a:rPr>
+              <a:t>main</a:t>
+            </a:r>
+            <a:r>
+              <a:rPr lang="pl" sz="1400">
+                <a:solidFill>
+                  <a:srgbClr val="000000"/>
+                </a:solidFill>
+                <a:latin typeface="Tahoma"/>
+                <a:ea typeface="Tahoma"/>
+                <a:cs typeface="Tahoma"/>
+                <a:sym typeface="Tahoma"/>
+              </a:rPr>
+              <a:t> lub </a:t>
+            </a:r>
+            <a:r>
+              <a:rPr i="1" lang="pl" sz="1400">
+                <a:solidFill>
+                  <a:srgbClr val="000000"/>
+                </a:solidFill>
+                <a:latin typeface="Tahoma"/>
+                <a:ea typeface="Tahoma"/>
+                <a:cs typeface="Tahoma"/>
+                <a:sym typeface="Tahoma"/>
+              </a:rPr>
+              <a:t>master</a:t>
+            </a:r>
+            <a:r>
+              <a:rPr lang="pl" sz="1400">
+                <a:solidFill>
+                  <a:srgbClr val="000000"/>
+                </a:solidFill>
+                <a:latin typeface="Tahoma"/>
+                <a:ea typeface="Tahoma"/>
+                <a:cs typeface="Tahoma"/>
+                <a:sym typeface="Tahoma"/>
+              </a:rPr>
+              <a:t>).</a:t>
+            </a:r>
+            <a:br>
+              <a:rPr lang="pl" sz="1400">
+                <a:solidFill>
+                  <a:srgbClr val="000000"/>
+                </a:solidFill>
+                <a:latin typeface="Tahoma"/>
+                <a:ea typeface="Tahoma"/>
+                <a:cs typeface="Tahoma"/>
+                <a:sym typeface="Tahoma"/>
+              </a:rPr>
+            </a:br>
+            <a:endParaRPr sz="1400">
+              <a:solidFill>
+                <a:srgbClr val="000000"/>
+              </a:solidFill>
+              <a:latin typeface="Tahoma"/>
+              <a:ea typeface="Tahoma"/>
+              <a:cs typeface="Tahoma"/>
+              <a:sym typeface="Tahoma"/>
+            </a:endParaRPr>
+          </a:p>
+          <a:p>
+            <a:pPr indent="0" lvl="0" marL="0" rtl="0" algn="l">
+              <a:lnSpc>
+                <a:spcPct val="100000"/>
+              </a:lnSpc>
+              <a:spcBef>
+                <a:spcPts val="0"/>
+              </a:spcBef>
+              <a:spcAft>
+                <a:spcPts val="0"/>
+              </a:spcAft>
+              <a:buNone/>
+            </a:pPr>
+            <a:r>
+              <a:rPr b="1" lang="pl" sz="1400">
+                <a:solidFill>
+                  <a:srgbClr val="0B5394"/>
+                </a:solidFill>
+                <a:latin typeface="Tahoma"/>
+                <a:ea typeface="Tahoma"/>
+                <a:cs typeface="Tahoma"/>
+                <a:sym typeface="Tahoma"/>
+              </a:rPr>
+              <a:t>Scalanie zmian (</a:t>
+            </a:r>
+            <a:r>
+              <a:rPr b="1" i="1" lang="pl" sz="1400">
+                <a:solidFill>
+                  <a:srgbClr val="0B5394"/>
+                </a:solidFill>
+                <a:latin typeface="Tahoma"/>
+                <a:ea typeface="Tahoma"/>
+                <a:cs typeface="Tahoma"/>
+                <a:sym typeface="Tahoma"/>
+              </a:rPr>
+              <a:t>merge</a:t>
+            </a:r>
+            <a:r>
+              <a:rPr b="1" lang="pl" sz="1400">
+                <a:solidFill>
+                  <a:srgbClr val="0B5394"/>
+                </a:solidFill>
+                <a:latin typeface="Tahoma"/>
+                <a:ea typeface="Tahoma"/>
+                <a:cs typeface="Tahoma"/>
+                <a:sym typeface="Tahoma"/>
+              </a:rPr>
+              <a:t>)</a:t>
+            </a:r>
+            <a:endParaRPr b="1" sz="1400">
+              <a:solidFill>
+                <a:srgbClr val="0B5394"/>
+              </a:solidFill>
+              <a:latin typeface="Tahoma"/>
+              <a:ea typeface="Tahoma"/>
+              <a:cs typeface="Tahoma"/>
+              <a:sym typeface="Tahoma"/>
+            </a:endParaRPr>
+          </a:p>
+          <a:p>
+            <a:pPr indent="-317500" lvl="1" marL="914400" rtl="0" algn="l">
+              <a:lnSpc>
+                <a:spcPct val="100000"/>
+              </a:lnSpc>
+              <a:spcBef>
+                <a:spcPts val="0"/>
+              </a:spcBef>
+              <a:spcAft>
+                <a:spcPts val="0"/>
+              </a:spcAft>
+              <a:buClr>
+                <a:srgbClr val="000000"/>
+              </a:buClr>
+              <a:buSzPts val="1400"/>
+              <a:buFont typeface="Tahoma"/>
+              <a:buChar char="○"/>
+            </a:pPr>
+            <a:r>
+              <a:rPr lang="pl" sz="1400">
+                <a:solidFill>
+                  <a:srgbClr val="000000"/>
+                </a:solidFill>
+                <a:latin typeface="Tahoma"/>
+                <a:ea typeface="Tahoma"/>
+                <a:cs typeface="Tahoma"/>
+                <a:sym typeface="Tahoma"/>
+              </a:rPr>
+              <a:t>Gałęzie można łączyć.</a:t>
+            </a:r>
+            <a:endParaRPr sz="1400">
+              <a:solidFill>
+                <a:srgbClr val="000000"/>
+              </a:solidFill>
+              <a:latin typeface="Tahoma"/>
+              <a:ea typeface="Tahoma"/>
+              <a:cs typeface="Tahoma"/>
+              <a:sym typeface="Tahoma"/>
+            </a:endParaRPr>
+          </a:p>
+          <a:p>
+            <a:pPr indent="-317500" lvl="1" marL="914400" rtl="0" algn="l">
+              <a:lnSpc>
+                <a:spcPct val="100000"/>
+              </a:lnSpc>
+              <a:spcBef>
+                <a:spcPts val="0"/>
+              </a:spcBef>
+              <a:spcAft>
+                <a:spcPts val="0"/>
+              </a:spcAft>
+              <a:buClr>
+                <a:srgbClr val="000000"/>
+              </a:buClr>
+              <a:buSzPts val="1400"/>
+              <a:buFont typeface="Tahoma"/>
+              <a:buChar char="○"/>
+            </a:pPr>
+            <a:r>
+              <a:rPr lang="pl" sz="1400">
+                <a:solidFill>
+                  <a:srgbClr val="000000"/>
+                </a:solidFill>
+                <a:latin typeface="Tahoma"/>
+                <a:ea typeface="Tahoma"/>
+                <a:cs typeface="Tahoma"/>
+                <a:sym typeface="Tahoma"/>
+              </a:rPr>
+              <a:t>Git automatycznie łączy zmiany w jednym projekcie.</a:t>
+            </a:r>
+            <a:endParaRPr b="1" sz="1400">
+              <a:solidFill>
+                <a:srgbClr val="000000"/>
+              </a:solidFill>
+              <a:latin typeface="Tahoma"/>
+              <a:ea typeface="Tahoma"/>
+              <a:cs typeface="Tahoma"/>
+              <a:sym typeface="Tahoma"/>
+            </a:endParaRPr>
+          </a:p>
+        </p:txBody>
+      </p:sp>
+    </p:spTree>
+  </p:cSld>
+  <p:clrMapOvr>
+    <a:masterClrMapping/>
+  </p:clrMapOvr>
+</p:sld>
+</file>
+
 <file path=ppt/slides/slide3.xml><?xml version="1.0" encoding="utf-8"?>
 <p:sld xmlns:a="http://schemas.openxmlformats.org/drawingml/2006/main" xmlns:r="http://schemas.openxmlformats.org/officeDocument/2006/relationships" xmlns:mc="http://schemas.openxmlformats.org/markup-compatibility/2006" xmlns:mv="urn:schemas-microsoft-com:mac:vml" xmlns:p="http://schemas.openxmlformats.org/presentationml/2006/main" xmlns:c="http://schemas.openxmlformats.org/drawingml/2006/chart" xmlns:dgm="http://schemas.openxmlformats.org/drawingml/2006/diagram" xmlns:o="urn:schemas-microsoft-com:office:office" xmlns:v="urn:schemas-microsoft-com:vml" xmlns:pvml="urn:schemas-microsoft-com:office:powerpoint" xmlns:com="http://schemas.openxmlformats.org/drawingml/2006/compatibility" xmlns:p14="http://schemas.microsoft.com/office/powerpoint/2010/main" xmlns:p15="http://schemas.microsoft.com/office/powerpoint/2012/main" xmlns:ahyp="http://schemas.microsoft.com/office/drawing/2018/hyperlinkcolor">
   <p:cSld>
@@ -18542,6 +19857,1251 @@
           </a:p>
         </p:txBody>
       </p:sp>
+    </p:spTree>
+  </p:cSld>
+  <p:clrMapOvr>
+    <a:masterClrMapping/>
+  </p:clrMapOvr>
+</p:sld>
+</file>
+
+<file path=ppt/slides/slide30.xml><?xml version="1.0" encoding="utf-8"?>
+<p:sld xmlns:a="http://schemas.openxmlformats.org/drawingml/2006/main" xmlns:r="http://schemas.openxmlformats.org/officeDocument/2006/relationships" xmlns:mc="http://schemas.openxmlformats.org/markup-compatibility/2006" xmlns:mv="urn:schemas-microsoft-com:mac:vml" xmlns:p="http://schemas.openxmlformats.org/presentationml/2006/main" xmlns:c="http://schemas.openxmlformats.org/drawingml/2006/chart" xmlns:dgm="http://schemas.openxmlformats.org/drawingml/2006/diagram" xmlns:o="urn:schemas-microsoft-com:office:office" xmlns:v="urn:schemas-microsoft-com:vml" xmlns:pvml="urn:schemas-microsoft-com:office:powerpoint" xmlns:com="http://schemas.openxmlformats.org/drawingml/2006/compatibility" xmlns:p14="http://schemas.microsoft.com/office/powerpoint/2010/main" xmlns:p15="http://schemas.microsoft.com/office/powerpoint/2012/main" xmlns:ahyp="http://schemas.microsoft.com/office/drawing/2018/hyperlinkcolor">
+  <p:cSld>
+    <p:spTree>
+      <p:nvGrpSpPr>
+        <p:cNvPr id="259" name="Shape 259"/>
+        <p:cNvGrpSpPr/>
+        <p:nvPr/>
+      </p:nvGrpSpPr>
+      <p:grpSpPr>
+        <a:xfrm>
+          <a:off x="0" y="0"/>
+          <a:ext cx="0" cy="0"/>
+          <a:chOff x="0" y="0"/>
+          <a:chExt cx="0" cy="0"/>
+        </a:xfrm>
+      </p:grpSpPr>
+      <p:sp>
+        <p:nvSpPr>
+          <p:cNvPr id="260" name="Google Shape;260;p42"/>
+          <p:cNvSpPr txBox="1"/>
+          <p:nvPr>
+            <p:ph type="title"/>
+          </p:nvPr>
+        </p:nvSpPr>
+        <p:spPr>
+          <a:xfrm>
+            <a:off x="729450" y="1318650"/>
+            <a:ext cx="7688700" cy="535200"/>
+          </a:xfrm>
+          <a:prstGeom prst="rect">
+            <a:avLst/>
+          </a:prstGeom>
+        </p:spPr>
+        <p:txBody>
+          <a:bodyPr anchorCtr="0" anchor="t" bIns="91425" lIns="91425" spcFirstLastPara="1" rIns="91425" wrap="square" tIns="91425">
+            <a:normAutofit fontScale="90000"/>
+          </a:bodyPr>
+          <a:lstStyle/>
+          <a:p>
+            <a:pPr indent="0" lvl="0" marL="0" rtl="0" algn="l">
+              <a:lnSpc>
+                <a:spcPct val="115000"/>
+              </a:lnSpc>
+              <a:spcBef>
+                <a:spcPts val="1400"/>
+              </a:spcBef>
+              <a:spcAft>
+                <a:spcPts val="0"/>
+              </a:spcAft>
+              <a:buNone/>
+            </a:pPr>
+            <a:r>
+              <a:rPr lang="pl" sz="2400">
+                <a:solidFill>
+                  <a:srgbClr val="000000"/>
+                </a:solidFill>
+                <a:latin typeface="Tahoma"/>
+                <a:ea typeface="Tahoma"/>
+                <a:cs typeface="Tahoma"/>
+                <a:sym typeface="Tahoma"/>
+              </a:rPr>
+              <a:t>Najważniejsze cechy Gita</a:t>
+            </a:r>
+            <a:endParaRPr sz="2400">
+              <a:latin typeface="Tahoma"/>
+              <a:ea typeface="Tahoma"/>
+              <a:cs typeface="Tahoma"/>
+              <a:sym typeface="Tahoma"/>
+            </a:endParaRPr>
+          </a:p>
+          <a:p>
+            <a:pPr indent="0" lvl="0" marL="0" rtl="0" algn="l">
+              <a:spcBef>
+                <a:spcPts val="400"/>
+              </a:spcBef>
+              <a:spcAft>
+                <a:spcPts val="0"/>
+              </a:spcAft>
+              <a:buNone/>
+            </a:pPr>
+            <a:r>
+              <a:t/>
+            </a:r>
+            <a:endParaRPr/>
+          </a:p>
+        </p:txBody>
+      </p:sp>
+      <p:sp>
+        <p:nvSpPr>
+          <p:cNvPr id="261" name="Google Shape;261;p42"/>
+          <p:cNvSpPr txBox="1"/>
+          <p:nvPr>
+            <p:ph idx="1" type="body"/>
+          </p:nvPr>
+        </p:nvSpPr>
+        <p:spPr>
+          <a:xfrm>
+            <a:off x="729450" y="2078875"/>
+            <a:ext cx="7688700" cy="2261100"/>
+          </a:xfrm>
+          <a:prstGeom prst="rect">
+            <a:avLst/>
+          </a:prstGeom>
+        </p:spPr>
+        <p:txBody>
+          <a:bodyPr anchorCtr="0" anchor="t" bIns="91425" lIns="91425" spcFirstLastPara="1" rIns="91425" wrap="square" tIns="91425">
+            <a:normAutofit/>
+          </a:bodyPr>
+          <a:lstStyle/>
+          <a:p>
+            <a:pPr indent="0" lvl="0" marL="0" rtl="0" algn="l">
+              <a:spcBef>
+                <a:spcPts val="0"/>
+              </a:spcBef>
+              <a:spcAft>
+                <a:spcPts val="0"/>
+              </a:spcAft>
+              <a:buNone/>
+            </a:pPr>
+            <a:r>
+              <a:rPr b="1" lang="pl" sz="1400">
+                <a:solidFill>
+                  <a:srgbClr val="1C4587"/>
+                </a:solidFill>
+                <a:latin typeface="Tahoma"/>
+                <a:ea typeface="Tahoma"/>
+                <a:cs typeface="Tahoma"/>
+                <a:sym typeface="Tahoma"/>
+              </a:rPr>
+              <a:t>Rozproszony system</a:t>
+            </a:r>
+            <a:endParaRPr b="1" sz="1400">
+              <a:solidFill>
+                <a:srgbClr val="1C4587"/>
+              </a:solidFill>
+              <a:latin typeface="Tahoma"/>
+              <a:ea typeface="Tahoma"/>
+              <a:cs typeface="Tahoma"/>
+              <a:sym typeface="Tahoma"/>
+            </a:endParaRPr>
+          </a:p>
+          <a:p>
+            <a:pPr indent="-317500" lvl="1" marL="914400" rtl="0" algn="l">
+              <a:spcBef>
+                <a:spcPts val="0"/>
+              </a:spcBef>
+              <a:spcAft>
+                <a:spcPts val="0"/>
+              </a:spcAft>
+              <a:buClr>
+                <a:srgbClr val="000000"/>
+              </a:buClr>
+              <a:buSzPts val="1400"/>
+              <a:buFont typeface="Tahoma"/>
+              <a:buChar char="○"/>
+            </a:pPr>
+            <a:r>
+              <a:rPr lang="pl" sz="1400">
+                <a:solidFill>
+                  <a:srgbClr val="000000"/>
+                </a:solidFill>
+                <a:latin typeface="Tahoma"/>
+                <a:ea typeface="Tahoma"/>
+                <a:cs typeface="Tahoma"/>
+                <a:sym typeface="Tahoma"/>
+              </a:rPr>
+              <a:t>Każdy użytkownik ma pełną kopię repozytorium.</a:t>
+            </a:r>
+            <a:endParaRPr sz="1400">
+              <a:solidFill>
+                <a:srgbClr val="000000"/>
+              </a:solidFill>
+              <a:latin typeface="Tahoma"/>
+              <a:ea typeface="Tahoma"/>
+              <a:cs typeface="Tahoma"/>
+              <a:sym typeface="Tahoma"/>
+            </a:endParaRPr>
+          </a:p>
+          <a:p>
+            <a:pPr indent="-317500" lvl="1" marL="914400" rtl="0" algn="l">
+              <a:spcBef>
+                <a:spcPts val="0"/>
+              </a:spcBef>
+              <a:spcAft>
+                <a:spcPts val="0"/>
+              </a:spcAft>
+              <a:buClr>
+                <a:srgbClr val="000000"/>
+              </a:buClr>
+              <a:buSzPts val="1400"/>
+              <a:buFont typeface="Tahoma"/>
+              <a:buChar char="○"/>
+            </a:pPr>
+            <a:r>
+              <a:rPr lang="pl" sz="1400">
+                <a:solidFill>
+                  <a:srgbClr val="000000"/>
+                </a:solidFill>
+                <a:latin typeface="Tahoma"/>
+                <a:ea typeface="Tahoma"/>
+                <a:cs typeface="Tahoma"/>
+                <a:sym typeface="Tahoma"/>
+              </a:rPr>
+              <a:t>Możesz pracować lokalnie bez połączenia z internetem.</a:t>
+            </a:r>
+            <a:endParaRPr sz="1400">
+              <a:solidFill>
+                <a:srgbClr val="000000"/>
+              </a:solidFill>
+              <a:latin typeface="Tahoma"/>
+              <a:ea typeface="Tahoma"/>
+              <a:cs typeface="Tahoma"/>
+              <a:sym typeface="Tahoma"/>
+            </a:endParaRPr>
+          </a:p>
+          <a:p>
+            <a:pPr indent="0" lvl="0" marL="914400" rtl="0" algn="l">
+              <a:spcBef>
+                <a:spcPts val="0"/>
+              </a:spcBef>
+              <a:spcAft>
+                <a:spcPts val="0"/>
+              </a:spcAft>
+              <a:buNone/>
+            </a:pPr>
+            <a:r>
+              <a:t/>
+            </a:r>
+            <a:endParaRPr sz="1400">
+              <a:solidFill>
+                <a:srgbClr val="000000"/>
+              </a:solidFill>
+              <a:latin typeface="Tahoma"/>
+              <a:ea typeface="Tahoma"/>
+              <a:cs typeface="Tahoma"/>
+              <a:sym typeface="Tahoma"/>
+            </a:endParaRPr>
+          </a:p>
+          <a:p>
+            <a:pPr indent="0" lvl="0" marL="0" rtl="0" algn="l">
+              <a:spcBef>
+                <a:spcPts val="0"/>
+              </a:spcBef>
+              <a:spcAft>
+                <a:spcPts val="0"/>
+              </a:spcAft>
+              <a:buNone/>
+            </a:pPr>
+            <a:r>
+              <a:rPr b="1" lang="pl" sz="1400">
+                <a:solidFill>
+                  <a:srgbClr val="1C4587"/>
+                </a:solidFill>
+                <a:latin typeface="Tahoma"/>
+                <a:ea typeface="Tahoma"/>
+                <a:cs typeface="Tahoma"/>
+                <a:sym typeface="Tahoma"/>
+              </a:rPr>
+              <a:t>Współpraca</a:t>
+            </a:r>
+            <a:endParaRPr b="1" sz="1400">
+              <a:solidFill>
+                <a:srgbClr val="1C4587"/>
+              </a:solidFill>
+              <a:latin typeface="Tahoma"/>
+              <a:ea typeface="Tahoma"/>
+              <a:cs typeface="Tahoma"/>
+              <a:sym typeface="Tahoma"/>
+            </a:endParaRPr>
+          </a:p>
+          <a:p>
+            <a:pPr indent="-317500" lvl="1" marL="914400" rtl="0" algn="l">
+              <a:spcBef>
+                <a:spcPts val="0"/>
+              </a:spcBef>
+              <a:spcAft>
+                <a:spcPts val="0"/>
+              </a:spcAft>
+              <a:buClr>
+                <a:srgbClr val="000000"/>
+              </a:buClr>
+              <a:buSzPts val="1400"/>
+              <a:buFont typeface="Tahoma"/>
+              <a:buChar char="○"/>
+            </a:pPr>
+            <a:r>
+              <a:rPr lang="pl" sz="1400">
+                <a:solidFill>
+                  <a:srgbClr val="000000"/>
+                </a:solidFill>
+                <a:latin typeface="Tahoma"/>
+                <a:ea typeface="Tahoma"/>
+                <a:cs typeface="Tahoma"/>
+                <a:sym typeface="Tahoma"/>
+              </a:rPr>
+              <a:t>Git ułatwia pracę zespołową.</a:t>
+            </a:r>
+            <a:endParaRPr sz="1400">
+              <a:solidFill>
+                <a:srgbClr val="000000"/>
+              </a:solidFill>
+              <a:latin typeface="Tahoma"/>
+              <a:ea typeface="Tahoma"/>
+              <a:cs typeface="Tahoma"/>
+              <a:sym typeface="Tahoma"/>
+            </a:endParaRPr>
+          </a:p>
+          <a:p>
+            <a:pPr indent="-317500" lvl="1" marL="914400" rtl="0" algn="l">
+              <a:spcBef>
+                <a:spcPts val="0"/>
+              </a:spcBef>
+              <a:spcAft>
+                <a:spcPts val="0"/>
+              </a:spcAft>
+              <a:buClr>
+                <a:srgbClr val="000000"/>
+              </a:buClr>
+              <a:buSzPts val="1400"/>
+              <a:buFont typeface="Arial"/>
+              <a:buChar char="○"/>
+            </a:pPr>
+            <a:r>
+              <a:rPr lang="pl" sz="1400">
+                <a:solidFill>
+                  <a:srgbClr val="000000"/>
+                </a:solidFill>
+                <a:latin typeface="Tahoma"/>
+                <a:ea typeface="Tahoma"/>
+                <a:cs typeface="Tahoma"/>
+                <a:sym typeface="Tahoma"/>
+              </a:rPr>
+              <a:t>Popularne platformy: </a:t>
+            </a:r>
+            <a:r>
+              <a:rPr b="1" lang="pl" sz="1400">
+                <a:solidFill>
+                  <a:srgbClr val="000000"/>
+                </a:solidFill>
+                <a:latin typeface="Tahoma"/>
+                <a:ea typeface="Tahoma"/>
+                <a:cs typeface="Tahoma"/>
+                <a:sym typeface="Tahoma"/>
+              </a:rPr>
+              <a:t>GitHub</a:t>
+            </a:r>
+            <a:r>
+              <a:rPr lang="pl" sz="1400">
+                <a:solidFill>
+                  <a:srgbClr val="000000"/>
+                </a:solidFill>
+                <a:latin typeface="Tahoma"/>
+                <a:ea typeface="Tahoma"/>
+                <a:cs typeface="Tahoma"/>
+                <a:sym typeface="Tahoma"/>
+              </a:rPr>
+              <a:t>, </a:t>
+            </a:r>
+            <a:r>
+              <a:rPr b="1" lang="pl" sz="1400">
+                <a:solidFill>
+                  <a:srgbClr val="000000"/>
+                </a:solidFill>
+                <a:latin typeface="Tahoma"/>
+                <a:ea typeface="Tahoma"/>
+                <a:cs typeface="Tahoma"/>
+                <a:sym typeface="Tahoma"/>
+              </a:rPr>
+              <a:t>GitLab</a:t>
+            </a:r>
+            <a:r>
+              <a:rPr lang="pl" sz="1400">
+                <a:solidFill>
+                  <a:srgbClr val="000000"/>
+                </a:solidFill>
+                <a:latin typeface="Tahoma"/>
+                <a:ea typeface="Tahoma"/>
+                <a:cs typeface="Tahoma"/>
+                <a:sym typeface="Tahoma"/>
+              </a:rPr>
+              <a:t>, </a:t>
+            </a:r>
+            <a:r>
+              <a:rPr b="1" lang="pl" sz="1400">
+                <a:solidFill>
+                  <a:srgbClr val="000000"/>
+                </a:solidFill>
+                <a:latin typeface="Tahoma"/>
+                <a:ea typeface="Tahoma"/>
+                <a:cs typeface="Tahoma"/>
+                <a:sym typeface="Tahoma"/>
+              </a:rPr>
+              <a:t>Bitbucket</a:t>
+            </a:r>
+            <a:r>
+              <a:rPr lang="pl" sz="1400">
+                <a:solidFill>
+                  <a:srgbClr val="000000"/>
+                </a:solidFill>
+                <a:latin typeface="Tahoma"/>
+                <a:ea typeface="Tahoma"/>
+                <a:cs typeface="Tahoma"/>
+                <a:sym typeface="Tahoma"/>
+              </a:rPr>
+              <a:t>.</a:t>
+            </a:r>
+            <a:endParaRPr b="1" sz="1400">
+              <a:solidFill>
+                <a:srgbClr val="000000"/>
+              </a:solidFill>
+              <a:latin typeface="Tahoma"/>
+              <a:ea typeface="Tahoma"/>
+              <a:cs typeface="Tahoma"/>
+              <a:sym typeface="Tahoma"/>
+            </a:endParaRPr>
+          </a:p>
+        </p:txBody>
+      </p:sp>
+    </p:spTree>
+  </p:cSld>
+  <p:clrMapOvr>
+    <a:masterClrMapping/>
+  </p:clrMapOvr>
+</p:sld>
+</file>
+
+<file path=ppt/slides/slide31.xml><?xml version="1.0" encoding="utf-8"?>
+<p:sld xmlns:a="http://schemas.openxmlformats.org/drawingml/2006/main" xmlns:r="http://schemas.openxmlformats.org/officeDocument/2006/relationships" xmlns:mc="http://schemas.openxmlformats.org/markup-compatibility/2006" xmlns:mv="urn:schemas-microsoft-com:mac:vml" xmlns:p="http://schemas.openxmlformats.org/presentationml/2006/main" xmlns:c="http://schemas.openxmlformats.org/drawingml/2006/chart" xmlns:dgm="http://schemas.openxmlformats.org/drawingml/2006/diagram" xmlns:o="urn:schemas-microsoft-com:office:office" xmlns:v="urn:schemas-microsoft-com:vml" xmlns:pvml="urn:schemas-microsoft-com:office:powerpoint" xmlns:com="http://schemas.openxmlformats.org/drawingml/2006/compatibility" xmlns:p14="http://schemas.microsoft.com/office/powerpoint/2010/main" xmlns:p15="http://schemas.microsoft.com/office/powerpoint/2012/main" xmlns:ahyp="http://schemas.microsoft.com/office/drawing/2018/hyperlinkcolor">
+  <p:cSld>
+    <p:spTree>
+      <p:nvGrpSpPr>
+        <p:cNvPr id="265" name="Shape 265"/>
+        <p:cNvGrpSpPr/>
+        <p:nvPr/>
+      </p:nvGrpSpPr>
+      <p:grpSpPr>
+        <a:xfrm>
+          <a:off x="0" y="0"/>
+          <a:ext cx="0" cy="0"/>
+          <a:chOff x="0" y="0"/>
+          <a:chExt cx="0" cy="0"/>
+        </a:xfrm>
+      </p:grpSpPr>
+      <p:sp>
+        <p:nvSpPr>
+          <p:cNvPr id="266" name="Google Shape;266;p43"/>
+          <p:cNvSpPr txBox="1"/>
+          <p:nvPr>
+            <p:ph type="title"/>
+          </p:nvPr>
+        </p:nvSpPr>
+        <p:spPr>
+          <a:xfrm>
+            <a:off x="729450" y="1318650"/>
+            <a:ext cx="7688700" cy="535200"/>
+          </a:xfrm>
+          <a:prstGeom prst="rect">
+            <a:avLst/>
+          </a:prstGeom>
+        </p:spPr>
+        <p:txBody>
+          <a:bodyPr anchorCtr="0" anchor="t" bIns="91425" lIns="91425" spcFirstLastPara="1" rIns="91425" wrap="square" tIns="91425">
+            <a:noAutofit/>
+          </a:bodyPr>
+          <a:lstStyle/>
+          <a:p>
+            <a:pPr indent="0" lvl="0" marL="0" rtl="0" algn="l">
+              <a:lnSpc>
+                <a:spcPct val="115000"/>
+              </a:lnSpc>
+              <a:spcBef>
+                <a:spcPts val="1400"/>
+              </a:spcBef>
+              <a:spcAft>
+                <a:spcPts val="400"/>
+              </a:spcAft>
+              <a:buNone/>
+            </a:pPr>
+            <a:r>
+              <a:rPr lang="pl" sz="2400">
+                <a:solidFill>
+                  <a:srgbClr val="000000"/>
+                </a:solidFill>
+                <a:latin typeface="Tahoma"/>
+                <a:ea typeface="Tahoma"/>
+                <a:cs typeface="Tahoma"/>
+                <a:sym typeface="Tahoma"/>
+              </a:rPr>
+              <a:t>Podstawowe komendy Git</a:t>
+            </a:r>
+            <a:endParaRPr sz="2400">
+              <a:latin typeface="Tahoma"/>
+              <a:ea typeface="Tahoma"/>
+              <a:cs typeface="Tahoma"/>
+              <a:sym typeface="Tahoma"/>
+            </a:endParaRPr>
+          </a:p>
+        </p:txBody>
+      </p:sp>
+      <p:sp>
+        <p:nvSpPr>
+          <p:cNvPr id="267" name="Google Shape;267;p43"/>
+          <p:cNvSpPr txBox="1"/>
+          <p:nvPr>
+            <p:ph idx="1" type="body"/>
+          </p:nvPr>
+        </p:nvSpPr>
+        <p:spPr>
+          <a:xfrm>
+            <a:off x="729450" y="2078875"/>
+            <a:ext cx="7688700" cy="2261100"/>
+          </a:xfrm>
+          <a:prstGeom prst="rect">
+            <a:avLst/>
+          </a:prstGeom>
+        </p:spPr>
+        <p:txBody>
+          <a:bodyPr anchorCtr="0" anchor="t" bIns="91425" lIns="91425" spcFirstLastPara="1" rIns="91425" wrap="square" tIns="91425">
+            <a:normAutofit lnSpcReduction="10000"/>
+          </a:bodyPr>
+          <a:lstStyle/>
+          <a:p>
+            <a:pPr indent="0" lvl="0" marL="0" rtl="0" algn="l">
+              <a:spcBef>
+                <a:spcPts val="0"/>
+              </a:spcBef>
+              <a:spcAft>
+                <a:spcPts val="0"/>
+              </a:spcAft>
+              <a:buNone/>
+            </a:pPr>
+            <a:r>
+              <a:rPr b="1" lang="pl">
+                <a:solidFill>
+                  <a:srgbClr val="274E13"/>
+                </a:solidFill>
+              </a:rPr>
+              <a:t>git init </a:t>
+            </a:r>
+            <a:r>
+              <a:rPr lang="pl">
+                <a:solidFill>
+                  <a:srgbClr val="000000"/>
+                </a:solidFill>
+              </a:rPr>
+              <a:t>				- Tworzy nowe repozytorium w folderze</a:t>
+            </a:r>
+            <a:endParaRPr>
+              <a:solidFill>
+                <a:srgbClr val="000000"/>
+              </a:solidFill>
+            </a:endParaRPr>
+          </a:p>
+          <a:p>
+            <a:pPr indent="0" lvl="0" marL="0" rtl="0" algn="l">
+              <a:spcBef>
+                <a:spcPts val="1200"/>
+              </a:spcBef>
+              <a:spcAft>
+                <a:spcPts val="0"/>
+              </a:spcAft>
+              <a:buNone/>
+            </a:pPr>
+            <a:r>
+              <a:rPr b="1" lang="pl">
+                <a:solidFill>
+                  <a:srgbClr val="274E13"/>
+                </a:solidFill>
+              </a:rPr>
+              <a:t>git clone &lt;url&gt;</a:t>
+            </a:r>
+            <a:r>
+              <a:rPr lang="pl">
+                <a:solidFill>
+                  <a:srgbClr val="000000"/>
+                </a:solidFill>
+              </a:rPr>
+              <a:t> 			- Pobiera repozytorium z internetu</a:t>
+            </a:r>
+            <a:endParaRPr>
+              <a:solidFill>
+                <a:srgbClr val="000000"/>
+              </a:solidFill>
+            </a:endParaRPr>
+          </a:p>
+          <a:p>
+            <a:pPr indent="0" lvl="0" marL="0" rtl="0" algn="l">
+              <a:spcBef>
+                <a:spcPts val="1200"/>
+              </a:spcBef>
+              <a:spcAft>
+                <a:spcPts val="0"/>
+              </a:spcAft>
+              <a:buNone/>
+            </a:pPr>
+            <a:r>
+              <a:rPr b="1" lang="pl">
+                <a:solidFill>
+                  <a:srgbClr val="274E13"/>
+                </a:solidFill>
+              </a:rPr>
+              <a:t>git add &lt;plik&gt; </a:t>
+            </a:r>
+            <a:r>
+              <a:rPr lang="pl">
+                <a:solidFill>
+                  <a:srgbClr val="000000"/>
+                </a:solidFill>
+              </a:rPr>
+              <a:t>			</a:t>
+            </a:r>
+            <a:r>
+              <a:rPr lang="pl">
+                <a:solidFill>
+                  <a:srgbClr val="000000"/>
+                </a:solidFill>
+              </a:rPr>
+              <a:t>-</a:t>
+            </a:r>
+            <a:r>
+              <a:rPr lang="pl">
+                <a:solidFill>
+                  <a:srgbClr val="000000"/>
+                </a:solidFill>
+              </a:rPr>
+              <a:t> Dodaje plik do "staging area" (przygotowanie do commit)</a:t>
+            </a:r>
+            <a:endParaRPr>
+              <a:solidFill>
+                <a:srgbClr val="000000"/>
+              </a:solidFill>
+            </a:endParaRPr>
+          </a:p>
+          <a:p>
+            <a:pPr indent="0" lvl="0" marL="0" rtl="0" algn="l">
+              <a:spcBef>
+                <a:spcPts val="1200"/>
+              </a:spcBef>
+              <a:spcAft>
+                <a:spcPts val="0"/>
+              </a:spcAft>
+              <a:buNone/>
+            </a:pPr>
+            <a:r>
+              <a:rPr b="1" lang="pl">
+                <a:solidFill>
+                  <a:srgbClr val="274E13"/>
+                </a:solidFill>
+              </a:rPr>
+              <a:t>git commit -m "komentarz" </a:t>
+            </a:r>
+            <a:r>
+              <a:rPr lang="pl">
+                <a:solidFill>
+                  <a:srgbClr val="000000"/>
+                </a:solidFill>
+              </a:rPr>
+              <a:t>	- Zapisuje zmiany z opisem</a:t>
+            </a:r>
+            <a:endParaRPr>
+              <a:solidFill>
+                <a:srgbClr val="000000"/>
+              </a:solidFill>
+            </a:endParaRPr>
+          </a:p>
+          <a:p>
+            <a:pPr indent="0" lvl="0" marL="0" rtl="0" algn="l">
+              <a:spcBef>
+                <a:spcPts val="1200"/>
+              </a:spcBef>
+              <a:spcAft>
+                <a:spcPts val="0"/>
+              </a:spcAft>
+              <a:buNone/>
+            </a:pPr>
+            <a:r>
+              <a:rPr b="1" lang="pl">
+                <a:solidFill>
+                  <a:srgbClr val="274E13"/>
+                </a:solidFill>
+              </a:rPr>
+              <a:t>git status </a:t>
+            </a:r>
+            <a:r>
+              <a:rPr lang="pl">
+                <a:solidFill>
+                  <a:srgbClr val="000000"/>
+                </a:solidFill>
+              </a:rPr>
+              <a:t>				- Pokazuje stan repozytorium i zmienione pliki</a:t>
+            </a:r>
+            <a:endParaRPr>
+              <a:solidFill>
+                <a:srgbClr val="000000"/>
+              </a:solidFill>
+            </a:endParaRPr>
+          </a:p>
+          <a:p>
+            <a:pPr indent="0" lvl="0" marL="0" rtl="0" algn="l">
+              <a:spcBef>
+                <a:spcPts val="1200"/>
+              </a:spcBef>
+              <a:spcAft>
+                <a:spcPts val="1200"/>
+              </a:spcAft>
+              <a:buNone/>
+            </a:pPr>
+            <a:r>
+              <a:t/>
+            </a:r>
+            <a:endParaRPr/>
+          </a:p>
+        </p:txBody>
+      </p:sp>
+    </p:spTree>
+  </p:cSld>
+  <p:clrMapOvr>
+    <a:masterClrMapping/>
+  </p:clrMapOvr>
+</p:sld>
+</file>
+
+<file path=ppt/slides/slide32.xml><?xml version="1.0" encoding="utf-8"?>
+<p:sld xmlns:a="http://schemas.openxmlformats.org/drawingml/2006/main" xmlns:r="http://schemas.openxmlformats.org/officeDocument/2006/relationships" xmlns:mc="http://schemas.openxmlformats.org/markup-compatibility/2006" xmlns:mv="urn:schemas-microsoft-com:mac:vml" xmlns:p="http://schemas.openxmlformats.org/presentationml/2006/main" xmlns:c="http://schemas.openxmlformats.org/drawingml/2006/chart" xmlns:dgm="http://schemas.openxmlformats.org/drawingml/2006/diagram" xmlns:o="urn:schemas-microsoft-com:office:office" xmlns:v="urn:schemas-microsoft-com:vml" xmlns:pvml="urn:schemas-microsoft-com:office:powerpoint" xmlns:com="http://schemas.openxmlformats.org/drawingml/2006/compatibility" xmlns:p14="http://schemas.microsoft.com/office/powerpoint/2010/main" xmlns:p15="http://schemas.microsoft.com/office/powerpoint/2012/main" xmlns:ahyp="http://schemas.microsoft.com/office/drawing/2018/hyperlinkcolor">
+  <p:cSld>
+    <p:spTree>
+      <p:nvGrpSpPr>
+        <p:cNvPr id="271" name="Shape 271"/>
+        <p:cNvGrpSpPr/>
+        <p:nvPr/>
+      </p:nvGrpSpPr>
+      <p:grpSpPr>
+        <a:xfrm>
+          <a:off x="0" y="0"/>
+          <a:ext cx="0" cy="0"/>
+          <a:chOff x="0" y="0"/>
+          <a:chExt cx="0" cy="0"/>
+        </a:xfrm>
+      </p:grpSpPr>
+      <p:sp>
+        <p:nvSpPr>
+          <p:cNvPr id="272" name="Google Shape;272;p44"/>
+          <p:cNvSpPr txBox="1"/>
+          <p:nvPr>
+            <p:ph type="title"/>
+          </p:nvPr>
+        </p:nvSpPr>
+        <p:spPr>
+          <a:xfrm>
+            <a:off x="729450" y="1318650"/>
+            <a:ext cx="7688700" cy="535200"/>
+          </a:xfrm>
+          <a:prstGeom prst="rect">
+            <a:avLst/>
+          </a:prstGeom>
+        </p:spPr>
+        <p:txBody>
+          <a:bodyPr anchorCtr="0" anchor="t" bIns="91425" lIns="91425" spcFirstLastPara="1" rIns="91425" wrap="square" tIns="91425">
+            <a:normAutofit fontScale="90000"/>
+          </a:bodyPr>
+          <a:lstStyle/>
+          <a:p>
+            <a:pPr indent="0" lvl="0" marL="0" rtl="0" algn="l">
+              <a:lnSpc>
+                <a:spcPct val="115000"/>
+              </a:lnSpc>
+              <a:spcBef>
+                <a:spcPts val="1400"/>
+              </a:spcBef>
+              <a:spcAft>
+                <a:spcPts val="0"/>
+              </a:spcAft>
+              <a:buNone/>
+            </a:pPr>
+            <a:r>
+              <a:rPr lang="pl" sz="2400">
+                <a:solidFill>
+                  <a:srgbClr val="000000"/>
+                </a:solidFill>
+                <a:latin typeface="Tahoma"/>
+                <a:ea typeface="Tahoma"/>
+                <a:cs typeface="Tahoma"/>
+                <a:sym typeface="Tahoma"/>
+              </a:rPr>
+              <a:t>Podstawowe komendy Git</a:t>
+            </a:r>
+            <a:endParaRPr sz="2400">
+              <a:latin typeface="Tahoma"/>
+              <a:ea typeface="Tahoma"/>
+              <a:cs typeface="Tahoma"/>
+              <a:sym typeface="Tahoma"/>
+            </a:endParaRPr>
+          </a:p>
+          <a:p>
+            <a:pPr indent="0" lvl="0" marL="0" rtl="0" algn="l">
+              <a:spcBef>
+                <a:spcPts val="400"/>
+              </a:spcBef>
+              <a:spcAft>
+                <a:spcPts val="0"/>
+              </a:spcAft>
+              <a:buNone/>
+            </a:pPr>
+            <a:r>
+              <a:t/>
+            </a:r>
+            <a:endParaRPr/>
+          </a:p>
+        </p:txBody>
+      </p:sp>
+      <p:sp>
+        <p:nvSpPr>
+          <p:cNvPr id="273" name="Google Shape;273;p44"/>
+          <p:cNvSpPr txBox="1"/>
+          <p:nvPr>
+            <p:ph idx="1" type="body"/>
+          </p:nvPr>
+        </p:nvSpPr>
+        <p:spPr>
+          <a:xfrm>
+            <a:off x="729450" y="2078875"/>
+            <a:ext cx="7688700" cy="2261100"/>
+          </a:xfrm>
+          <a:prstGeom prst="rect">
+            <a:avLst/>
+          </a:prstGeom>
+        </p:spPr>
+        <p:txBody>
+          <a:bodyPr anchorCtr="0" anchor="t" bIns="91425" lIns="91425" spcFirstLastPara="1" rIns="91425" wrap="square" tIns="91425">
+            <a:normAutofit/>
+          </a:bodyPr>
+          <a:lstStyle/>
+          <a:p>
+            <a:pPr indent="0" lvl="0" marL="0" rtl="0" algn="l">
+              <a:spcBef>
+                <a:spcPts val="0"/>
+              </a:spcBef>
+              <a:spcAft>
+                <a:spcPts val="0"/>
+              </a:spcAft>
+              <a:buNone/>
+            </a:pPr>
+            <a:r>
+              <a:rPr b="1" lang="pl">
+                <a:solidFill>
+                  <a:srgbClr val="274E13"/>
+                </a:solidFill>
+                <a:latin typeface="Tahoma"/>
+                <a:ea typeface="Tahoma"/>
+                <a:cs typeface="Tahoma"/>
+                <a:sym typeface="Tahoma"/>
+              </a:rPr>
+              <a:t>git push </a:t>
+            </a:r>
+            <a:r>
+              <a:rPr lang="pl">
+                <a:solidFill>
+                  <a:srgbClr val="000000"/>
+                </a:solidFill>
+                <a:latin typeface="Tahoma"/>
+                <a:ea typeface="Tahoma"/>
+                <a:cs typeface="Tahoma"/>
+                <a:sym typeface="Tahoma"/>
+              </a:rPr>
+              <a:t>			- Wysyła zmiany do zdalnego repozytorium</a:t>
+            </a:r>
+            <a:endParaRPr>
+              <a:solidFill>
+                <a:srgbClr val="000000"/>
+              </a:solidFill>
+              <a:latin typeface="Tahoma"/>
+              <a:ea typeface="Tahoma"/>
+              <a:cs typeface="Tahoma"/>
+              <a:sym typeface="Tahoma"/>
+            </a:endParaRPr>
+          </a:p>
+          <a:p>
+            <a:pPr indent="0" lvl="0" marL="0" rtl="0" algn="l">
+              <a:spcBef>
+                <a:spcPts val="1200"/>
+              </a:spcBef>
+              <a:spcAft>
+                <a:spcPts val="0"/>
+              </a:spcAft>
+              <a:buNone/>
+            </a:pPr>
+            <a:r>
+              <a:rPr b="1" lang="pl">
+                <a:solidFill>
+                  <a:srgbClr val="274E13"/>
+                </a:solidFill>
+                <a:latin typeface="Tahoma"/>
+                <a:ea typeface="Tahoma"/>
+                <a:cs typeface="Tahoma"/>
+                <a:sym typeface="Tahoma"/>
+              </a:rPr>
+              <a:t>git pull </a:t>
+            </a:r>
+            <a:r>
+              <a:rPr lang="pl">
+                <a:solidFill>
+                  <a:srgbClr val="000000"/>
+                </a:solidFill>
+                <a:latin typeface="Tahoma"/>
+                <a:ea typeface="Tahoma"/>
+                <a:cs typeface="Tahoma"/>
+                <a:sym typeface="Tahoma"/>
+              </a:rPr>
+              <a:t>			- Pobiera zmiany z repozytorium zdalnego</a:t>
+            </a:r>
+            <a:endParaRPr>
+              <a:solidFill>
+                <a:srgbClr val="000000"/>
+              </a:solidFill>
+              <a:latin typeface="Tahoma"/>
+              <a:ea typeface="Tahoma"/>
+              <a:cs typeface="Tahoma"/>
+              <a:sym typeface="Tahoma"/>
+            </a:endParaRPr>
+          </a:p>
+          <a:p>
+            <a:pPr indent="0" lvl="0" marL="0" rtl="0" algn="l">
+              <a:spcBef>
+                <a:spcPts val="1200"/>
+              </a:spcBef>
+              <a:spcAft>
+                <a:spcPts val="0"/>
+              </a:spcAft>
+              <a:buNone/>
+            </a:pPr>
+            <a:r>
+              <a:rPr b="1" lang="pl">
+                <a:solidFill>
+                  <a:srgbClr val="274E13"/>
+                </a:solidFill>
+                <a:latin typeface="Tahoma"/>
+                <a:ea typeface="Tahoma"/>
+                <a:cs typeface="Tahoma"/>
+                <a:sym typeface="Tahoma"/>
+              </a:rPr>
+              <a:t>git branch</a:t>
+            </a:r>
+            <a:r>
+              <a:rPr lang="pl">
+                <a:solidFill>
+                  <a:srgbClr val="000000"/>
+                </a:solidFill>
+                <a:latin typeface="Tahoma"/>
+                <a:ea typeface="Tahoma"/>
+                <a:cs typeface="Tahoma"/>
+                <a:sym typeface="Tahoma"/>
+              </a:rPr>
+              <a:t> 			- Wyświetla dostępne gałęzie</a:t>
+            </a:r>
+            <a:endParaRPr>
+              <a:solidFill>
+                <a:srgbClr val="000000"/>
+              </a:solidFill>
+              <a:latin typeface="Tahoma"/>
+              <a:ea typeface="Tahoma"/>
+              <a:cs typeface="Tahoma"/>
+              <a:sym typeface="Tahoma"/>
+            </a:endParaRPr>
+          </a:p>
+          <a:p>
+            <a:pPr indent="0" lvl="0" marL="0" rtl="0" algn="l">
+              <a:spcBef>
+                <a:spcPts val="1200"/>
+              </a:spcBef>
+              <a:spcAft>
+                <a:spcPts val="1200"/>
+              </a:spcAft>
+              <a:buNone/>
+            </a:pPr>
+            <a:r>
+              <a:rPr b="1" lang="pl">
+                <a:solidFill>
+                  <a:srgbClr val="274E13"/>
+                </a:solidFill>
+                <a:latin typeface="Tahoma"/>
+                <a:ea typeface="Tahoma"/>
+                <a:cs typeface="Tahoma"/>
+                <a:sym typeface="Tahoma"/>
+              </a:rPr>
+              <a:t>git checkout &lt;branch&gt; </a:t>
+            </a:r>
+            <a:r>
+              <a:rPr lang="pl">
+                <a:solidFill>
+                  <a:srgbClr val="000000"/>
+                </a:solidFill>
+                <a:latin typeface="Tahoma"/>
+                <a:ea typeface="Tahoma"/>
+                <a:cs typeface="Tahoma"/>
+                <a:sym typeface="Tahoma"/>
+              </a:rPr>
+              <a:t>	- Przełącza się na inną gałąź</a:t>
+            </a:r>
+            <a:endParaRPr>
+              <a:solidFill>
+                <a:srgbClr val="000000"/>
+              </a:solidFill>
+              <a:latin typeface="Tahoma"/>
+              <a:ea typeface="Tahoma"/>
+              <a:cs typeface="Tahoma"/>
+              <a:sym typeface="Tahoma"/>
+            </a:endParaRPr>
+          </a:p>
+        </p:txBody>
+      </p:sp>
+      <p:graphicFrame>
+        <p:nvGraphicFramePr>
+          <p:cNvPr id="274" name="Google Shape;274;p44"/>
+          <p:cNvGraphicFramePr/>
+          <p:nvPr/>
+        </p:nvGraphicFramePr>
+        <p:xfrm>
+          <a:off x="152400" y="152400"/>
+          <a:ext cx="3000000" cy="3000000"/>
+        </p:xfrm>
+        <a:graphic>
+          <a:graphicData uri="http://schemas.openxmlformats.org/drawingml/2006/table">
+            <a:tbl>
+              <a:tblPr>
+                <a:noFill/>
+                <a:tableStyleId>{959B2832-59FD-4D21-8942-453E2F580EFB}</a:tableStyleId>
+              </a:tblPr>
+              <a:tblGrid>
+                <a:gridCol w="561975"/>
+              </a:tblGrid>
+              <a:tr h="171450">
+                <a:tc>
+                  <a:txBody>
+                    <a:bodyPr/>
+                    <a:lstStyle/>
+                    <a:p>
+                      <a:pPr indent="0" lvl="0" marL="0" rtl="0" algn="l">
+                        <a:spcBef>
+                          <a:spcPts val="0"/>
+                        </a:spcBef>
+                        <a:spcAft>
+                          <a:spcPts val="0"/>
+                        </a:spcAft>
+                        <a:buNone/>
+                      </a:pPr>
+                      <a:r>
+                        <a:rPr lang="pl" sz="1100">
+                          <a:solidFill>
+                            <a:srgbClr val="188038"/>
+                          </a:solidFill>
+                          <a:latin typeface="Roboto Mono"/>
+                          <a:ea typeface="Roboto Mono"/>
+                          <a:cs typeface="Roboto Mono"/>
+                          <a:sym typeface="Roboto Mono"/>
+                        </a:rPr>
+                        <a:t>git push</a:t>
+                      </a:r>
+                      <a:endParaRPr sz="1100">
+                        <a:solidFill>
+                          <a:srgbClr val="188038"/>
+                        </a:solidFill>
+                        <a:latin typeface="Roboto Mono"/>
+                        <a:ea typeface="Roboto Mono"/>
+                        <a:cs typeface="Roboto Mono"/>
+                        <a:sym typeface="Roboto Mono"/>
+                      </a:endParaRPr>
+                    </a:p>
+                  </a:txBody>
+                  <a:tcPr marT="91425" marB="91425" marR="91425" marL="91425"/>
+                </a:tc>
+              </a:tr>
+            </a:tbl>
+          </a:graphicData>
+        </a:graphic>
+      </p:graphicFrame>
+      <p:graphicFrame>
+        <p:nvGraphicFramePr>
+          <p:cNvPr id="275" name="Google Shape;275;p44"/>
+          <p:cNvGraphicFramePr/>
+          <p:nvPr/>
+        </p:nvGraphicFramePr>
+        <p:xfrm>
+          <a:off x="304800" y="304800"/>
+          <a:ext cx="3000000" cy="3000000"/>
+        </p:xfrm>
+        <a:graphic>
+          <a:graphicData uri="http://schemas.openxmlformats.org/drawingml/2006/table">
+            <a:tbl>
+              <a:tblPr>
+                <a:noFill/>
+                <a:tableStyleId>{959B2832-59FD-4D21-8942-453E2F580EFB}</a:tableStyleId>
+              </a:tblPr>
+              <a:tblGrid>
+                <a:gridCol w="19050"/>
+              </a:tblGrid>
+              <a:tr h="19050">
+                <a:tc>
+                  <a:txBody>
+                    <a:bodyPr/>
+                    <a:lstStyle/>
+                    <a:p>
+                      <a:pPr indent="0" lvl="0" marL="0" rtl="0" algn="l">
+                        <a:spcBef>
+                          <a:spcPts val="0"/>
+                        </a:spcBef>
+                        <a:spcAft>
+                          <a:spcPts val="0"/>
+                        </a:spcAft>
+                        <a:buNone/>
+                      </a:pPr>
+                      <a:r>
+                        <a:t/>
+                      </a:r>
+                      <a:endParaRPr/>
+                    </a:p>
+                  </a:txBody>
+                  <a:tcPr marT="91425" marB="91425" marR="91425" marL="91425"/>
+                </a:tc>
+              </a:tr>
+            </a:tbl>
+          </a:graphicData>
+        </a:graphic>
+      </p:graphicFrame>
+      <p:graphicFrame>
+        <p:nvGraphicFramePr>
+          <p:cNvPr id="276" name="Google Shape;276;p44"/>
+          <p:cNvGraphicFramePr/>
+          <p:nvPr/>
+        </p:nvGraphicFramePr>
+        <p:xfrm>
+          <a:off x="304800" y="304800"/>
+          <a:ext cx="3000000" cy="3000000"/>
+        </p:xfrm>
+        <a:graphic>
+          <a:graphicData uri="http://schemas.openxmlformats.org/drawingml/2006/table">
+            <a:tbl>
+              <a:tblPr>
+                <a:noFill/>
+                <a:tableStyleId>{959B2832-59FD-4D21-8942-453E2F580EFB}</a:tableStyleId>
+              </a:tblPr>
+              <a:tblGrid>
+                <a:gridCol w="561975"/>
+              </a:tblGrid>
+              <a:tr h="171450">
+                <a:tc>
+                  <a:txBody>
+                    <a:bodyPr/>
+                    <a:lstStyle/>
+                    <a:p>
+                      <a:pPr indent="0" lvl="0" marL="0" rtl="0" algn="l">
+                        <a:spcBef>
+                          <a:spcPts val="0"/>
+                        </a:spcBef>
+                        <a:spcAft>
+                          <a:spcPts val="0"/>
+                        </a:spcAft>
+                        <a:buNone/>
+                      </a:pPr>
+                      <a:r>
+                        <a:rPr lang="pl" sz="1100">
+                          <a:solidFill>
+                            <a:srgbClr val="188038"/>
+                          </a:solidFill>
+                          <a:latin typeface="Roboto Mono"/>
+                          <a:ea typeface="Roboto Mono"/>
+                          <a:cs typeface="Roboto Mono"/>
+                          <a:sym typeface="Roboto Mono"/>
+                        </a:rPr>
+                        <a:t>git push</a:t>
+                      </a:r>
+                      <a:endParaRPr sz="1100">
+                        <a:solidFill>
+                          <a:srgbClr val="188038"/>
+                        </a:solidFill>
+                        <a:latin typeface="Roboto Mono"/>
+                        <a:ea typeface="Roboto Mono"/>
+                        <a:cs typeface="Roboto Mono"/>
+                        <a:sym typeface="Roboto Mono"/>
+                      </a:endParaRPr>
+                    </a:p>
+                  </a:txBody>
+                  <a:tcPr marT="91425" marB="91425" marR="91425" marL="91425"/>
+                </a:tc>
+              </a:tr>
+            </a:tbl>
+          </a:graphicData>
+        </a:graphic>
+      </p:graphicFrame>
+      <p:graphicFrame>
+        <p:nvGraphicFramePr>
+          <p:cNvPr id="277" name="Google Shape;277;p44"/>
+          <p:cNvGraphicFramePr/>
+          <p:nvPr/>
+        </p:nvGraphicFramePr>
+        <p:xfrm>
+          <a:off x="457200" y="457200"/>
+          <a:ext cx="3000000" cy="3000000"/>
+        </p:xfrm>
+        <a:graphic>
+          <a:graphicData uri="http://schemas.openxmlformats.org/drawingml/2006/table">
+            <a:tbl>
+              <a:tblPr>
+                <a:noFill/>
+                <a:tableStyleId>{959B2832-59FD-4D21-8942-453E2F580EFB}</a:tableStyleId>
+              </a:tblPr>
+              <a:tblGrid>
+                <a:gridCol w="19050"/>
+              </a:tblGrid>
+              <a:tr h="19050">
+                <a:tc>
+                  <a:txBody>
+                    <a:bodyPr/>
+                    <a:lstStyle/>
+                    <a:p>
+                      <a:pPr indent="0" lvl="0" marL="0" rtl="0" algn="l">
+                        <a:spcBef>
+                          <a:spcPts val="0"/>
+                        </a:spcBef>
+                        <a:spcAft>
+                          <a:spcPts val="0"/>
+                        </a:spcAft>
+                        <a:buNone/>
+                      </a:pPr>
+                      <a:r>
+                        <a:t/>
+                      </a:r>
+                      <a:endParaRPr/>
+                    </a:p>
+                  </a:txBody>
+                  <a:tcPr marT="91425" marB="91425" marR="91425" marL="91425"/>
+                </a:tc>
+              </a:tr>
+            </a:tbl>
+          </a:graphicData>
+        </a:graphic>
+      </p:graphicFrame>
     </p:spTree>
   </p:cSld>
   <p:clrMapOvr>
@@ -20861,6 +23421,285 @@
 </file>
 
 <file path=ppt/theme/theme1.xml><?xml version="1.0" encoding="utf-8"?>
+<a:theme xmlns:a="http://schemas.openxmlformats.org/drawingml/2006/main" xmlns:r="http://schemas.openxmlformats.org/officeDocument/2006/relationships" name="Streamline">
+  <a:themeElements>
+    <a:clrScheme name="Streamline">
+      <a:dk1>
+        <a:srgbClr val="1A9988"/>
+      </a:dk1>
+      <a:lt1>
+        <a:srgbClr val="FFFFFF"/>
+      </a:lt1>
+      <a:dk2>
+        <a:srgbClr val="1A1A1A"/>
+      </a:dk2>
+      <a:lt2>
+        <a:srgbClr val="E9EDEE"/>
+      </a:lt2>
+      <a:accent1>
+        <a:srgbClr val="595959"/>
+      </a:accent1>
+      <a:accent2>
+        <a:srgbClr val="6AA4C8"/>
+      </a:accent2>
+      <a:accent3>
+        <a:srgbClr val="EB5600"/>
+      </a:accent3>
+      <a:accent4>
+        <a:srgbClr val="A2FFE8"/>
+      </a:accent4>
+      <a:accent5>
+        <a:srgbClr val="1C3678"/>
+      </a:accent5>
+      <a:accent6>
+        <a:srgbClr val="FFB8A2"/>
+      </a:accent6>
+      <a:hlink>
+        <a:srgbClr val="1C3678"/>
+      </a:hlink>
+      <a:folHlink>
+        <a:srgbClr val="1C3678"/>
+      </a:folHlink>
+    </a:clrScheme>
+    <a:fontScheme name="Office">
+      <a:majorFont>
+        <a:latin typeface="Arial"/>
+        <a:ea typeface=""/>
+        <a:cs typeface=""/>
+        <a:font script="Jpan" typeface="ＭＳ Ｐゴシック"/>
+        <a:font script="Hang" typeface="맑은 고딕"/>
+        <a:font script="Hans" typeface="宋体"/>
+        <a:font script="Hant" typeface="新細明體"/>
+        <a:font script="Arab" typeface="Times New Roman"/>
+        <a:font script="Hebr" typeface="Times New Roman"/>
+        <a:font script="Thai" typeface="Angsana New"/>
+        <a:font script="Ethi" typeface="Nyala"/>
+        <a:font script="Beng" typeface="Vrinda"/>
+        <a:font script="Gujr" typeface="Shruti"/>
+        <a:font script="Khmr" typeface="MoolBoran"/>
+        <a:font script="Knda" typeface="Tunga"/>
+        <a:font script="Guru" typeface="Raavi"/>
+        <a:font script="Cans" typeface="Euphemia"/>
+        <a:font script="Cher" typeface="Plantagenet Cherokee"/>
+        <a:font script="Yiii" typeface="Microsoft Yi Baiti"/>
+        <a:font script="Tibt" typeface="Microsoft Himalaya"/>
+        <a:font script="Thaa" typeface="MV Boli"/>
+        <a:font script="Deva" typeface="Mangal"/>
+        <a:font script="Telu" typeface="Gautami"/>
+        <a:font script="Taml" typeface="Latha"/>
+        <a:font script="Syrc" typeface="Estrangelo Edessa"/>
+        <a:font script="Orya" typeface="Kalinga"/>
+        <a:font script="Mlym" typeface="Kartika"/>
+        <a:font script="Laoo" typeface="DokChampa"/>
+        <a:font script="Sinh" typeface="Iskoola Pota"/>
+        <a:font script="Mong" typeface="Mongolian Baiti"/>
+        <a:font script="Viet" typeface="Times New Roman"/>
+        <a:font script="Uigh" typeface="Microsoft Uighur"/>
+        <a:font script="Geor" typeface="Sylfaen"/>
+      </a:majorFont>
+      <a:minorFont>
+        <a:latin typeface="Arial"/>
+        <a:ea typeface=""/>
+        <a:cs typeface=""/>
+        <a:font script="Jpan" typeface="ＭＳ Ｐゴシック"/>
+        <a:font script="Hang" typeface="맑은 고딕"/>
+        <a:font script="Hans" typeface="宋体"/>
+        <a:font script="Hant" typeface="新細明體"/>
+        <a:font script="Arab" typeface="Arial"/>
+        <a:font script="Hebr" typeface="Arial"/>
+        <a:font script="Thai" typeface="Cordia New"/>
+        <a:font script="Ethi" typeface="Nyala"/>
+        <a:font script="Beng" typeface="Vrinda"/>
+        <a:font script="Gujr" typeface="Shruti"/>
+        <a:font script="Khmr" typeface="DaunPenh"/>
+        <a:font script="Knda" typeface="Tunga"/>
+        <a:font script="Guru" typeface="Raavi"/>
+        <a:font script="Cans" typeface="Euphemia"/>
+        <a:font script="Cher" typeface="Plantagenet Cherokee"/>
+        <a:font script="Yiii" typeface="Microsoft Yi Baiti"/>
+        <a:font script="Tibt" typeface="Microsoft Himalaya"/>
+        <a:font script="Thaa" typeface="MV Boli"/>
+        <a:font script="Deva" typeface="Mangal"/>
+        <a:font script="Telu" typeface="Gautami"/>
+        <a:font script="Taml" typeface="Latha"/>
+        <a:font script="Syrc" typeface="Estrangelo Edessa"/>
+        <a:font script="Orya" typeface="Kalinga"/>
+        <a:font script="Mlym" typeface="Kartika"/>
+        <a:font script="Laoo" typeface="DokChampa"/>
+        <a:font script="Sinh" typeface="Iskoola Pota"/>
+        <a:font script="Mong" typeface="Mongolian Baiti"/>
+        <a:font script="Viet" typeface="Arial"/>
+        <a:font script="Uigh" typeface="Microsoft Uighur"/>
+        <a:font script="Geor" typeface="Sylfaen"/>
+      </a:minorFont>
+    </a:fontScheme>
+    <a:fmtScheme name="Office">
+      <a:fillStyleLst>
+        <a:solidFill>
+          <a:schemeClr val="phClr"/>
+        </a:solidFill>
+        <a:gradFill rotWithShape="1">
+          <a:gsLst>
+            <a:gs pos="0">
+              <a:schemeClr val="phClr">
+                <a:tint val="50000"/>
+                <a:satMod val="300000"/>
+              </a:schemeClr>
+            </a:gs>
+            <a:gs pos="35000">
+              <a:schemeClr val="phClr">
+                <a:tint val="37000"/>
+                <a:satMod val="300000"/>
+              </a:schemeClr>
+            </a:gs>
+            <a:gs pos="100000">
+              <a:schemeClr val="phClr">
+                <a:tint val="15000"/>
+                <a:satMod val="350000"/>
+              </a:schemeClr>
+            </a:gs>
+          </a:gsLst>
+          <a:lin ang="16200000" scaled="1"/>
+        </a:gradFill>
+        <a:gradFill rotWithShape="1">
+          <a:gsLst>
+            <a:gs pos="0">
+              <a:schemeClr val="phClr">
+                <a:tint val="100000"/>
+                <a:shade val="100000"/>
+                <a:satMod val="130000"/>
+              </a:schemeClr>
+            </a:gs>
+            <a:gs pos="100000">
+              <a:schemeClr val="phClr">
+                <a:tint val="50000"/>
+                <a:shade val="100000"/>
+                <a:satMod val="350000"/>
+              </a:schemeClr>
+            </a:gs>
+          </a:gsLst>
+          <a:lin ang="16200000" scaled="0"/>
+        </a:gradFill>
+      </a:fillStyleLst>
+      <a:lnStyleLst>
+        <a:ln w="9525" cap="flat" cmpd="sng" algn="ctr">
+          <a:solidFill>
+            <a:schemeClr val="phClr">
+              <a:shade val="95000"/>
+              <a:satMod val="105000"/>
+            </a:schemeClr>
+          </a:solidFill>
+          <a:prstDash val="solid"/>
+        </a:ln>
+        <a:ln w="25400" cap="flat" cmpd="sng" algn="ctr">
+          <a:solidFill>
+            <a:schemeClr val="phClr"/>
+          </a:solidFill>
+          <a:prstDash val="solid"/>
+        </a:ln>
+        <a:ln w="38100" cap="flat" cmpd="sng" algn="ctr">
+          <a:solidFill>
+            <a:schemeClr val="phClr"/>
+          </a:solidFill>
+          <a:prstDash val="solid"/>
+        </a:ln>
+      </a:lnStyleLst>
+      <a:effectStyleLst>
+        <a:effectStyle>
+          <a:effectLst>
+            <a:outerShdw blurRad="40000" dist="20000" dir="5400000" rotWithShape="0">
+              <a:srgbClr val="000000">
+                <a:alpha val="38000"/>
+              </a:srgbClr>
+            </a:outerShdw>
+          </a:effectLst>
+        </a:effectStyle>
+        <a:effectStyle>
+          <a:effectLst>
+            <a:outerShdw blurRad="40000" dist="23000" dir="5400000" rotWithShape="0">
+              <a:srgbClr val="000000">
+                <a:alpha val="35000"/>
+              </a:srgbClr>
+            </a:outerShdw>
+          </a:effectLst>
+        </a:effectStyle>
+        <a:effectStyle>
+          <a:effectLst>
+            <a:outerShdw blurRad="40000" dist="23000" dir="5400000" rotWithShape="0">
+              <a:srgbClr val="000000">
+                <a:alpha val="35000"/>
+              </a:srgbClr>
+            </a:outerShdw>
+          </a:effectLst>
+          <a:scene3d>
+            <a:camera prst="orthographicFront">
+              <a:rot lat="0" lon="0" rev="0"/>
+            </a:camera>
+            <a:lightRig rig="threePt" dir="t">
+              <a:rot lat="0" lon="0" rev="1200000"/>
+            </a:lightRig>
+          </a:scene3d>
+          <a:sp3d>
+            <a:bevelT w="63500" h="25400"/>
+          </a:sp3d>
+        </a:effectStyle>
+      </a:effectStyleLst>
+      <a:bgFillStyleLst>
+        <a:solidFill>
+          <a:schemeClr val="phClr"/>
+        </a:solidFill>
+        <a:gradFill rotWithShape="1">
+          <a:gsLst>
+            <a:gs pos="0">
+              <a:schemeClr val="phClr">
+                <a:tint val="40000"/>
+                <a:satMod val="350000"/>
+              </a:schemeClr>
+            </a:gs>
+            <a:gs pos="40000">
+              <a:schemeClr val="phClr">
+                <a:tint val="45000"/>
+                <a:shade val="99000"/>
+                <a:satMod val="350000"/>
+              </a:schemeClr>
+            </a:gs>
+            <a:gs pos="100000">
+              <a:schemeClr val="phClr">
+                <a:shade val="20000"/>
+                <a:satMod val="255000"/>
+              </a:schemeClr>
+            </a:gs>
+          </a:gsLst>
+          <a:path path="circle">
+            <a:fillToRect l="50000" t="-80000" r="50000" b="180000"/>
+          </a:path>
+        </a:gradFill>
+        <a:gradFill rotWithShape="1">
+          <a:gsLst>
+            <a:gs pos="0">
+              <a:schemeClr val="phClr">
+                <a:tint val="80000"/>
+                <a:satMod val="300000"/>
+              </a:schemeClr>
+            </a:gs>
+            <a:gs pos="100000">
+              <a:schemeClr val="phClr">
+                <a:shade val="30000"/>
+                <a:satMod val="200000"/>
+              </a:schemeClr>
+            </a:gs>
+          </a:gsLst>
+          <a:path path="circle">
+            <a:fillToRect l="50000" t="50000" r="50000" b="50000"/>
+          </a:path>
+        </a:gradFill>
+      </a:bgFillStyleLst>
+    </a:fmtScheme>
+  </a:themeElements>
+</a:theme>
+</file>
+
+<file path=ppt/theme/theme2.xml><?xml version="1.0" encoding="utf-8"?>
 <a:theme xmlns:a="http://schemas.openxmlformats.org/drawingml/2006/main" xmlns:r="http://schemas.openxmlformats.org/officeDocument/2006/relationships">
   <a:themeElements>
     <a:clrScheme name="Default">
@@ -21137,283 +23976,4 @@
     </a:fmtScheme>
   </a:themeElements>
 </a:theme>
-</file>
-
-<file path=ppt/theme/theme2.xml><?xml version="1.0" encoding="utf-8"?>
-<a:theme xmlns:a="http://schemas.openxmlformats.org/drawingml/2006/main" xmlns:r="http://schemas.openxmlformats.org/officeDocument/2006/relationships" name="Streamline">
-  <a:themeElements>
-    <a:clrScheme name="Streamline">
-      <a:dk1>
-        <a:srgbClr val="1A9988"/>
-      </a:dk1>
-      <a:lt1>
-        <a:srgbClr val="FFFFFF"/>
-      </a:lt1>
-      <a:dk2>
-        <a:srgbClr val="1A1A1A"/>
-      </a:dk2>
-      <a:lt2>
-        <a:srgbClr val="E9EDEE"/>
-      </a:lt2>
-      <a:accent1>
-        <a:srgbClr val="595959"/>
-      </a:accent1>
-      <a:accent2>
-        <a:srgbClr val="6AA4C8"/>
-      </a:accent2>
-      <a:accent3>
-        <a:srgbClr val="EB5600"/>
-      </a:accent3>
-      <a:accent4>
-        <a:srgbClr val="A2FFE8"/>
-      </a:accent4>
-      <a:accent5>
-        <a:srgbClr val="1C3678"/>
-      </a:accent5>
-      <a:accent6>
-        <a:srgbClr val="FFB8A2"/>
-      </a:accent6>
-      <a:hlink>
-        <a:srgbClr val="1C3678"/>
-      </a:hlink>
-      <a:folHlink>
-        <a:srgbClr val="1C3678"/>
-      </a:folHlink>
-    </a:clrScheme>
-    <a:fontScheme name="Office">
-      <a:majorFont>
-        <a:latin typeface="Arial"/>
-        <a:ea typeface=""/>
-        <a:cs typeface=""/>
-        <a:font script="Jpan" typeface="ＭＳ Ｐゴシック"/>
-        <a:font script="Hang" typeface="맑은 고딕"/>
-        <a:font script="Hans" typeface="宋体"/>
-        <a:font script="Hant" typeface="新細明體"/>
-        <a:font script="Arab" typeface="Times New Roman"/>
-        <a:font script="Hebr" typeface="Times New Roman"/>
-        <a:font script="Thai" typeface="Angsana New"/>
-        <a:font script="Ethi" typeface="Nyala"/>
-        <a:font script="Beng" typeface="Vrinda"/>
-        <a:font script="Gujr" typeface="Shruti"/>
-        <a:font script="Khmr" typeface="MoolBoran"/>
-        <a:font script="Knda" typeface="Tunga"/>
-        <a:font script="Guru" typeface="Raavi"/>
-        <a:font script="Cans" typeface="Euphemia"/>
-        <a:font script="Cher" typeface="Plantagenet Cherokee"/>
-        <a:font script="Yiii" typeface="Microsoft Yi Baiti"/>
-        <a:font script="Tibt" typeface="Microsoft Himalaya"/>
-        <a:font script="Thaa" typeface="MV Boli"/>
-        <a:font script="Deva" typeface="Mangal"/>
-        <a:font script="Telu" typeface="Gautami"/>
-        <a:font script="Taml" typeface="Latha"/>
-        <a:font script="Syrc" typeface="Estrangelo Edessa"/>
-        <a:font script="Orya" typeface="Kalinga"/>
-        <a:font script="Mlym" typeface="Kartika"/>
-        <a:font script="Laoo" typeface="DokChampa"/>
-        <a:font script="Sinh" typeface="Iskoola Pota"/>
-        <a:font script="Mong" typeface="Mongolian Baiti"/>
-        <a:font script="Viet" typeface="Times New Roman"/>
-        <a:font script="Uigh" typeface="Microsoft Uighur"/>
-        <a:font script="Geor" typeface="Sylfaen"/>
-      </a:majorFont>
-      <a:minorFont>
-        <a:latin typeface="Arial"/>
-        <a:ea typeface=""/>
-        <a:cs typeface=""/>
-        <a:font script="Jpan" typeface="ＭＳ Ｐゴシック"/>
-        <a:font script="Hang" typeface="맑은 고딕"/>
-        <a:font script="Hans" typeface="宋体"/>
-        <a:font script="Hant" typeface="新細明體"/>
-        <a:font script="Arab" typeface="Arial"/>
-        <a:font script="Hebr" typeface="Arial"/>
-        <a:font script="Thai" typeface="Cordia New"/>
-        <a:font script="Ethi" typeface="Nyala"/>
-        <a:font script="Beng" typeface="Vrinda"/>
-        <a:font script="Gujr" typeface="Shruti"/>
-        <a:font script="Khmr" typeface="DaunPenh"/>
-        <a:font script="Knda" typeface="Tunga"/>
-        <a:font script="Guru" typeface="Raavi"/>
-        <a:font script="Cans" typeface="Euphemia"/>
-        <a:font script="Cher" typeface="Plantagenet Cherokee"/>
-        <a:font script="Yiii" typeface="Microsoft Yi Baiti"/>
-        <a:font script="Tibt" typeface="Microsoft Himalaya"/>
-        <a:font script="Thaa" typeface="MV Boli"/>
-        <a:font script="Deva" typeface="Mangal"/>
-        <a:font script="Telu" typeface="Gautami"/>
-        <a:font script="Taml" typeface="Latha"/>
-        <a:font script="Syrc" typeface="Estrangelo Edessa"/>
-        <a:font script="Orya" typeface="Kalinga"/>
-        <a:font script="Mlym" typeface="Kartika"/>
-        <a:font script="Laoo" typeface="DokChampa"/>
-        <a:font script="Sinh" typeface="Iskoola Pota"/>
-        <a:font script="Mong" typeface="Mongolian Baiti"/>
-        <a:font script="Viet" typeface="Arial"/>
-        <a:font script="Uigh" typeface="Microsoft Uighur"/>
-        <a:font script="Geor" typeface="Sylfaen"/>
-      </a:minorFont>
-    </a:fontScheme>
-    <a:fmtScheme name="Office">
-      <a:fillStyleLst>
-        <a:solidFill>
-          <a:schemeClr val="phClr"/>
-        </a:solidFill>
-        <a:gradFill rotWithShape="1">
-          <a:gsLst>
-            <a:gs pos="0">
-              <a:schemeClr val="phClr">
-                <a:tint val="50000"/>
-                <a:satMod val="300000"/>
-              </a:schemeClr>
-            </a:gs>
-            <a:gs pos="35000">
-              <a:schemeClr val="phClr">
-                <a:tint val="37000"/>
-                <a:satMod val="300000"/>
-              </a:schemeClr>
-            </a:gs>
-            <a:gs pos="100000">
-              <a:schemeClr val="phClr">
-                <a:tint val="15000"/>
-                <a:satMod val="350000"/>
-              </a:schemeClr>
-            </a:gs>
-          </a:gsLst>
-          <a:lin ang="16200000" scaled="1"/>
-        </a:gradFill>
-        <a:gradFill rotWithShape="1">
-          <a:gsLst>
-            <a:gs pos="0">
-              <a:schemeClr val="phClr">
-                <a:tint val="100000"/>
-                <a:shade val="100000"/>
-                <a:satMod val="130000"/>
-              </a:schemeClr>
-            </a:gs>
-            <a:gs pos="100000">
-              <a:schemeClr val="phClr">
-                <a:tint val="50000"/>
-                <a:shade val="100000"/>
-                <a:satMod val="350000"/>
-              </a:schemeClr>
-            </a:gs>
-          </a:gsLst>
-          <a:lin ang="16200000" scaled="0"/>
-        </a:gradFill>
-      </a:fillStyleLst>
-      <a:lnStyleLst>
-        <a:ln w="9525" cap="flat" cmpd="sng" algn="ctr">
-          <a:solidFill>
-            <a:schemeClr val="phClr">
-              <a:shade val="95000"/>
-              <a:satMod val="105000"/>
-            </a:schemeClr>
-          </a:solidFill>
-          <a:prstDash val="solid"/>
-        </a:ln>
-        <a:ln w="25400" cap="flat" cmpd="sng" algn="ctr">
-          <a:solidFill>
-            <a:schemeClr val="phClr"/>
-          </a:solidFill>
-          <a:prstDash val="solid"/>
-        </a:ln>
-        <a:ln w="38100" cap="flat" cmpd="sng" algn="ctr">
-          <a:solidFill>
-            <a:schemeClr val="phClr"/>
-          </a:solidFill>
-          <a:prstDash val="solid"/>
-        </a:ln>
-      </a:lnStyleLst>
-      <a:effectStyleLst>
-        <a:effectStyle>
-          <a:effectLst>
-            <a:outerShdw blurRad="40000" dist="20000" dir="5400000" rotWithShape="0">
-              <a:srgbClr val="000000">
-                <a:alpha val="38000"/>
-              </a:srgbClr>
-            </a:outerShdw>
-          </a:effectLst>
-        </a:effectStyle>
-        <a:effectStyle>
-          <a:effectLst>
-            <a:outerShdw blurRad="40000" dist="23000" dir="5400000" rotWithShape="0">
-              <a:srgbClr val="000000">
-                <a:alpha val="35000"/>
-              </a:srgbClr>
-            </a:outerShdw>
-          </a:effectLst>
-        </a:effectStyle>
-        <a:effectStyle>
-          <a:effectLst>
-            <a:outerShdw blurRad="40000" dist="23000" dir="5400000" rotWithShape="0">
-              <a:srgbClr val="000000">
-                <a:alpha val="35000"/>
-              </a:srgbClr>
-            </a:outerShdw>
-          </a:effectLst>
-          <a:scene3d>
-            <a:camera prst="orthographicFront">
-              <a:rot lat="0" lon="0" rev="0"/>
-            </a:camera>
-            <a:lightRig rig="threePt" dir="t">
-              <a:rot lat="0" lon="0" rev="1200000"/>
-            </a:lightRig>
-          </a:scene3d>
-          <a:sp3d>
-            <a:bevelT w="63500" h="25400"/>
-          </a:sp3d>
-        </a:effectStyle>
-      </a:effectStyleLst>
-      <a:bgFillStyleLst>
-        <a:solidFill>
-          <a:schemeClr val="phClr"/>
-        </a:solidFill>
-        <a:gradFill rotWithShape="1">
-          <a:gsLst>
-            <a:gs pos="0">
-              <a:schemeClr val="phClr">
-                <a:tint val="40000"/>
-                <a:satMod val="350000"/>
-              </a:schemeClr>
-            </a:gs>
-            <a:gs pos="40000">
-              <a:schemeClr val="phClr">
-                <a:tint val="45000"/>
-                <a:shade val="99000"/>
-                <a:satMod val="350000"/>
-              </a:schemeClr>
-            </a:gs>
-            <a:gs pos="100000">
-              <a:schemeClr val="phClr">
-                <a:shade val="20000"/>
-                <a:satMod val="255000"/>
-              </a:schemeClr>
-            </a:gs>
-          </a:gsLst>
-          <a:path path="circle">
-            <a:fillToRect l="50000" t="-80000" r="50000" b="180000"/>
-          </a:path>
-        </a:gradFill>
-        <a:gradFill rotWithShape="1">
-          <a:gsLst>
-            <a:gs pos="0">
-              <a:schemeClr val="phClr">
-                <a:tint val="80000"/>
-                <a:satMod val="300000"/>
-              </a:schemeClr>
-            </a:gs>
-            <a:gs pos="100000">
-              <a:schemeClr val="phClr">
-                <a:shade val="30000"/>
-                <a:satMod val="200000"/>
-              </a:schemeClr>
-            </a:gs>
-          </a:gsLst>
-          <a:path path="circle">
-            <a:fillToRect l="50000" t="50000" r="50000" b="50000"/>
-          </a:path>
-        </a:gradFill>
-      </a:bgFillStyleLst>
-    </a:fmtScheme>
-  </a:themeElements>
-</a:theme>
 </file>
</xml_diff>

<commit_message>
[feat] - Zastosowanie info
</commit_message>
<xml_diff>
--- a/ZASTOSOWANIE_INFORMATYKI/1A-gr_2/Zastosowanie informatyki - 1A gr. 2-plik2.pptx
+++ b/ZASTOSOWANIE_INFORMATYKI/1A-gr_2/Zastosowanie informatyki - 1A gr. 2-plik2.pptx
@@ -71,35 +71,43 @@
     <p:sldId id="316" r:id="rId67"/>
     <p:sldId id="317" r:id="rId68"/>
     <p:sldId id="318" r:id="rId69"/>
+    <p:sldId id="319" r:id="rId70"/>
+    <p:sldId id="320" r:id="rId71"/>
+    <p:sldId id="321" r:id="rId72"/>
+    <p:sldId id="322" r:id="rId73"/>
+    <p:sldId id="323" r:id="rId74"/>
+    <p:sldId id="324" r:id="rId75"/>
+    <p:sldId id="325" r:id="rId76"/>
+    <p:sldId id="326" r:id="rId77"/>
   </p:sldIdLst>
   <p:sldSz cy="5143500" cx="9144000"/>
   <p:notesSz cx="6858000" cy="9144000"/>
   <p:embeddedFontLst>
     <p:embeddedFont>
       <p:font typeface="Raleway"/>
-      <p:regular r:id="rId70"/>
-      <p:bold r:id="rId71"/>
-      <p:italic r:id="rId72"/>
-      <p:boldItalic r:id="rId73"/>
+      <p:regular r:id="rId78"/>
+      <p:bold r:id="rId79"/>
+      <p:italic r:id="rId80"/>
+      <p:boldItalic r:id="rId81"/>
     </p:embeddedFont>
     <p:embeddedFont>
       <p:font typeface="Lato"/>
-      <p:regular r:id="rId74"/>
-      <p:bold r:id="rId75"/>
-      <p:italic r:id="rId76"/>
-      <p:boldItalic r:id="rId77"/>
+      <p:regular r:id="rId82"/>
+      <p:bold r:id="rId83"/>
+      <p:italic r:id="rId84"/>
+      <p:boldItalic r:id="rId85"/>
     </p:embeddedFont>
     <p:embeddedFont>
       <p:font typeface="Tahoma"/>
-      <p:regular r:id="rId78"/>
-      <p:bold r:id="rId79"/>
+      <p:regular r:id="rId86"/>
+      <p:bold r:id="rId87"/>
     </p:embeddedFont>
     <p:embeddedFont>
       <p:font typeface="Roboto Mono"/>
-      <p:regular r:id="rId80"/>
-      <p:bold r:id="rId81"/>
-      <p:italic r:id="rId82"/>
-      <p:boldItalic r:id="rId83"/>
+      <p:regular r:id="rId88"/>
+      <p:bold r:id="rId89"/>
+      <p:italic r:id="rId90"/>
+      <p:boldItalic r:id="rId91"/>
     </p:embeddedFont>
   </p:embeddedFontLst>
   <p:defaultTextStyle>
@@ -6716,6 +6724,600 @@
 </p:notes>
 </file>
 
+<file path=ppt/notesSlides/notesSlide64.xml><?xml version="1.0" encoding="utf-8"?>
+<p:notes xmlns:a="http://schemas.openxmlformats.org/drawingml/2006/main" xmlns:r="http://schemas.openxmlformats.org/officeDocument/2006/relationships" xmlns:mc="http://schemas.openxmlformats.org/markup-compatibility/2006" xmlns:mv="urn:schemas-microsoft-com:mac:vml" xmlns:p="http://schemas.openxmlformats.org/presentationml/2006/main" xmlns:c="http://schemas.openxmlformats.org/drawingml/2006/chart" xmlns:dgm="http://schemas.openxmlformats.org/drawingml/2006/diagram" xmlns:o="urn:schemas-microsoft-com:office:office" xmlns:v="urn:schemas-microsoft-com:vml" xmlns:pvml="urn:schemas-microsoft-com:office:powerpoint" xmlns:com="http://schemas.openxmlformats.org/drawingml/2006/compatibility" xmlns:p14="http://schemas.microsoft.com/office/powerpoint/2010/main" xmlns:p15="http://schemas.microsoft.com/office/powerpoint/2012/main" xmlns:ahyp="http://schemas.microsoft.com/office/drawing/2018/hyperlinkcolor" showMasterPhAnim="0" showMasterSp="0">
+  <p:cSld>
+    <p:spTree>
+      <p:nvGrpSpPr>
+        <p:cNvPr id="464" name="Shape 464"/>
+        <p:cNvGrpSpPr/>
+        <p:nvPr/>
+      </p:nvGrpSpPr>
+      <p:grpSpPr>
+        <a:xfrm>
+          <a:off x="0" y="0"/>
+          <a:ext cx="0" cy="0"/>
+          <a:chOff x="0" y="0"/>
+          <a:chExt cx="0" cy="0"/>
+        </a:xfrm>
+      </p:grpSpPr>
+      <p:sp>
+        <p:nvSpPr>
+          <p:cNvPr id="465" name="Google Shape;465;g3915c974913_0_0:notes"/>
+          <p:cNvSpPr/>
+          <p:nvPr>
+            <p:ph idx="2" type="sldImg"/>
+          </p:nvPr>
+        </p:nvSpPr>
+        <p:spPr>
+          <a:xfrm>
+            <a:off x="381300" y="685800"/>
+            <a:ext cx="6096000" cy="3429000"/>
+          </a:xfrm>
+          <a:custGeom>
+            <a:rect b="b" l="l" r="r" t="t"/>
+            <a:pathLst>
+              <a:path extrusionOk="0" h="120000" w="120000">
+                <a:moveTo>
+                  <a:pt x="0" y="0"/>
+                </a:moveTo>
+                <a:lnTo>
+                  <a:pt x="120000" y="0"/>
+                </a:lnTo>
+                <a:lnTo>
+                  <a:pt x="120000" y="120000"/>
+                </a:lnTo>
+                <a:lnTo>
+                  <a:pt x="0" y="120000"/>
+                </a:lnTo>
+                <a:close/>
+              </a:path>
+            </a:pathLst>
+          </a:custGeom>
+        </p:spPr>
+      </p:sp>
+      <p:sp>
+        <p:nvSpPr>
+          <p:cNvPr id="466" name="Google Shape;466;g3915c974913_0_0:notes"/>
+          <p:cNvSpPr txBox="1"/>
+          <p:nvPr>
+            <p:ph idx="1" type="body"/>
+          </p:nvPr>
+        </p:nvSpPr>
+        <p:spPr>
+          <a:xfrm>
+            <a:off x="685800" y="4343400"/>
+            <a:ext cx="5486400" cy="4114800"/>
+          </a:xfrm>
+          <a:prstGeom prst="rect">
+            <a:avLst/>
+          </a:prstGeom>
+        </p:spPr>
+        <p:txBody>
+          <a:bodyPr anchorCtr="0" anchor="t" bIns="91425" lIns="91425" spcFirstLastPara="1" rIns="91425" wrap="square" tIns="91425">
+            <a:noAutofit/>
+          </a:bodyPr>
+          <a:lstStyle/>
+          <a:p>
+            <a:pPr indent="0" lvl="0" marL="0" rtl="0" algn="l">
+              <a:spcBef>
+                <a:spcPts val="0"/>
+              </a:spcBef>
+              <a:spcAft>
+                <a:spcPts val="0"/>
+              </a:spcAft>
+              <a:buNone/>
+            </a:pPr>
+            <a:r>
+              <a:t/>
+            </a:r>
+            <a:endParaRPr/>
+          </a:p>
+        </p:txBody>
+      </p:sp>
+    </p:spTree>
+  </p:cSld>
+  <p:clrMapOvr>
+    <a:masterClrMapping/>
+  </p:clrMapOvr>
+</p:notes>
+</file>
+
+<file path=ppt/notesSlides/notesSlide65.xml><?xml version="1.0" encoding="utf-8"?>
+<p:notes xmlns:a="http://schemas.openxmlformats.org/drawingml/2006/main" xmlns:r="http://schemas.openxmlformats.org/officeDocument/2006/relationships" xmlns:mc="http://schemas.openxmlformats.org/markup-compatibility/2006" xmlns:mv="urn:schemas-microsoft-com:mac:vml" xmlns:p="http://schemas.openxmlformats.org/presentationml/2006/main" xmlns:c="http://schemas.openxmlformats.org/drawingml/2006/chart" xmlns:dgm="http://schemas.openxmlformats.org/drawingml/2006/diagram" xmlns:o="urn:schemas-microsoft-com:office:office" xmlns:v="urn:schemas-microsoft-com:vml" xmlns:pvml="urn:schemas-microsoft-com:office:powerpoint" xmlns:com="http://schemas.openxmlformats.org/drawingml/2006/compatibility" xmlns:p14="http://schemas.microsoft.com/office/powerpoint/2010/main" xmlns:p15="http://schemas.microsoft.com/office/powerpoint/2012/main" xmlns:ahyp="http://schemas.microsoft.com/office/drawing/2018/hyperlinkcolor" showMasterPhAnim="0" showMasterSp="0">
+  <p:cSld>
+    <p:spTree>
+      <p:nvGrpSpPr>
+        <p:cNvPr id="470" name="Shape 470"/>
+        <p:cNvGrpSpPr/>
+        <p:nvPr/>
+      </p:nvGrpSpPr>
+      <p:grpSpPr>
+        <a:xfrm>
+          <a:off x="0" y="0"/>
+          <a:ext cx="0" cy="0"/>
+          <a:chOff x="0" y="0"/>
+          <a:chExt cx="0" cy="0"/>
+        </a:xfrm>
+      </p:grpSpPr>
+      <p:sp>
+        <p:nvSpPr>
+          <p:cNvPr id="471" name="Google Shape;471;g3915c974913_0_6:notes"/>
+          <p:cNvSpPr/>
+          <p:nvPr>
+            <p:ph idx="2" type="sldImg"/>
+          </p:nvPr>
+        </p:nvSpPr>
+        <p:spPr>
+          <a:xfrm>
+            <a:off x="381300" y="685800"/>
+            <a:ext cx="6096000" cy="3429000"/>
+          </a:xfrm>
+          <a:custGeom>
+            <a:rect b="b" l="l" r="r" t="t"/>
+            <a:pathLst>
+              <a:path extrusionOk="0" h="120000" w="120000">
+                <a:moveTo>
+                  <a:pt x="0" y="0"/>
+                </a:moveTo>
+                <a:lnTo>
+                  <a:pt x="120000" y="0"/>
+                </a:lnTo>
+                <a:lnTo>
+                  <a:pt x="120000" y="120000"/>
+                </a:lnTo>
+                <a:lnTo>
+                  <a:pt x="0" y="120000"/>
+                </a:lnTo>
+                <a:close/>
+              </a:path>
+            </a:pathLst>
+          </a:custGeom>
+        </p:spPr>
+      </p:sp>
+      <p:sp>
+        <p:nvSpPr>
+          <p:cNvPr id="472" name="Google Shape;472;g3915c974913_0_6:notes"/>
+          <p:cNvSpPr txBox="1"/>
+          <p:nvPr>
+            <p:ph idx="1" type="body"/>
+          </p:nvPr>
+        </p:nvSpPr>
+        <p:spPr>
+          <a:xfrm>
+            <a:off x="685800" y="4343400"/>
+            <a:ext cx="5486400" cy="4114800"/>
+          </a:xfrm>
+          <a:prstGeom prst="rect">
+            <a:avLst/>
+          </a:prstGeom>
+        </p:spPr>
+        <p:txBody>
+          <a:bodyPr anchorCtr="0" anchor="t" bIns="91425" lIns="91425" spcFirstLastPara="1" rIns="91425" wrap="square" tIns="91425">
+            <a:noAutofit/>
+          </a:bodyPr>
+          <a:lstStyle/>
+          <a:p>
+            <a:pPr indent="0" lvl="0" marL="0" rtl="0" algn="l">
+              <a:spcBef>
+                <a:spcPts val="0"/>
+              </a:spcBef>
+              <a:spcAft>
+                <a:spcPts val="0"/>
+              </a:spcAft>
+              <a:buNone/>
+            </a:pPr>
+            <a:r>
+              <a:t/>
+            </a:r>
+            <a:endParaRPr/>
+          </a:p>
+        </p:txBody>
+      </p:sp>
+    </p:spTree>
+  </p:cSld>
+  <p:clrMapOvr>
+    <a:masterClrMapping/>
+  </p:clrMapOvr>
+</p:notes>
+</file>
+
+<file path=ppt/notesSlides/notesSlide66.xml><?xml version="1.0" encoding="utf-8"?>
+<p:notes xmlns:a="http://schemas.openxmlformats.org/drawingml/2006/main" xmlns:r="http://schemas.openxmlformats.org/officeDocument/2006/relationships" xmlns:mc="http://schemas.openxmlformats.org/markup-compatibility/2006" xmlns:mv="urn:schemas-microsoft-com:mac:vml" xmlns:p="http://schemas.openxmlformats.org/presentationml/2006/main" xmlns:c="http://schemas.openxmlformats.org/drawingml/2006/chart" xmlns:dgm="http://schemas.openxmlformats.org/drawingml/2006/diagram" xmlns:o="urn:schemas-microsoft-com:office:office" xmlns:v="urn:schemas-microsoft-com:vml" xmlns:pvml="urn:schemas-microsoft-com:office:powerpoint" xmlns:com="http://schemas.openxmlformats.org/drawingml/2006/compatibility" xmlns:p14="http://schemas.microsoft.com/office/powerpoint/2010/main" xmlns:p15="http://schemas.microsoft.com/office/powerpoint/2012/main" xmlns:ahyp="http://schemas.microsoft.com/office/drawing/2018/hyperlinkcolor" showMasterPhAnim="0" showMasterSp="0">
+  <p:cSld>
+    <p:spTree>
+      <p:nvGrpSpPr>
+        <p:cNvPr id="476" name="Shape 476"/>
+        <p:cNvGrpSpPr/>
+        <p:nvPr/>
+      </p:nvGrpSpPr>
+      <p:grpSpPr>
+        <a:xfrm>
+          <a:off x="0" y="0"/>
+          <a:ext cx="0" cy="0"/>
+          <a:chOff x="0" y="0"/>
+          <a:chExt cx="0" cy="0"/>
+        </a:xfrm>
+      </p:grpSpPr>
+      <p:sp>
+        <p:nvSpPr>
+          <p:cNvPr id="477" name="Google Shape;477;g3915c974913_0_13:notes"/>
+          <p:cNvSpPr/>
+          <p:nvPr>
+            <p:ph idx="2" type="sldImg"/>
+          </p:nvPr>
+        </p:nvSpPr>
+        <p:spPr>
+          <a:xfrm>
+            <a:off x="381300" y="685800"/>
+            <a:ext cx="6096000" cy="3429000"/>
+          </a:xfrm>
+          <a:custGeom>
+            <a:rect b="b" l="l" r="r" t="t"/>
+            <a:pathLst>
+              <a:path extrusionOk="0" h="120000" w="120000">
+                <a:moveTo>
+                  <a:pt x="0" y="0"/>
+                </a:moveTo>
+                <a:lnTo>
+                  <a:pt x="120000" y="0"/>
+                </a:lnTo>
+                <a:lnTo>
+                  <a:pt x="120000" y="120000"/>
+                </a:lnTo>
+                <a:lnTo>
+                  <a:pt x="0" y="120000"/>
+                </a:lnTo>
+                <a:close/>
+              </a:path>
+            </a:pathLst>
+          </a:custGeom>
+        </p:spPr>
+      </p:sp>
+      <p:sp>
+        <p:nvSpPr>
+          <p:cNvPr id="478" name="Google Shape;478;g3915c974913_0_13:notes"/>
+          <p:cNvSpPr txBox="1"/>
+          <p:nvPr>
+            <p:ph idx="1" type="body"/>
+          </p:nvPr>
+        </p:nvSpPr>
+        <p:spPr>
+          <a:xfrm>
+            <a:off x="685800" y="4343400"/>
+            <a:ext cx="5486400" cy="4114800"/>
+          </a:xfrm>
+          <a:prstGeom prst="rect">
+            <a:avLst/>
+          </a:prstGeom>
+        </p:spPr>
+        <p:txBody>
+          <a:bodyPr anchorCtr="0" anchor="t" bIns="91425" lIns="91425" spcFirstLastPara="1" rIns="91425" wrap="square" tIns="91425">
+            <a:noAutofit/>
+          </a:bodyPr>
+          <a:lstStyle/>
+          <a:p>
+            <a:pPr indent="0" lvl="0" marL="0" rtl="0" algn="l">
+              <a:spcBef>
+                <a:spcPts val="0"/>
+              </a:spcBef>
+              <a:spcAft>
+                <a:spcPts val="0"/>
+              </a:spcAft>
+              <a:buNone/>
+            </a:pPr>
+            <a:r>
+              <a:t/>
+            </a:r>
+            <a:endParaRPr/>
+          </a:p>
+        </p:txBody>
+      </p:sp>
+    </p:spTree>
+  </p:cSld>
+  <p:clrMapOvr>
+    <a:masterClrMapping/>
+  </p:clrMapOvr>
+</p:notes>
+</file>
+
+<file path=ppt/notesSlides/notesSlide67.xml><?xml version="1.0" encoding="utf-8"?>
+<p:notes xmlns:a="http://schemas.openxmlformats.org/drawingml/2006/main" xmlns:r="http://schemas.openxmlformats.org/officeDocument/2006/relationships" xmlns:mc="http://schemas.openxmlformats.org/markup-compatibility/2006" xmlns:mv="urn:schemas-microsoft-com:mac:vml" xmlns:p="http://schemas.openxmlformats.org/presentationml/2006/main" xmlns:c="http://schemas.openxmlformats.org/drawingml/2006/chart" xmlns:dgm="http://schemas.openxmlformats.org/drawingml/2006/diagram" xmlns:o="urn:schemas-microsoft-com:office:office" xmlns:v="urn:schemas-microsoft-com:vml" xmlns:pvml="urn:schemas-microsoft-com:office:powerpoint" xmlns:com="http://schemas.openxmlformats.org/drawingml/2006/compatibility" xmlns:p14="http://schemas.microsoft.com/office/powerpoint/2010/main" xmlns:p15="http://schemas.microsoft.com/office/powerpoint/2012/main" xmlns:ahyp="http://schemas.microsoft.com/office/drawing/2018/hyperlinkcolor" showMasterPhAnim="0" showMasterSp="0">
+  <p:cSld>
+    <p:spTree>
+      <p:nvGrpSpPr>
+        <p:cNvPr id="482" name="Shape 482"/>
+        <p:cNvGrpSpPr/>
+        <p:nvPr/>
+      </p:nvGrpSpPr>
+      <p:grpSpPr>
+        <a:xfrm>
+          <a:off x="0" y="0"/>
+          <a:ext cx="0" cy="0"/>
+          <a:chOff x="0" y="0"/>
+          <a:chExt cx="0" cy="0"/>
+        </a:xfrm>
+      </p:grpSpPr>
+      <p:sp>
+        <p:nvSpPr>
+          <p:cNvPr id="483" name="Google Shape;483;g3915c974913_0_40:notes"/>
+          <p:cNvSpPr/>
+          <p:nvPr>
+            <p:ph idx="2" type="sldImg"/>
+          </p:nvPr>
+        </p:nvSpPr>
+        <p:spPr>
+          <a:xfrm>
+            <a:off x="381300" y="685800"/>
+            <a:ext cx="6096000" cy="3429000"/>
+          </a:xfrm>
+          <a:custGeom>
+            <a:rect b="b" l="l" r="r" t="t"/>
+            <a:pathLst>
+              <a:path extrusionOk="0" h="120000" w="120000">
+                <a:moveTo>
+                  <a:pt x="0" y="0"/>
+                </a:moveTo>
+                <a:lnTo>
+                  <a:pt x="120000" y="0"/>
+                </a:lnTo>
+                <a:lnTo>
+                  <a:pt x="120000" y="120000"/>
+                </a:lnTo>
+                <a:lnTo>
+                  <a:pt x="0" y="120000"/>
+                </a:lnTo>
+                <a:close/>
+              </a:path>
+            </a:pathLst>
+          </a:custGeom>
+        </p:spPr>
+      </p:sp>
+      <p:sp>
+        <p:nvSpPr>
+          <p:cNvPr id="484" name="Google Shape;484;g3915c974913_0_40:notes"/>
+          <p:cNvSpPr txBox="1"/>
+          <p:nvPr>
+            <p:ph idx="1" type="body"/>
+          </p:nvPr>
+        </p:nvSpPr>
+        <p:spPr>
+          <a:xfrm>
+            <a:off x="685800" y="4343400"/>
+            <a:ext cx="5486400" cy="4114800"/>
+          </a:xfrm>
+          <a:prstGeom prst="rect">
+            <a:avLst/>
+          </a:prstGeom>
+        </p:spPr>
+        <p:txBody>
+          <a:bodyPr anchorCtr="0" anchor="t" bIns="91425" lIns="91425" spcFirstLastPara="1" rIns="91425" wrap="square" tIns="91425">
+            <a:noAutofit/>
+          </a:bodyPr>
+          <a:lstStyle/>
+          <a:p>
+            <a:pPr indent="0" lvl="0" marL="0" rtl="0" algn="l">
+              <a:spcBef>
+                <a:spcPts val="0"/>
+              </a:spcBef>
+              <a:spcAft>
+                <a:spcPts val="0"/>
+              </a:spcAft>
+              <a:buNone/>
+            </a:pPr>
+            <a:r>
+              <a:t/>
+            </a:r>
+            <a:endParaRPr/>
+          </a:p>
+        </p:txBody>
+      </p:sp>
+    </p:spTree>
+  </p:cSld>
+  <p:clrMapOvr>
+    <a:masterClrMapping/>
+  </p:clrMapOvr>
+</p:notes>
+</file>
+
+<file path=ppt/notesSlides/notesSlide68.xml><?xml version="1.0" encoding="utf-8"?>
+<p:notes xmlns:a="http://schemas.openxmlformats.org/drawingml/2006/main" xmlns:r="http://schemas.openxmlformats.org/officeDocument/2006/relationships" xmlns:mc="http://schemas.openxmlformats.org/markup-compatibility/2006" xmlns:mv="urn:schemas-microsoft-com:mac:vml" xmlns:p="http://schemas.openxmlformats.org/presentationml/2006/main" xmlns:c="http://schemas.openxmlformats.org/drawingml/2006/chart" xmlns:dgm="http://schemas.openxmlformats.org/drawingml/2006/diagram" xmlns:o="urn:schemas-microsoft-com:office:office" xmlns:v="urn:schemas-microsoft-com:vml" xmlns:pvml="urn:schemas-microsoft-com:office:powerpoint" xmlns:com="http://schemas.openxmlformats.org/drawingml/2006/compatibility" xmlns:p14="http://schemas.microsoft.com/office/powerpoint/2010/main" xmlns:p15="http://schemas.microsoft.com/office/powerpoint/2012/main" xmlns:ahyp="http://schemas.microsoft.com/office/drawing/2018/hyperlinkcolor" showMasterPhAnim="0" showMasterSp="0">
+  <p:cSld>
+    <p:spTree>
+      <p:nvGrpSpPr>
+        <p:cNvPr id="488" name="Shape 488"/>
+        <p:cNvGrpSpPr/>
+        <p:nvPr/>
+      </p:nvGrpSpPr>
+      <p:grpSpPr>
+        <a:xfrm>
+          <a:off x="0" y="0"/>
+          <a:ext cx="0" cy="0"/>
+          <a:chOff x="0" y="0"/>
+          <a:chExt cx="0" cy="0"/>
+        </a:xfrm>
+      </p:grpSpPr>
+      <p:sp>
+        <p:nvSpPr>
+          <p:cNvPr id="489" name="Google Shape;489;g3915c974913_0_19:notes"/>
+          <p:cNvSpPr/>
+          <p:nvPr>
+            <p:ph idx="2" type="sldImg"/>
+          </p:nvPr>
+        </p:nvSpPr>
+        <p:spPr>
+          <a:xfrm>
+            <a:off x="381300" y="685800"/>
+            <a:ext cx="6096000" cy="3429000"/>
+          </a:xfrm>
+          <a:custGeom>
+            <a:rect b="b" l="l" r="r" t="t"/>
+            <a:pathLst>
+              <a:path extrusionOk="0" h="120000" w="120000">
+                <a:moveTo>
+                  <a:pt x="0" y="0"/>
+                </a:moveTo>
+                <a:lnTo>
+                  <a:pt x="120000" y="0"/>
+                </a:lnTo>
+                <a:lnTo>
+                  <a:pt x="120000" y="120000"/>
+                </a:lnTo>
+                <a:lnTo>
+                  <a:pt x="0" y="120000"/>
+                </a:lnTo>
+                <a:close/>
+              </a:path>
+            </a:pathLst>
+          </a:custGeom>
+        </p:spPr>
+      </p:sp>
+      <p:sp>
+        <p:nvSpPr>
+          <p:cNvPr id="490" name="Google Shape;490;g3915c974913_0_19:notes"/>
+          <p:cNvSpPr txBox="1"/>
+          <p:nvPr>
+            <p:ph idx="1" type="body"/>
+          </p:nvPr>
+        </p:nvSpPr>
+        <p:spPr>
+          <a:xfrm>
+            <a:off x="685800" y="4343400"/>
+            <a:ext cx="5486400" cy="4114800"/>
+          </a:xfrm>
+          <a:prstGeom prst="rect">
+            <a:avLst/>
+          </a:prstGeom>
+        </p:spPr>
+        <p:txBody>
+          <a:bodyPr anchorCtr="0" anchor="t" bIns="91425" lIns="91425" spcFirstLastPara="1" rIns="91425" wrap="square" tIns="91425">
+            <a:noAutofit/>
+          </a:bodyPr>
+          <a:lstStyle/>
+          <a:p>
+            <a:pPr indent="0" lvl="0" marL="0" rtl="0" algn="l">
+              <a:spcBef>
+                <a:spcPts val="0"/>
+              </a:spcBef>
+              <a:spcAft>
+                <a:spcPts val="0"/>
+              </a:spcAft>
+              <a:buNone/>
+            </a:pPr>
+            <a:r>
+              <a:t/>
+            </a:r>
+            <a:endParaRPr/>
+          </a:p>
+        </p:txBody>
+      </p:sp>
+    </p:spTree>
+  </p:cSld>
+  <p:clrMapOvr>
+    <a:masterClrMapping/>
+  </p:clrMapOvr>
+</p:notes>
+</file>
+
+<file path=ppt/notesSlides/notesSlide69.xml><?xml version="1.0" encoding="utf-8"?>
+<p:notes xmlns:a="http://schemas.openxmlformats.org/drawingml/2006/main" xmlns:r="http://schemas.openxmlformats.org/officeDocument/2006/relationships" xmlns:mc="http://schemas.openxmlformats.org/markup-compatibility/2006" xmlns:mv="urn:schemas-microsoft-com:mac:vml" xmlns:p="http://schemas.openxmlformats.org/presentationml/2006/main" xmlns:c="http://schemas.openxmlformats.org/drawingml/2006/chart" xmlns:dgm="http://schemas.openxmlformats.org/drawingml/2006/diagram" xmlns:o="urn:schemas-microsoft-com:office:office" xmlns:v="urn:schemas-microsoft-com:vml" xmlns:pvml="urn:schemas-microsoft-com:office:powerpoint" xmlns:com="http://schemas.openxmlformats.org/drawingml/2006/compatibility" xmlns:p14="http://schemas.microsoft.com/office/powerpoint/2010/main" xmlns:p15="http://schemas.microsoft.com/office/powerpoint/2012/main" xmlns:ahyp="http://schemas.microsoft.com/office/drawing/2018/hyperlinkcolor" showMasterPhAnim="0" showMasterSp="0">
+  <p:cSld>
+    <p:spTree>
+      <p:nvGrpSpPr>
+        <p:cNvPr id="494" name="Shape 494"/>
+        <p:cNvGrpSpPr/>
+        <p:nvPr/>
+      </p:nvGrpSpPr>
+      <p:grpSpPr>
+        <a:xfrm>
+          <a:off x="0" y="0"/>
+          <a:ext cx="0" cy="0"/>
+          <a:chOff x="0" y="0"/>
+          <a:chExt cx="0" cy="0"/>
+        </a:xfrm>
+      </p:grpSpPr>
+      <p:sp>
+        <p:nvSpPr>
+          <p:cNvPr id="495" name="Google Shape;495;g3915c974913_0_26:notes"/>
+          <p:cNvSpPr/>
+          <p:nvPr>
+            <p:ph idx="2" type="sldImg"/>
+          </p:nvPr>
+        </p:nvSpPr>
+        <p:spPr>
+          <a:xfrm>
+            <a:off x="381300" y="685800"/>
+            <a:ext cx="6096000" cy="3429000"/>
+          </a:xfrm>
+          <a:custGeom>
+            <a:rect b="b" l="l" r="r" t="t"/>
+            <a:pathLst>
+              <a:path extrusionOk="0" h="120000" w="120000">
+                <a:moveTo>
+                  <a:pt x="0" y="0"/>
+                </a:moveTo>
+                <a:lnTo>
+                  <a:pt x="120000" y="0"/>
+                </a:lnTo>
+                <a:lnTo>
+                  <a:pt x="120000" y="120000"/>
+                </a:lnTo>
+                <a:lnTo>
+                  <a:pt x="0" y="120000"/>
+                </a:lnTo>
+                <a:close/>
+              </a:path>
+            </a:pathLst>
+          </a:custGeom>
+        </p:spPr>
+      </p:sp>
+      <p:sp>
+        <p:nvSpPr>
+          <p:cNvPr id="496" name="Google Shape;496;g3915c974913_0_26:notes"/>
+          <p:cNvSpPr txBox="1"/>
+          <p:nvPr>
+            <p:ph idx="1" type="body"/>
+          </p:nvPr>
+        </p:nvSpPr>
+        <p:spPr>
+          <a:xfrm>
+            <a:off x="685800" y="4343400"/>
+            <a:ext cx="5486400" cy="4114800"/>
+          </a:xfrm>
+          <a:prstGeom prst="rect">
+            <a:avLst/>
+          </a:prstGeom>
+        </p:spPr>
+        <p:txBody>
+          <a:bodyPr anchorCtr="0" anchor="t" bIns="91425" lIns="91425" spcFirstLastPara="1" rIns="91425" wrap="square" tIns="91425">
+            <a:noAutofit/>
+          </a:bodyPr>
+          <a:lstStyle/>
+          <a:p>
+            <a:pPr indent="0" lvl="0" marL="0" rtl="0" algn="l">
+              <a:spcBef>
+                <a:spcPts val="0"/>
+              </a:spcBef>
+              <a:spcAft>
+                <a:spcPts val="0"/>
+              </a:spcAft>
+              <a:buNone/>
+            </a:pPr>
+            <a:r>
+              <a:t/>
+            </a:r>
+            <a:endParaRPr/>
+          </a:p>
+        </p:txBody>
+      </p:sp>
+    </p:spTree>
+  </p:cSld>
+  <p:clrMapOvr>
+    <a:masterClrMapping/>
+  </p:clrMapOvr>
+</p:notes>
+</file>
+
 <file path=ppt/notesSlides/notesSlide7.xml><?xml version="1.0" encoding="utf-8"?>
 <p:notes xmlns:a="http://schemas.openxmlformats.org/drawingml/2006/main" xmlns:r="http://schemas.openxmlformats.org/officeDocument/2006/relationships" xmlns:mc="http://schemas.openxmlformats.org/markup-compatibility/2006" xmlns:mv="urn:schemas-microsoft-com:mac:vml" xmlns:p="http://schemas.openxmlformats.org/presentationml/2006/main" xmlns:c="http://schemas.openxmlformats.org/drawingml/2006/chart" xmlns:dgm="http://schemas.openxmlformats.org/drawingml/2006/diagram" xmlns:o="urn:schemas-microsoft-com:office:office" xmlns:v="urn:schemas-microsoft-com:vml" xmlns:pvml="urn:schemas-microsoft-com:office:powerpoint" xmlns:com="http://schemas.openxmlformats.org/drawingml/2006/compatibility" xmlns:p14="http://schemas.microsoft.com/office/powerpoint/2010/main" xmlns:p15="http://schemas.microsoft.com/office/powerpoint/2012/main" xmlns:ahyp="http://schemas.microsoft.com/office/drawing/2018/hyperlinkcolor" showMasterPhAnim="0" showMasterSp="0">
   <p:cSld>
@@ -6771,6 +7373,204 @@
       <p:sp>
         <p:nvSpPr>
           <p:cNvPr id="120" name="Google Shape;120;g39edc685857_0_113:notes"/>
+          <p:cNvSpPr txBox="1"/>
+          <p:nvPr>
+            <p:ph idx="1" type="body"/>
+          </p:nvPr>
+        </p:nvSpPr>
+        <p:spPr>
+          <a:xfrm>
+            <a:off x="685800" y="4343400"/>
+            <a:ext cx="5486400" cy="4114800"/>
+          </a:xfrm>
+          <a:prstGeom prst="rect">
+            <a:avLst/>
+          </a:prstGeom>
+        </p:spPr>
+        <p:txBody>
+          <a:bodyPr anchorCtr="0" anchor="t" bIns="91425" lIns="91425" spcFirstLastPara="1" rIns="91425" wrap="square" tIns="91425">
+            <a:noAutofit/>
+          </a:bodyPr>
+          <a:lstStyle/>
+          <a:p>
+            <a:pPr indent="0" lvl="0" marL="0" rtl="0" algn="l">
+              <a:spcBef>
+                <a:spcPts val="0"/>
+              </a:spcBef>
+              <a:spcAft>
+                <a:spcPts val="0"/>
+              </a:spcAft>
+              <a:buNone/>
+            </a:pPr>
+            <a:r>
+              <a:t/>
+            </a:r>
+            <a:endParaRPr/>
+          </a:p>
+        </p:txBody>
+      </p:sp>
+    </p:spTree>
+  </p:cSld>
+  <p:clrMapOvr>
+    <a:masterClrMapping/>
+  </p:clrMapOvr>
+</p:notes>
+</file>
+
+<file path=ppt/notesSlides/notesSlide70.xml><?xml version="1.0" encoding="utf-8"?>
+<p:notes xmlns:a="http://schemas.openxmlformats.org/drawingml/2006/main" xmlns:r="http://schemas.openxmlformats.org/officeDocument/2006/relationships" xmlns:mc="http://schemas.openxmlformats.org/markup-compatibility/2006" xmlns:mv="urn:schemas-microsoft-com:mac:vml" xmlns:p="http://schemas.openxmlformats.org/presentationml/2006/main" xmlns:c="http://schemas.openxmlformats.org/drawingml/2006/chart" xmlns:dgm="http://schemas.openxmlformats.org/drawingml/2006/diagram" xmlns:o="urn:schemas-microsoft-com:office:office" xmlns:v="urn:schemas-microsoft-com:vml" xmlns:pvml="urn:schemas-microsoft-com:office:powerpoint" xmlns:com="http://schemas.openxmlformats.org/drawingml/2006/compatibility" xmlns:p14="http://schemas.microsoft.com/office/powerpoint/2010/main" xmlns:p15="http://schemas.microsoft.com/office/powerpoint/2012/main" xmlns:ahyp="http://schemas.microsoft.com/office/drawing/2018/hyperlinkcolor" showMasterPhAnim="0" showMasterSp="0">
+  <p:cSld>
+    <p:spTree>
+      <p:nvGrpSpPr>
+        <p:cNvPr id="500" name="Shape 500"/>
+        <p:cNvGrpSpPr/>
+        <p:nvPr/>
+      </p:nvGrpSpPr>
+      <p:grpSpPr>
+        <a:xfrm>
+          <a:off x="0" y="0"/>
+          <a:ext cx="0" cy="0"/>
+          <a:chOff x="0" y="0"/>
+          <a:chExt cx="0" cy="0"/>
+        </a:xfrm>
+      </p:grpSpPr>
+      <p:sp>
+        <p:nvSpPr>
+          <p:cNvPr id="501" name="Google Shape;501;g3915c974913_0_46:notes"/>
+          <p:cNvSpPr/>
+          <p:nvPr>
+            <p:ph idx="2" type="sldImg"/>
+          </p:nvPr>
+        </p:nvSpPr>
+        <p:spPr>
+          <a:xfrm>
+            <a:off x="381300" y="685800"/>
+            <a:ext cx="6096000" cy="3429000"/>
+          </a:xfrm>
+          <a:custGeom>
+            <a:rect b="b" l="l" r="r" t="t"/>
+            <a:pathLst>
+              <a:path extrusionOk="0" h="120000" w="120000">
+                <a:moveTo>
+                  <a:pt x="0" y="0"/>
+                </a:moveTo>
+                <a:lnTo>
+                  <a:pt x="120000" y="0"/>
+                </a:lnTo>
+                <a:lnTo>
+                  <a:pt x="120000" y="120000"/>
+                </a:lnTo>
+                <a:lnTo>
+                  <a:pt x="0" y="120000"/>
+                </a:lnTo>
+                <a:close/>
+              </a:path>
+            </a:pathLst>
+          </a:custGeom>
+        </p:spPr>
+      </p:sp>
+      <p:sp>
+        <p:nvSpPr>
+          <p:cNvPr id="502" name="Google Shape;502;g3915c974913_0_46:notes"/>
+          <p:cNvSpPr txBox="1"/>
+          <p:nvPr>
+            <p:ph idx="1" type="body"/>
+          </p:nvPr>
+        </p:nvSpPr>
+        <p:spPr>
+          <a:xfrm>
+            <a:off x="685800" y="4343400"/>
+            <a:ext cx="5486400" cy="4114800"/>
+          </a:xfrm>
+          <a:prstGeom prst="rect">
+            <a:avLst/>
+          </a:prstGeom>
+        </p:spPr>
+        <p:txBody>
+          <a:bodyPr anchorCtr="0" anchor="t" bIns="91425" lIns="91425" spcFirstLastPara="1" rIns="91425" wrap="square" tIns="91425">
+            <a:noAutofit/>
+          </a:bodyPr>
+          <a:lstStyle/>
+          <a:p>
+            <a:pPr indent="0" lvl="0" marL="0" rtl="0" algn="l">
+              <a:spcBef>
+                <a:spcPts val="0"/>
+              </a:spcBef>
+              <a:spcAft>
+                <a:spcPts val="0"/>
+              </a:spcAft>
+              <a:buNone/>
+            </a:pPr>
+            <a:r>
+              <a:t/>
+            </a:r>
+            <a:endParaRPr/>
+          </a:p>
+        </p:txBody>
+      </p:sp>
+    </p:spTree>
+  </p:cSld>
+  <p:clrMapOvr>
+    <a:masterClrMapping/>
+  </p:clrMapOvr>
+</p:notes>
+</file>
+
+<file path=ppt/notesSlides/notesSlide71.xml><?xml version="1.0" encoding="utf-8"?>
+<p:notes xmlns:a="http://schemas.openxmlformats.org/drawingml/2006/main" xmlns:r="http://schemas.openxmlformats.org/officeDocument/2006/relationships" xmlns:mc="http://schemas.openxmlformats.org/markup-compatibility/2006" xmlns:mv="urn:schemas-microsoft-com:mac:vml" xmlns:p="http://schemas.openxmlformats.org/presentationml/2006/main" xmlns:c="http://schemas.openxmlformats.org/drawingml/2006/chart" xmlns:dgm="http://schemas.openxmlformats.org/drawingml/2006/diagram" xmlns:o="urn:schemas-microsoft-com:office:office" xmlns:v="urn:schemas-microsoft-com:vml" xmlns:pvml="urn:schemas-microsoft-com:office:powerpoint" xmlns:com="http://schemas.openxmlformats.org/drawingml/2006/compatibility" xmlns:p14="http://schemas.microsoft.com/office/powerpoint/2010/main" xmlns:p15="http://schemas.microsoft.com/office/powerpoint/2012/main" xmlns:ahyp="http://schemas.microsoft.com/office/drawing/2018/hyperlinkcolor" showMasterPhAnim="0" showMasterSp="0">
+  <p:cSld>
+    <p:spTree>
+      <p:nvGrpSpPr>
+        <p:cNvPr id="506" name="Shape 506"/>
+        <p:cNvGrpSpPr/>
+        <p:nvPr/>
+      </p:nvGrpSpPr>
+      <p:grpSpPr>
+        <a:xfrm>
+          <a:off x="0" y="0"/>
+          <a:ext cx="0" cy="0"/>
+          <a:chOff x="0" y="0"/>
+          <a:chExt cx="0" cy="0"/>
+        </a:xfrm>
+      </p:grpSpPr>
+      <p:sp>
+        <p:nvSpPr>
+          <p:cNvPr id="507" name="Google Shape;507;g3915c974913_0_34:notes"/>
+          <p:cNvSpPr/>
+          <p:nvPr>
+            <p:ph idx="2" type="sldImg"/>
+          </p:nvPr>
+        </p:nvSpPr>
+        <p:spPr>
+          <a:xfrm>
+            <a:off x="381300" y="685800"/>
+            <a:ext cx="6096000" cy="3429000"/>
+          </a:xfrm>
+          <a:custGeom>
+            <a:rect b="b" l="l" r="r" t="t"/>
+            <a:pathLst>
+              <a:path extrusionOk="0" h="120000" w="120000">
+                <a:moveTo>
+                  <a:pt x="0" y="0"/>
+                </a:moveTo>
+                <a:lnTo>
+                  <a:pt x="120000" y="0"/>
+                </a:lnTo>
+                <a:lnTo>
+                  <a:pt x="120000" y="120000"/>
+                </a:lnTo>
+                <a:lnTo>
+                  <a:pt x="0" y="120000"/>
+                </a:lnTo>
+                <a:close/>
+              </a:path>
+            </a:pathLst>
+          </a:custGeom>
+        </p:spPr>
+      </p:sp>
+      <p:sp>
+        <p:nvSpPr>
+          <p:cNvPr id="508" name="Google Shape;508;g3915c974913_0_34:notes"/>
           <p:cNvSpPr txBox="1"/>
           <p:nvPr>
             <p:ph idx="1" type="body"/>
@@ -23991,7 +24791,7 @@
             <a:tbl>
               <a:tblPr>
                 <a:noFill/>
-                <a:tableStyleId>{801967CD-82AF-4A59-A195-959321205211}</a:tableStyleId>
+                <a:tableStyleId>{8D45308A-5DEC-4249-91B1-1B624FA821CF}</a:tableStyleId>
               </a:tblPr>
               <a:tblGrid>
                 <a:gridCol w="561975"/>
@@ -24056,7 +24856,7 @@
             <a:tbl>
               <a:tblPr>
                 <a:noFill/>
-                <a:tableStyleId>{801967CD-82AF-4A59-A195-959321205211}</a:tableStyleId>
+                <a:tableStyleId>{8D45308A-5DEC-4249-91B1-1B624FA821CF}</a:tableStyleId>
               </a:tblPr>
               <a:tblGrid>
                 <a:gridCol w="19050"/>
@@ -24104,7 +24904,7 @@
             <a:tbl>
               <a:tblPr>
                 <a:noFill/>
-                <a:tableStyleId>{801967CD-82AF-4A59-A195-959321205211}</a:tableStyleId>
+                <a:tableStyleId>{8D45308A-5DEC-4249-91B1-1B624FA821CF}</a:tableStyleId>
               </a:tblPr>
               <a:tblGrid>
                 <a:gridCol w="561975"/>
@@ -24169,7 +24969,7 @@
             <a:tbl>
               <a:tblPr>
                 <a:noFill/>
-                <a:tableStyleId>{801967CD-82AF-4A59-A195-959321205211}</a:tableStyleId>
+                <a:tableStyleId>{8D45308A-5DEC-4249-91B1-1B624FA821CF}</a:tableStyleId>
               </a:tblPr>
               <a:tblGrid>
                 <a:gridCol w="19050"/>
@@ -38863,6 +39663,2418 @@
 </p:sld>
 </file>
 
+<file path=ppt/slides/slide64.xml><?xml version="1.0" encoding="utf-8"?>
+<p:sld xmlns:a="http://schemas.openxmlformats.org/drawingml/2006/main" xmlns:r="http://schemas.openxmlformats.org/officeDocument/2006/relationships" xmlns:mc="http://schemas.openxmlformats.org/markup-compatibility/2006" xmlns:mv="urn:schemas-microsoft-com:mac:vml" xmlns:p="http://schemas.openxmlformats.org/presentationml/2006/main" xmlns:c="http://schemas.openxmlformats.org/drawingml/2006/chart" xmlns:dgm="http://schemas.openxmlformats.org/drawingml/2006/diagram" xmlns:o="urn:schemas-microsoft-com:office:office" xmlns:v="urn:schemas-microsoft-com:vml" xmlns:pvml="urn:schemas-microsoft-com:office:powerpoint" xmlns:com="http://schemas.openxmlformats.org/drawingml/2006/compatibility" xmlns:p14="http://schemas.microsoft.com/office/powerpoint/2010/main" xmlns:p15="http://schemas.microsoft.com/office/powerpoint/2012/main" xmlns:ahyp="http://schemas.microsoft.com/office/drawing/2018/hyperlinkcolor">
+  <p:cSld>
+    <p:spTree>
+      <p:nvGrpSpPr>
+        <p:cNvPr id="467" name="Shape 467"/>
+        <p:cNvGrpSpPr/>
+        <p:nvPr/>
+      </p:nvGrpSpPr>
+      <p:grpSpPr>
+        <a:xfrm>
+          <a:off x="0" y="0"/>
+          <a:ext cx="0" cy="0"/>
+          <a:chOff x="0" y="0"/>
+          <a:chExt cx="0" cy="0"/>
+        </a:xfrm>
+      </p:grpSpPr>
+      <p:sp>
+        <p:nvSpPr>
+          <p:cNvPr id="468" name="Google Shape;468;p76"/>
+          <p:cNvSpPr txBox="1"/>
+          <p:nvPr>
+            <p:ph type="title"/>
+          </p:nvPr>
+        </p:nvSpPr>
+        <p:spPr>
+          <a:xfrm>
+            <a:off x="729450" y="1318650"/>
+            <a:ext cx="7688700" cy="535200"/>
+          </a:xfrm>
+          <a:prstGeom prst="rect">
+            <a:avLst/>
+          </a:prstGeom>
+        </p:spPr>
+        <p:txBody>
+          <a:bodyPr anchorCtr="0" anchor="t" bIns="91425" lIns="91425" spcFirstLastPara="1" rIns="91425" wrap="square" tIns="91425">
+            <a:noAutofit/>
+          </a:bodyPr>
+          <a:lstStyle/>
+          <a:p>
+            <a:pPr indent="0" lvl="0" marL="0" rtl="0" algn="l">
+              <a:lnSpc>
+                <a:spcPct val="115000"/>
+              </a:lnSpc>
+              <a:spcBef>
+                <a:spcPts val="1400"/>
+              </a:spcBef>
+              <a:spcAft>
+                <a:spcPts val="400"/>
+              </a:spcAft>
+              <a:buNone/>
+            </a:pPr>
+            <a:r>
+              <a:rPr lang="pl" sz="2400">
+                <a:solidFill>
+                  <a:srgbClr val="000000"/>
+                </a:solidFill>
+                <a:latin typeface="Tahoma"/>
+                <a:ea typeface="Tahoma"/>
+                <a:cs typeface="Tahoma"/>
+                <a:sym typeface="Tahoma"/>
+              </a:rPr>
+              <a:t>Klucz publiczny</a:t>
+            </a:r>
+            <a:endParaRPr sz="2400">
+              <a:latin typeface="Tahoma"/>
+              <a:ea typeface="Tahoma"/>
+              <a:cs typeface="Tahoma"/>
+              <a:sym typeface="Tahoma"/>
+            </a:endParaRPr>
+          </a:p>
+        </p:txBody>
+      </p:sp>
+      <p:sp>
+        <p:nvSpPr>
+          <p:cNvPr id="469" name="Google Shape;469;p76"/>
+          <p:cNvSpPr txBox="1"/>
+          <p:nvPr>
+            <p:ph idx="1" type="body"/>
+          </p:nvPr>
+        </p:nvSpPr>
+        <p:spPr>
+          <a:xfrm>
+            <a:off x="729450" y="2078875"/>
+            <a:ext cx="7688700" cy="2916900"/>
+          </a:xfrm>
+          <a:prstGeom prst="rect">
+            <a:avLst/>
+          </a:prstGeom>
+        </p:spPr>
+        <p:txBody>
+          <a:bodyPr anchorCtr="0" anchor="t" bIns="91425" lIns="91425" spcFirstLastPara="1" rIns="91425" wrap="square" tIns="91425">
+            <a:normAutofit/>
+          </a:bodyPr>
+          <a:lstStyle/>
+          <a:p>
+            <a:pPr indent="-317500" lvl="0" marL="457200" rtl="0" algn="l">
+              <a:spcBef>
+                <a:spcPts val="0"/>
+              </a:spcBef>
+              <a:spcAft>
+                <a:spcPts val="0"/>
+              </a:spcAft>
+              <a:buClr>
+                <a:srgbClr val="000000"/>
+              </a:buClr>
+              <a:buSzPts val="1400"/>
+              <a:buFont typeface="Arial"/>
+              <a:buChar char="●"/>
+            </a:pPr>
+            <a:r>
+              <a:rPr lang="pl" sz="1400">
+                <a:solidFill>
+                  <a:srgbClr val="000000"/>
+                </a:solidFill>
+                <a:latin typeface="Tahoma"/>
+                <a:ea typeface="Tahoma"/>
+                <a:cs typeface="Tahoma"/>
+                <a:sym typeface="Tahoma"/>
+              </a:rPr>
+              <a:t>To klucz, który </a:t>
+            </a:r>
+            <a:r>
+              <a:rPr b="1" lang="pl" sz="1400">
+                <a:solidFill>
+                  <a:srgbClr val="000000"/>
+                </a:solidFill>
+                <a:latin typeface="Tahoma"/>
+                <a:ea typeface="Tahoma"/>
+                <a:cs typeface="Tahoma"/>
+                <a:sym typeface="Tahoma"/>
+              </a:rPr>
+              <a:t>możesz udostępniać każdemu</a:t>
+            </a:r>
+            <a:r>
+              <a:rPr lang="pl" sz="1400">
+                <a:solidFill>
+                  <a:srgbClr val="000000"/>
+                </a:solidFill>
+                <a:latin typeface="Tahoma"/>
+                <a:ea typeface="Tahoma"/>
+                <a:cs typeface="Tahoma"/>
+                <a:sym typeface="Tahoma"/>
+              </a:rPr>
+              <a:t>.</a:t>
+            </a:r>
+            <a:endParaRPr sz="1400">
+              <a:solidFill>
+                <a:srgbClr val="000000"/>
+              </a:solidFill>
+              <a:latin typeface="Tahoma"/>
+              <a:ea typeface="Tahoma"/>
+              <a:cs typeface="Tahoma"/>
+              <a:sym typeface="Tahoma"/>
+            </a:endParaRPr>
+          </a:p>
+          <a:p>
+            <a:pPr indent="-317500" lvl="0" marL="457200" rtl="0" algn="l">
+              <a:spcBef>
+                <a:spcPts val="0"/>
+              </a:spcBef>
+              <a:spcAft>
+                <a:spcPts val="0"/>
+              </a:spcAft>
+              <a:buClr>
+                <a:srgbClr val="000000"/>
+              </a:buClr>
+              <a:buSzPts val="1400"/>
+              <a:buFont typeface="Arial"/>
+              <a:buChar char="●"/>
+            </a:pPr>
+            <a:r>
+              <a:rPr lang="pl" sz="1400">
+                <a:solidFill>
+                  <a:srgbClr val="000000"/>
+                </a:solidFill>
+                <a:latin typeface="Tahoma"/>
+                <a:ea typeface="Tahoma"/>
+                <a:cs typeface="Tahoma"/>
+                <a:sym typeface="Tahoma"/>
+              </a:rPr>
+              <a:t>Służy do </a:t>
+            </a:r>
+            <a:r>
+              <a:rPr b="1" lang="pl" sz="1400">
+                <a:solidFill>
+                  <a:srgbClr val="000000"/>
+                </a:solidFill>
+                <a:latin typeface="Tahoma"/>
+                <a:ea typeface="Tahoma"/>
+                <a:cs typeface="Tahoma"/>
+                <a:sym typeface="Tahoma"/>
+              </a:rPr>
+              <a:t>szyfrowania wiadomości</a:t>
+            </a:r>
+            <a:r>
+              <a:rPr lang="pl" sz="1400">
+                <a:solidFill>
+                  <a:srgbClr val="000000"/>
+                </a:solidFill>
+                <a:latin typeface="Tahoma"/>
+                <a:ea typeface="Tahoma"/>
+                <a:cs typeface="Tahoma"/>
+                <a:sym typeface="Tahoma"/>
+              </a:rPr>
+              <a:t>, które mają trafić do Ciebie.</a:t>
+            </a:r>
+            <a:endParaRPr sz="1400">
+              <a:solidFill>
+                <a:srgbClr val="000000"/>
+              </a:solidFill>
+              <a:latin typeface="Tahoma"/>
+              <a:ea typeface="Tahoma"/>
+              <a:cs typeface="Tahoma"/>
+              <a:sym typeface="Tahoma"/>
+            </a:endParaRPr>
+          </a:p>
+          <a:p>
+            <a:pPr indent="-317500" lvl="0" marL="457200" rtl="0" algn="l">
+              <a:spcBef>
+                <a:spcPts val="0"/>
+              </a:spcBef>
+              <a:spcAft>
+                <a:spcPts val="0"/>
+              </a:spcAft>
+              <a:buClr>
+                <a:srgbClr val="000000"/>
+              </a:buClr>
+              <a:buSzPts val="1400"/>
+              <a:buFont typeface="Arial"/>
+              <a:buChar char="●"/>
+            </a:pPr>
+            <a:r>
+              <a:rPr lang="pl" sz="1400">
+                <a:solidFill>
+                  <a:srgbClr val="000000"/>
+                </a:solidFill>
+                <a:latin typeface="Tahoma"/>
+                <a:ea typeface="Tahoma"/>
+                <a:cs typeface="Tahoma"/>
+                <a:sym typeface="Tahoma"/>
+              </a:rPr>
+              <a:t>Każdy, kto zna Twój klucz publiczny, może wysłać Ci zaszyfrowaną wiadomość, ale </a:t>
+            </a:r>
+            <a:r>
+              <a:rPr b="1" lang="pl" sz="1400">
+                <a:solidFill>
+                  <a:srgbClr val="000000"/>
+                </a:solidFill>
+                <a:latin typeface="Tahoma"/>
+                <a:ea typeface="Tahoma"/>
+                <a:cs typeface="Tahoma"/>
+                <a:sym typeface="Tahoma"/>
+              </a:rPr>
+              <a:t>tylko Ty możesz ją odczytać</a:t>
+            </a:r>
+            <a:r>
+              <a:rPr lang="pl" sz="1400">
+                <a:solidFill>
+                  <a:srgbClr val="000000"/>
+                </a:solidFill>
+                <a:latin typeface="Tahoma"/>
+                <a:ea typeface="Tahoma"/>
+                <a:cs typeface="Tahoma"/>
+                <a:sym typeface="Tahoma"/>
+              </a:rPr>
+              <a:t>.</a:t>
+            </a:r>
+            <a:br>
+              <a:rPr lang="pl" sz="1400">
+                <a:solidFill>
+                  <a:srgbClr val="000000"/>
+                </a:solidFill>
+                <a:latin typeface="Tahoma"/>
+                <a:ea typeface="Tahoma"/>
+                <a:cs typeface="Tahoma"/>
+                <a:sym typeface="Tahoma"/>
+              </a:rPr>
+            </a:br>
+            <a:endParaRPr sz="1400">
+              <a:solidFill>
+                <a:srgbClr val="000000"/>
+              </a:solidFill>
+              <a:latin typeface="Tahoma"/>
+              <a:ea typeface="Tahoma"/>
+              <a:cs typeface="Tahoma"/>
+              <a:sym typeface="Tahoma"/>
+            </a:endParaRPr>
+          </a:p>
+          <a:p>
+            <a:pPr indent="0" lvl="0" marL="0" rtl="0" algn="l">
+              <a:spcBef>
+                <a:spcPts val="0"/>
+              </a:spcBef>
+              <a:spcAft>
+                <a:spcPts val="0"/>
+              </a:spcAft>
+              <a:buNone/>
+            </a:pPr>
+            <a:r>
+              <a:rPr b="1" lang="pl" sz="1400">
+                <a:solidFill>
+                  <a:srgbClr val="000000"/>
+                </a:solidFill>
+                <a:latin typeface="Tahoma"/>
+                <a:ea typeface="Tahoma"/>
+                <a:cs typeface="Tahoma"/>
+                <a:sym typeface="Tahoma"/>
+              </a:rPr>
+              <a:t>Przykład:</a:t>
+            </a:r>
+            <a:endParaRPr b="1" sz="1400">
+              <a:solidFill>
+                <a:srgbClr val="000000"/>
+              </a:solidFill>
+              <a:latin typeface="Tahoma"/>
+              <a:ea typeface="Tahoma"/>
+              <a:cs typeface="Tahoma"/>
+              <a:sym typeface="Tahoma"/>
+            </a:endParaRPr>
+          </a:p>
+          <a:p>
+            <a:pPr indent="-317500" lvl="0" marL="457200" rtl="0" algn="l">
+              <a:spcBef>
+                <a:spcPts val="0"/>
+              </a:spcBef>
+              <a:spcAft>
+                <a:spcPts val="0"/>
+              </a:spcAft>
+              <a:buClr>
+                <a:srgbClr val="000000"/>
+              </a:buClr>
+              <a:buSzPts val="1400"/>
+              <a:buFont typeface="Tahoma"/>
+              <a:buChar char="●"/>
+            </a:pPr>
+            <a:r>
+              <a:rPr lang="pl" sz="1400">
+                <a:solidFill>
+                  <a:srgbClr val="000000"/>
+                </a:solidFill>
+                <a:latin typeface="Tahoma"/>
+                <a:ea typeface="Tahoma"/>
+                <a:cs typeface="Tahoma"/>
+                <a:sym typeface="Tahoma"/>
+              </a:rPr>
+              <a:t>Chcesz, żeby ktoś wysłał Ci bezpieczną wiadomość. Podajesz mu swój klucz publiczny, on szyfruje wiadomość, a następnie wysyła do Ciebie.</a:t>
+            </a:r>
+            <a:endParaRPr sz="1400">
+              <a:latin typeface="Tahoma"/>
+              <a:ea typeface="Tahoma"/>
+              <a:cs typeface="Tahoma"/>
+              <a:sym typeface="Tahoma"/>
+            </a:endParaRPr>
+          </a:p>
+        </p:txBody>
+      </p:sp>
+    </p:spTree>
+  </p:cSld>
+  <p:clrMapOvr>
+    <a:masterClrMapping/>
+  </p:clrMapOvr>
+</p:sld>
+</file>
+
+<file path=ppt/slides/slide65.xml><?xml version="1.0" encoding="utf-8"?>
+<p:sld xmlns:a="http://schemas.openxmlformats.org/drawingml/2006/main" xmlns:r="http://schemas.openxmlformats.org/officeDocument/2006/relationships" xmlns:mc="http://schemas.openxmlformats.org/markup-compatibility/2006" xmlns:mv="urn:schemas-microsoft-com:mac:vml" xmlns:p="http://schemas.openxmlformats.org/presentationml/2006/main" xmlns:c="http://schemas.openxmlformats.org/drawingml/2006/chart" xmlns:dgm="http://schemas.openxmlformats.org/drawingml/2006/diagram" xmlns:o="urn:schemas-microsoft-com:office:office" xmlns:v="urn:schemas-microsoft-com:vml" xmlns:pvml="urn:schemas-microsoft-com:office:powerpoint" xmlns:com="http://schemas.openxmlformats.org/drawingml/2006/compatibility" xmlns:p14="http://schemas.microsoft.com/office/powerpoint/2010/main" xmlns:p15="http://schemas.microsoft.com/office/powerpoint/2012/main" xmlns:ahyp="http://schemas.microsoft.com/office/drawing/2018/hyperlinkcolor">
+  <p:cSld>
+    <p:spTree>
+      <p:nvGrpSpPr>
+        <p:cNvPr id="473" name="Shape 473"/>
+        <p:cNvGrpSpPr/>
+        <p:nvPr/>
+      </p:nvGrpSpPr>
+      <p:grpSpPr>
+        <a:xfrm>
+          <a:off x="0" y="0"/>
+          <a:ext cx="0" cy="0"/>
+          <a:chOff x="0" y="0"/>
+          <a:chExt cx="0" cy="0"/>
+        </a:xfrm>
+      </p:grpSpPr>
+      <p:sp>
+        <p:nvSpPr>
+          <p:cNvPr id="474" name="Google Shape;474;p77"/>
+          <p:cNvSpPr txBox="1"/>
+          <p:nvPr>
+            <p:ph type="title"/>
+          </p:nvPr>
+        </p:nvSpPr>
+        <p:spPr>
+          <a:xfrm>
+            <a:off x="729450" y="1318650"/>
+            <a:ext cx="7688700" cy="535200"/>
+          </a:xfrm>
+          <a:prstGeom prst="rect">
+            <a:avLst/>
+          </a:prstGeom>
+        </p:spPr>
+        <p:txBody>
+          <a:bodyPr anchorCtr="0" anchor="t" bIns="91425" lIns="91425" spcFirstLastPara="1" rIns="91425" wrap="square" tIns="91425">
+            <a:noAutofit/>
+          </a:bodyPr>
+          <a:lstStyle/>
+          <a:p>
+            <a:pPr indent="0" lvl="0" marL="0" rtl="0" algn="l">
+              <a:lnSpc>
+                <a:spcPct val="115000"/>
+              </a:lnSpc>
+              <a:spcBef>
+                <a:spcPts val="1400"/>
+              </a:spcBef>
+              <a:spcAft>
+                <a:spcPts val="400"/>
+              </a:spcAft>
+              <a:buNone/>
+            </a:pPr>
+            <a:r>
+              <a:rPr lang="pl" sz="2400">
+                <a:solidFill>
+                  <a:srgbClr val="000000"/>
+                </a:solidFill>
+                <a:latin typeface="Tahoma"/>
+                <a:ea typeface="Tahoma"/>
+                <a:cs typeface="Tahoma"/>
+                <a:sym typeface="Tahoma"/>
+              </a:rPr>
+              <a:t>Klucz prywatny</a:t>
+            </a:r>
+            <a:endParaRPr sz="2400">
+              <a:latin typeface="Tahoma"/>
+              <a:ea typeface="Tahoma"/>
+              <a:cs typeface="Tahoma"/>
+              <a:sym typeface="Tahoma"/>
+            </a:endParaRPr>
+          </a:p>
+        </p:txBody>
+      </p:sp>
+      <p:sp>
+        <p:nvSpPr>
+          <p:cNvPr id="475" name="Google Shape;475;p77"/>
+          <p:cNvSpPr txBox="1"/>
+          <p:nvPr>
+            <p:ph idx="1" type="body"/>
+          </p:nvPr>
+        </p:nvSpPr>
+        <p:spPr>
+          <a:xfrm>
+            <a:off x="729450" y="2078875"/>
+            <a:ext cx="7688700" cy="2261100"/>
+          </a:xfrm>
+          <a:prstGeom prst="rect">
+            <a:avLst/>
+          </a:prstGeom>
+        </p:spPr>
+        <p:txBody>
+          <a:bodyPr anchorCtr="0" anchor="t" bIns="91425" lIns="91425" spcFirstLastPara="1" rIns="91425" wrap="square" tIns="91425">
+            <a:noAutofit/>
+          </a:bodyPr>
+          <a:lstStyle/>
+          <a:p>
+            <a:pPr indent="-317500" lvl="0" marL="457200" rtl="0" algn="l">
+              <a:spcBef>
+                <a:spcPts val="1200"/>
+              </a:spcBef>
+              <a:spcAft>
+                <a:spcPts val="0"/>
+              </a:spcAft>
+              <a:buClr>
+                <a:srgbClr val="000000"/>
+              </a:buClr>
+              <a:buSzPts val="1400"/>
+              <a:buFont typeface="Arial"/>
+              <a:buChar char="●"/>
+            </a:pPr>
+            <a:r>
+              <a:rPr lang="pl" sz="1400">
+                <a:solidFill>
+                  <a:srgbClr val="000000"/>
+                </a:solidFill>
+                <a:latin typeface="Tahoma"/>
+                <a:ea typeface="Tahoma"/>
+                <a:cs typeface="Tahoma"/>
+                <a:sym typeface="Tahoma"/>
+              </a:rPr>
+              <a:t>To klucz, który </a:t>
+            </a:r>
+            <a:r>
+              <a:rPr b="1" lang="pl" sz="1400">
+                <a:solidFill>
+                  <a:srgbClr val="000000"/>
+                </a:solidFill>
+                <a:latin typeface="Tahoma"/>
+                <a:ea typeface="Tahoma"/>
+                <a:cs typeface="Tahoma"/>
+                <a:sym typeface="Tahoma"/>
+              </a:rPr>
+              <a:t>zawsze musisz trzymać w tajemnicy</a:t>
+            </a:r>
+            <a:r>
+              <a:rPr lang="pl" sz="1400">
+                <a:solidFill>
+                  <a:srgbClr val="000000"/>
+                </a:solidFill>
+                <a:latin typeface="Tahoma"/>
+                <a:ea typeface="Tahoma"/>
+                <a:cs typeface="Tahoma"/>
+                <a:sym typeface="Tahoma"/>
+              </a:rPr>
+              <a:t>.</a:t>
+            </a:r>
+            <a:endParaRPr sz="1400">
+              <a:solidFill>
+                <a:srgbClr val="000000"/>
+              </a:solidFill>
+              <a:latin typeface="Tahoma"/>
+              <a:ea typeface="Tahoma"/>
+              <a:cs typeface="Tahoma"/>
+              <a:sym typeface="Tahoma"/>
+            </a:endParaRPr>
+          </a:p>
+          <a:p>
+            <a:pPr indent="-317500" lvl="0" marL="457200" rtl="0" algn="l">
+              <a:spcBef>
+                <a:spcPts val="0"/>
+              </a:spcBef>
+              <a:spcAft>
+                <a:spcPts val="0"/>
+              </a:spcAft>
+              <a:buClr>
+                <a:srgbClr val="000000"/>
+              </a:buClr>
+              <a:buSzPts val="1400"/>
+              <a:buFont typeface="Arial"/>
+              <a:buChar char="●"/>
+            </a:pPr>
+            <a:r>
+              <a:rPr lang="pl" sz="1400">
+                <a:solidFill>
+                  <a:srgbClr val="000000"/>
+                </a:solidFill>
+                <a:latin typeface="Tahoma"/>
+                <a:ea typeface="Tahoma"/>
+                <a:cs typeface="Tahoma"/>
+                <a:sym typeface="Tahoma"/>
+              </a:rPr>
+              <a:t>Służy do </a:t>
+            </a:r>
+            <a:r>
+              <a:rPr b="1" lang="pl" sz="1400">
+                <a:solidFill>
+                  <a:srgbClr val="000000"/>
+                </a:solidFill>
+                <a:latin typeface="Tahoma"/>
+                <a:ea typeface="Tahoma"/>
+                <a:cs typeface="Tahoma"/>
+                <a:sym typeface="Tahoma"/>
+              </a:rPr>
+              <a:t>odszyfrowania wiadomości</a:t>
+            </a:r>
+            <a:r>
+              <a:rPr lang="pl" sz="1400">
+                <a:solidFill>
+                  <a:srgbClr val="000000"/>
+                </a:solidFill>
+                <a:latin typeface="Tahoma"/>
+                <a:ea typeface="Tahoma"/>
+                <a:cs typeface="Tahoma"/>
+                <a:sym typeface="Tahoma"/>
+              </a:rPr>
+              <a:t> zaszyfrowanych Twoim kluczem publicznym.</a:t>
+            </a:r>
+            <a:endParaRPr sz="1400">
+              <a:solidFill>
+                <a:srgbClr val="000000"/>
+              </a:solidFill>
+              <a:latin typeface="Tahoma"/>
+              <a:ea typeface="Tahoma"/>
+              <a:cs typeface="Tahoma"/>
+              <a:sym typeface="Tahoma"/>
+            </a:endParaRPr>
+          </a:p>
+          <a:p>
+            <a:pPr indent="-317500" lvl="0" marL="457200" rtl="0" algn="l">
+              <a:spcBef>
+                <a:spcPts val="0"/>
+              </a:spcBef>
+              <a:spcAft>
+                <a:spcPts val="0"/>
+              </a:spcAft>
+              <a:buClr>
+                <a:srgbClr val="000000"/>
+              </a:buClr>
+              <a:buSzPts val="1400"/>
+              <a:buFont typeface="Tahoma"/>
+              <a:buChar char="●"/>
+            </a:pPr>
+            <a:r>
+              <a:rPr lang="pl" sz="1400">
+                <a:solidFill>
+                  <a:srgbClr val="000000"/>
+                </a:solidFill>
+                <a:latin typeface="Tahoma"/>
+                <a:ea typeface="Tahoma"/>
+                <a:cs typeface="Tahoma"/>
+                <a:sym typeface="Tahoma"/>
+              </a:rPr>
+              <a:t>Tylko osoba posiadająca klucz prywatny może odczytać wiadomość.</a:t>
+            </a:r>
+            <a:br>
+              <a:rPr lang="pl" sz="1400">
+                <a:solidFill>
+                  <a:srgbClr val="000000"/>
+                </a:solidFill>
+                <a:latin typeface="Tahoma"/>
+                <a:ea typeface="Tahoma"/>
+                <a:cs typeface="Tahoma"/>
+                <a:sym typeface="Tahoma"/>
+              </a:rPr>
+            </a:br>
+            <a:endParaRPr sz="1400">
+              <a:solidFill>
+                <a:srgbClr val="000000"/>
+              </a:solidFill>
+              <a:latin typeface="Tahoma"/>
+              <a:ea typeface="Tahoma"/>
+              <a:cs typeface="Tahoma"/>
+              <a:sym typeface="Tahoma"/>
+            </a:endParaRPr>
+          </a:p>
+          <a:p>
+            <a:pPr indent="0" lvl="0" marL="0" rtl="0" algn="l">
+              <a:spcBef>
+                <a:spcPts val="1200"/>
+              </a:spcBef>
+              <a:spcAft>
+                <a:spcPts val="0"/>
+              </a:spcAft>
+              <a:buNone/>
+            </a:pPr>
+            <a:r>
+              <a:rPr b="1" lang="pl" sz="1400">
+                <a:solidFill>
+                  <a:srgbClr val="000000"/>
+                </a:solidFill>
+                <a:latin typeface="Tahoma"/>
+                <a:ea typeface="Tahoma"/>
+                <a:cs typeface="Tahoma"/>
+                <a:sym typeface="Tahoma"/>
+              </a:rPr>
+              <a:t>Przykład:</a:t>
+            </a:r>
+            <a:endParaRPr b="1" sz="1400">
+              <a:solidFill>
+                <a:srgbClr val="000000"/>
+              </a:solidFill>
+              <a:latin typeface="Tahoma"/>
+              <a:ea typeface="Tahoma"/>
+              <a:cs typeface="Tahoma"/>
+              <a:sym typeface="Tahoma"/>
+            </a:endParaRPr>
+          </a:p>
+          <a:p>
+            <a:pPr indent="-317500" lvl="0" marL="457200" rtl="0" algn="l">
+              <a:spcBef>
+                <a:spcPts val="1200"/>
+              </a:spcBef>
+              <a:spcAft>
+                <a:spcPts val="0"/>
+              </a:spcAft>
+              <a:buClr>
+                <a:srgbClr val="000000"/>
+              </a:buClr>
+              <a:buSzPts val="1400"/>
+              <a:buFont typeface="Tahoma"/>
+              <a:buChar char="●"/>
+            </a:pPr>
+            <a:r>
+              <a:rPr lang="pl" sz="1400">
+                <a:solidFill>
+                  <a:srgbClr val="000000"/>
+                </a:solidFill>
+                <a:latin typeface="Tahoma"/>
+                <a:ea typeface="Tahoma"/>
+                <a:cs typeface="Tahoma"/>
+                <a:sym typeface="Tahoma"/>
+              </a:rPr>
+              <a:t>Kiedy otrzymujesz zaszyfrowaną wiadomość, używasz swojego klucza prywatnego, aby odszyfrować jej treść i ją przeczytać.</a:t>
+            </a:r>
+            <a:endParaRPr sz="1400">
+              <a:solidFill>
+                <a:srgbClr val="000000"/>
+              </a:solidFill>
+              <a:latin typeface="Tahoma"/>
+              <a:ea typeface="Tahoma"/>
+              <a:cs typeface="Tahoma"/>
+              <a:sym typeface="Tahoma"/>
+            </a:endParaRPr>
+          </a:p>
+          <a:p>
+            <a:pPr indent="0" lvl="0" marL="0" rtl="0" algn="l">
+              <a:spcBef>
+                <a:spcPts val="1200"/>
+              </a:spcBef>
+              <a:spcAft>
+                <a:spcPts val="1200"/>
+              </a:spcAft>
+              <a:buNone/>
+            </a:pPr>
+            <a:r>
+              <a:t/>
+            </a:r>
+            <a:endParaRPr sz="1400">
+              <a:latin typeface="Tahoma"/>
+              <a:ea typeface="Tahoma"/>
+              <a:cs typeface="Tahoma"/>
+              <a:sym typeface="Tahoma"/>
+            </a:endParaRPr>
+          </a:p>
+        </p:txBody>
+      </p:sp>
+    </p:spTree>
+  </p:cSld>
+  <p:clrMapOvr>
+    <a:masterClrMapping/>
+  </p:clrMapOvr>
+</p:sld>
+</file>
+
+<file path=ppt/slides/slide66.xml><?xml version="1.0" encoding="utf-8"?>
+<p:sld xmlns:a="http://schemas.openxmlformats.org/drawingml/2006/main" xmlns:r="http://schemas.openxmlformats.org/officeDocument/2006/relationships" xmlns:mc="http://schemas.openxmlformats.org/markup-compatibility/2006" xmlns:mv="urn:schemas-microsoft-com:mac:vml" xmlns:p="http://schemas.openxmlformats.org/presentationml/2006/main" xmlns:c="http://schemas.openxmlformats.org/drawingml/2006/chart" xmlns:dgm="http://schemas.openxmlformats.org/drawingml/2006/diagram" xmlns:o="urn:schemas-microsoft-com:office:office" xmlns:v="urn:schemas-microsoft-com:vml" xmlns:pvml="urn:schemas-microsoft-com:office:powerpoint" xmlns:com="http://schemas.openxmlformats.org/drawingml/2006/compatibility" xmlns:p14="http://schemas.microsoft.com/office/powerpoint/2010/main" xmlns:p15="http://schemas.microsoft.com/office/powerpoint/2012/main" xmlns:ahyp="http://schemas.microsoft.com/office/drawing/2018/hyperlinkcolor">
+  <p:cSld>
+    <p:spTree>
+      <p:nvGrpSpPr>
+        <p:cNvPr id="479" name="Shape 479"/>
+        <p:cNvGrpSpPr/>
+        <p:nvPr/>
+      </p:nvGrpSpPr>
+      <p:grpSpPr>
+        <a:xfrm>
+          <a:off x="0" y="0"/>
+          <a:ext cx="0" cy="0"/>
+          <a:chOff x="0" y="0"/>
+          <a:chExt cx="0" cy="0"/>
+        </a:xfrm>
+      </p:grpSpPr>
+      <p:sp>
+        <p:nvSpPr>
+          <p:cNvPr id="480" name="Google Shape;480;p78"/>
+          <p:cNvSpPr txBox="1"/>
+          <p:nvPr>
+            <p:ph type="title"/>
+          </p:nvPr>
+        </p:nvSpPr>
+        <p:spPr>
+          <a:xfrm>
+            <a:off x="729450" y="1318650"/>
+            <a:ext cx="7688700" cy="535200"/>
+          </a:xfrm>
+          <a:prstGeom prst="rect">
+            <a:avLst/>
+          </a:prstGeom>
+        </p:spPr>
+        <p:txBody>
+          <a:bodyPr anchorCtr="0" anchor="t" bIns="91425" lIns="91425" spcFirstLastPara="1" rIns="91425" wrap="square" tIns="91425">
+            <a:noAutofit/>
+          </a:bodyPr>
+          <a:lstStyle/>
+          <a:p>
+            <a:pPr indent="0" lvl="0" marL="0" rtl="0" algn="l">
+              <a:lnSpc>
+                <a:spcPct val="115000"/>
+              </a:lnSpc>
+              <a:spcBef>
+                <a:spcPts val="1400"/>
+              </a:spcBef>
+              <a:spcAft>
+                <a:spcPts val="400"/>
+              </a:spcAft>
+              <a:buNone/>
+            </a:pPr>
+            <a:r>
+              <a:rPr lang="pl" sz="2400">
+                <a:solidFill>
+                  <a:srgbClr val="000000"/>
+                </a:solidFill>
+                <a:latin typeface="Tahoma"/>
+                <a:ea typeface="Tahoma"/>
+                <a:cs typeface="Tahoma"/>
+                <a:sym typeface="Tahoma"/>
+              </a:rPr>
+              <a:t>Klucz symetryczny (Symmetric Key)</a:t>
+            </a:r>
+            <a:endParaRPr sz="2400">
+              <a:latin typeface="Tahoma"/>
+              <a:ea typeface="Tahoma"/>
+              <a:cs typeface="Tahoma"/>
+              <a:sym typeface="Tahoma"/>
+            </a:endParaRPr>
+          </a:p>
+        </p:txBody>
+      </p:sp>
+      <p:sp>
+        <p:nvSpPr>
+          <p:cNvPr id="481" name="Google Shape;481;p78"/>
+          <p:cNvSpPr txBox="1"/>
+          <p:nvPr>
+            <p:ph idx="1" type="body"/>
+          </p:nvPr>
+        </p:nvSpPr>
+        <p:spPr>
+          <a:xfrm>
+            <a:off x="729450" y="2078875"/>
+            <a:ext cx="7688700" cy="2261100"/>
+          </a:xfrm>
+          <a:prstGeom prst="rect">
+            <a:avLst/>
+          </a:prstGeom>
+        </p:spPr>
+        <p:txBody>
+          <a:bodyPr anchorCtr="0" anchor="t" bIns="91425" lIns="91425" spcFirstLastPara="1" rIns="91425" wrap="square" tIns="91425">
+            <a:noAutofit/>
+          </a:bodyPr>
+          <a:lstStyle/>
+          <a:p>
+            <a:pPr indent="0" lvl="0" marL="0" rtl="0" algn="l">
+              <a:spcBef>
+                <a:spcPts val="1200"/>
+              </a:spcBef>
+              <a:spcAft>
+                <a:spcPts val="0"/>
+              </a:spcAft>
+              <a:buNone/>
+            </a:pPr>
+            <a:r>
+              <a:t/>
+            </a:r>
+            <a:endParaRPr b="1" sz="1400">
+              <a:solidFill>
+                <a:srgbClr val="000000"/>
+              </a:solidFill>
+              <a:latin typeface="Tahoma"/>
+              <a:ea typeface="Tahoma"/>
+              <a:cs typeface="Tahoma"/>
+              <a:sym typeface="Tahoma"/>
+            </a:endParaRPr>
+          </a:p>
+          <a:p>
+            <a:pPr indent="-317500" lvl="0" marL="457200" rtl="0" algn="l">
+              <a:spcBef>
+                <a:spcPts val="1200"/>
+              </a:spcBef>
+              <a:spcAft>
+                <a:spcPts val="0"/>
+              </a:spcAft>
+              <a:buClr>
+                <a:srgbClr val="000000"/>
+              </a:buClr>
+              <a:buSzPts val="1400"/>
+              <a:buFont typeface="Arial"/>
+              <a:buChar char="●"/>
+            </a:pPr>
+            <a:r>
+              <a:rPr lang="pl" sz="1400">
+                <a:solidFill>
+                  <a:srgbClr val="000000"/>
+                </a:solidFill>
+                <a:latin typeface="Tahoma"/>
+                <a:ea typeface="Tahoma"/>
+                <a:cs typeface="Tahoma"/>
+                <a:sym typeface="Tahoma"/>
+              </a:rPr>
+              <a:t>W kryptografii symetrycznej do </a:t>
+            </a:r>
+            <a:r>
+              <a:rPr b="1" lang="pl" sz="1400">
+                <a:solidFill>
+                  <a:srgbClr val="000000"/>
+                </a:solidFill>
+                <a:latin typeface="Tahoma"/>
+                <a:ea typeface="Tahoma"/>
+                <a:cs typeface="Tahoma"/>
+                <a:sym typeface="Tahoma"/>
+              </a:rPr>
+              <a:t>szyfrowania i odszyfrowywania</a:t>
+            </a:r>
+            <a:r>
+              <a:rPr lang="pl" sz="1400">
+                <a:solidFill>
+                  <a:srgbClr val="000000"/>
+                </a:solidFill>
+                <a:latin typeface="Tahoma"/>
+                <a:ea typeface="Tahoma"/>
+                <a:cs typeface="Tahoma"/>
+                <a:sym typeface="Tahoma"/>
+              </a:rPr>
+              <a:t> danych używa się </a:t>
+            </a:r>
+            <a:r>
+              <a:rPr b="1" lang="pl" sz="1400">
+                <a:solidFill>
+                  <a:srgbClr val="000000"/>
+                </a:solidFill>
+                <a:latin typeface="Tahoma"/>
+                <a:ea typeface="Tahoma"/>
+                <a:cs typeface="Tahoma"/>
+                <a:sym typeface="Tahoma"/>
+              </a:rPr>
+              <a:t>tego samego klucza</a:t>
+            </a:r>
+            <a:r>
+              <a:rPr lang="pl" sz="1400">
+                <a:solidFill>
+                  <a:srgbClr val="000000"/>
+                </a:solidFill>
+                <a:latin typeface="Tahoma"/>
+                <a:ea typeface="Tahoma"/>
+                <a:cs typeface="Tahoma"/>
+                <a:sym typeface="Tahoma"/>
+              </a:rPr>
+              <a:t>.</a:t>
+            </a:r>
+            <a:br>
+              <a:rPr lang="pl" sz="1400">
+                <a:solidFill>
+                  <a:srgbClr val="000000"/>
+                </a:solidFill>
+                <a:latin typeface="Tahoma"/>
+                <a:ea typeface="Tahoma"/>
+                <a:cs typeface="Tahoma"/>
+                <a:sym typeface="Tahoma"/>
+              </a:rPr>
+            </a:br>
+            <a:endParaRPr sz="1400">
+              <a:solidFill>
+                <a:srgbClr val="000000"/>
+              </a:solidFill>
+              <a:latin typeface="Tahoma"/>
+              <a:ea typeface="Tahoma"/>
+              <a:cs typeface="Tahoma"/>
+              <a:sym typeface="Tahoma"/>
+            </a:endParaRPr>
+          </a:p>
+          <a:p>
+            <a:pPr indent="-317500" lvl="0" marL="457200" rtl="0" algn="l">
+              <a:spcBef>
+                <a:spcPts val="0"/>
+              </a:spcBef>
+              <a:spcAft>
+                <a:spcPts val="0"/>
+              </a:spcAft>
+              <a:buClr>
+                <a:srgbClr val="000000"/>
+              </a:buClr>
+              <a:buSzPts val="1400"/>
+              <a:buFont typeface="Arial"/>
+              <a:buChar char="●"/>
+            </a:pPr>
+            <a:r>
+              <a:rPr lang="pl" sz="1400">
+                <a:solidFill>
+                  <a:srgbClr val="000000"/>
+                </a:solidFill>
+                <a:latin typeface="Tahoma"/>
+                <a:ea typeface="Tahoma"/>
+                <a:cs typeface="Tahoma"/>
+                <a:sym typeface="Tahoma"/>
+              </a:rPr>
+              <a:t>Klucz musi być </a:t>
+            </a:r>
+            <a:r>
+              <a:rPr b="1" lang="pl" sz="1400">
+                <a:solidFill>
+                  <a:srgbClr val="000000"/>
+                </a:solidFill>
+                <a:latin typeface="Tahoma"/>
+                <a:ea typeface="Tahoma"/>
+                <a:cs typeface="Tahoma"/>
+                <a:sym typeface="Tahoma"/>
+              </a:rPr>
+              <a:t>tajny</a:t>
+            </a:r>
+            <a:r>
+              <a:rPr lang="pl" sz="1400">
+                <a:solidFill>
+                  <a:srgbClr val="000000"/>
+                </a:solidFill>
+                <a:latin typeface="Tahoma"/>
+                <a:ea typeface="Tahoma"/>
+                <a:cs typeface="Tahoma"/>
+                <a:sym typeface="Tahoma"/>
+              </a:rPr>
+              <a:t> i znany tylko nadawcy i odbiorcy.</a:t>
+            </a:r>
+            <a:endParaRPr sz="1400">
+              <a:solidFill>
+                <a:srgbClr val="000000"/>
+              </a:solidFill>
+              <a:latin typeface="Tahoma"/>
+              <a:ea typeface="Tahoma"/>
+              <a:cs typeface="Tahoma"/>
+              <a:sym typeface="Tahoma"/>
+            </a:endParaRPr>
+          </a:p>
+          <a:p>
+            <a:pPr indent="0" lvl="0" marL="0" rtl="0" algn="l">
+              <a:spcBef>
+                <a:spcPts val="1200"/>
+              </a:spcBef>
+              <a:spcAft>
+                <a:spcPts val="0"/>
+              </a:spcAft>
+              <a:buNone/>
+            </a:pPr>
+            <a:r>
+              <a:rPr b="1" lang="pl" sz="1400">
+                <a:solidFill>
+                  <a:srgbClr val="000000"/>
+                </a:solidFill>
+                <a:latin typeface="Tahoma"/>
+                <a:ea typeface="Tahoma"/>
+                <a:cs typeface="Tahoma"/>
+                <a:sym typeface="Tahoma"/>
+              </a:rPr>
+              <a:t>Przykłady algorytmów:</a:t>
+            </a:r>
+            <a:r>
+              <a:rPr lang="pl" sz="1400">
+                <a:solidFill>
+                  <a:srgbClr val="000000"/>
+                </a:solidFill>
+                <a:latin typeface="Tahoma"/>
+                <a:ea typeface="Tahoma"/>
+                <a:cs typeface="Tahoma"/>
+                <a:sym typeface="Tahoma"/>
+              </a:rPr>
+              <a:t> AES, DES.</a:t>
+            </a:r>
+            <a:endParaRPr sz="1400">
+              <a:solidFill>
+                <a:srgbClr val="000000"/>
+              </a:solidFill>
+              <a:latin typeface="Tahoma"/>
+              <a:ea typeface="Tahoma"/>
+              <a:cs typeface="Tahoma"/>
+              <a:sym typeface="Tahoma"/>
+            </a:endParaRPr>
+          </a:p>
+          <a:p>
+            <a:pPr indent="0" lvl="0" marL="0" rtl="0" algn="l">
+              <a:spcBef>
+                <a:spcPts val="1200"/>
+              </a:spcBef>
+              <a:spcAft>
+                <a:spcPts val="1200"/>
+              </a:spcAft>
+              <a:buNone/>
+            </a:pPr>
+            <a:r>
+              <a:t/>
+            </a:r>
+            <a:endParaRPr sz="1400">
+              <a:latin typeface="Tahoma"/>
+              <a:ea typeface="Tahoma"/>
+              <a:cs typeface="Tahoma"/>
+              <a:sym typeface="Tahoma"/>
+            </a:endParaRPr>
+          </a:p>
+        </p:txBody>
+      </p:sp>
+    </p:spTree>
+  </p:cSld>
+  <p:clrMapOvr>
+    <a:masterClrMapping/>
+  </p:clrMapOvr>
+</p:sld>
+</file>
+
+<file path=ppt/slides/slide67.xml><?xml version="1.0" encoding="utf-8"?>
+<p:sld xmlns:a="http://schemas.openxmlformats.org/drawingml/2006/main" xmlns:r="http://schemas.openxmlformats.org/officeDocument/2006/relationships" xmlns:mc="http://schemas.openxmlformats.org/markup-compatibility/2006" xmlns:mv="urn:schemas-microsoft-com:mac:vml" xmlns:p="http://schemas.openxmlformats.org/presentationml/2006/main" xmlns:c="http://schemas.openxmlformats.org/drawingml/2006/chart" xmlns:dgm="http://schemas.openxmlformats.org/drawingml/2006/diagram" xmlns:o="urn:schemas-microsoft-com:office:office" xmlns:v="urn:schemas-microsoft-com:vml" xmlns:pvml="urn:schemas-microsoft-com:office:powerpoint" xmlns:com="http://schemas.openxmlformats.org/drawingml/2006/compatibility" xmlns:p14="http://schemas.microsoft.com/office/powerpoint/2010/main" xmlns:p15="http://schemas.microsoft.com/office/powerpoint/2012/main" xmlns:ahyp="http://schemas.microsoft.com/office/drawing/2018/hyperlinkcolor">
+  <p:cSld>
+    <p:spTree>
+      <p:nvGrpSpPr>
+        <p:cNvPr id="485" name="Shape 485"/>
+        <p:cNvGrpSpPr/>
+        <p:nvPr/>
+      </p:nvGrpSpPr>
+      <p:grpSpPr>
+        <a:xfrm>
+          <a:off x="0" y="0"/>
+          <a:ext cx="0" cy="0"/>
+          <a:chOff x="0" y="0"/>
+          <a:chExt cx="0" cy="0"/>
+        </a:xfrm>
+      </p:grpSpPr>
+      <p:sp>
+        <p:nvSpPr>
+          <p:cNvPr id="486" name="Google Shape;486;p79"/>
+          <p:cNvSpPr txBox="1"/>
+          <p:nvPr>
+            <p:ph type="title"/>
+          </p:nvPr>
+        </p:nvSpPr>
+        <p:spPr>
+          <a:xfrm>
+            <a:off x="729450" y="1318650"/>
+            <a:ext cx="7688700" cy="535200"/>
+          </a:xfrm>
+          <a:prstGeom prst="rect">
+            <a:avLst/>
+          </a:prstGeom>
+        </p:spPr>
+        <p:txBody>
+          <a:bodyPr anchorCtr="0" anchor="t" bIns="91425" lIns="91425" spcFirstLastPara="1" rIns="91425" wrap="square" tIns="91425">
+            <a:noAutofit/>
+          </a:bodyPr>
+          <a:lstStyle/>
+          <a:p>
+            <a:pPr indent="0" lvl="0" marL="0" rtl="0" algn="l">
+              <a:lnSpc>
+                <a:spcPct val="115000"/>
+              </a:lnSpc>
+              <a:spcBef>
+                <a:spcPts val="1400"/>
+              </a:spcBef>
+              <a:spcAft>
+                <a:spcPts val="400"/>
+              </a:spcAft>
+              <a:buNone/>
+            </a:pPr>
+            <a:r>
+              <a:rPr lang="pl" sz="2400">
+                <a:solidFill>
+                  <a:srgbClr val="000000"/>
+                </a:solidFill>
+                <a:latin typeface="Tahoma"/>
+                <a:ea typeface="Tahoma"/>
+                <a:cs typeface="Tahoma"/>
+                <a:sym typeface="Tahoma"/>
+              </a:rPr>
+              <a:t>AES (Advanced Encryption Standard)</a:t>
+            </a:r>
+            <a:endParaRPr sz="2400">
+              <a:latin typeface="Tahoma"/>
+              <a:ea typeface="Tahoma"/>
+              <a:cs typeface="Tahoma"/>
+              <a:sym typeface="Tahoma"/>
+            </a:endParaRPr>
+          </a:p>
+        </p:txBody>
+      </p:sp>
+      <p:sp>
+        <p:nvSpPr>
+          <p:cNvPr id="487" name="Google Shape;487;p79"/>
+          <p:cNvSpPr txBox="1"/>
+          <p:nvPr>
+            <p:ph idx="1" type="body"/>
+          </p:nvPr>
+        </p:nvSpPr>
+        <p:spPr>
+          <a:xfrm>
+            <a:off x="729450" y="2078875"/>
+            <a:ext cx="7688700" cy="2261100"/>
+          </a:xfrm>
+          <a:prstGeom prst="rect">
+            <a:avLst/>
+          </a:prstGeom>
+        </p:spPr>
+        <p:txBody>
+          <a:bodyPr anchorCtr="0" anchor="t" bIns="91425" lIns="91425" spcFirstLastPara="1" rIns="91425" wrap="square" tIns="91425">
+            <a:noAutofit/>
+          </a:bodyPr>
+          <a:lstStyle/>
+          <a:p>
+            <a:pPr indent="0" lvl="0" marL="0" rtl="0" algn="l">
+              <a:lnSpc>
+                <a:spcPct val="100000"/>
+              </a:lnSpc>
+              <a:spcBef>
+                <a:spcPts val="0"/>
+              </a:spcBef>
+              <a:spcAft>
+                <a:spcPts val="0"/>
+              </a:spcAft>
+              <a:buNone/>
+            </a:pPr>
+            <a:r>
+              <a:rPr lang="pl" sz="1400">
+                <a:solidFill>
+                  <a:srgbClr val="000000"/>
+                </a:solidFill>
+                <a:latin typeface="Tahoma"/>
+                <a:ea typeface="Tahoma"/>
+                <a:cs typeface="Tahoma"/>
+                <a:sym typeface="Tahoma"/>
+              </a:rPr>
+              <a:t>AES to </a:t>
+            </a:r>
+            <a:r>
+              <a:rPr b="1" lang="pl" sz="1400">
+                <a:solidFill>
+                  <a:srgbClr val="000000"/>
+                </a:solidFill>
+                <a:latin typeface="Tahoma"/>
+                <a:ea typeface="Tahoma"/>
+                <a:cs typeface="Tahoma"/>
+                <a:sym typeface="Tahoma"/>
+              </a:rPr>
+              <a:t>symetryczny algorytm szyfrowania</a:t>
+            </a:r>
+            <a:r>
+              <a:rPr lang="pl" sz="1400">
+                <a:solidFill>
+                  <a:srgbClr val="000000"/>
+                </a:solidFill>
+                <a:latin typeface="Tahoma"/>
+                <a:ea typeface="Tahoma"/>
+                <a:cs typeface="Tahoma"/>
+                <a:sym typeface="Tahoma"/>
+              </a:rPr>
+              <a:t>, co oznacza, że </a:t>
+            </a:r>
+            <a:r>
+              <a:rPr b="1" lang="pl" sz="1400">
+                <a:solidFill>
+                  <a:srgbClr val="000000"/>
+                </a:solidFill>
+                <a:latin typeface="Tahoma"/>
+                <a:ea typeface="Tahoma"/>
+                <a:cs typeface="Tahoma"/>
+                <a:sym typeface="Tahoma"/>
+              </a:rPr>
+              <a:t>ten sam klucz</a:t>
+            </a:r>
+            <a:r>
+              <a:rPr lang="pl" sz="1400">
+                <a:solidFill>
+                  <a:srgbClr val="000000"/>
+                </a:solidFill>
+                <a:latin typeface="Tahoma"/>
+                <a:ea typeface="Tahoma"/>
+                <a:cs typeface="Tahoma"/>
+                <a:sym typeface="Tahoma"/>
+              </a:rPr>
+              <a:t> służy do szyfrowania i odszyfrowywania danych. Jest bardzo szybki i wydajny, dlatego stosuje się go do szyfrowania dużych ilości danych.</a:t>
+            </a:r>
+            <a:br>
+              <a:rPr lang="pl" sz="1400">
+                <a:solidFill>
+                  <a:srgbClr val="000000"/>
+                </a:solidFill>
+                <a:latin typeface="Tahoma"/>
+                <a:ea typeface="Tahoma"/>
+                <a:cs typeface="Tahoma"/>
+                <a:sym typeface="Tahoma"/>
+              </a:rPr>
+            </a:br>
+            <a:endParaRPr sz="1400">
+              <a:solidFill>
+                <a:srgbClr val="000000"/>
+              </a:solidFill>
+              <a:latin typeface="Tahoma"/>
+              <a:ea typeface="Tahoma"/>
+              <a:cs typeface="Tahoma"/>
+              <a:sym typeface="Tahoma"/>
+            </a:endParaRPr>
+          </a:p>
+          <a:p>
+            <a:pPr indent="0" lvl="0" marL="0" rtl="0" algn="l">
+              <a:lnSpc>
+                <a:spcPct val="100000"/>
+              </a:lnSpc>
+              <a:spcBef>
+                <a:spcPts val="0"/>
+              </a:spcBef>
+              <a:spcAft>
+                <a:spcPts val="0"/>
+              </a:spcAft>
+              <a:buNone/>
+            </a:pPr>
+            <a:r>
+              <a:t/>
+            </a:r>
+            <a:endParaRPr sz="1400">
+              <a:solidFill>
+                <a:srgbClr val="000000"/>
+              </a:solidFill>
+              <a:latin typeface="Tahoma"/>
+              <a:ea typeface="Tahoma"/>
+              <a:cs typeface="Tahoma"/>
+              <a:sym typeface="Tahoma"/>
+            </a:endParaRPr>
+          </a:p>
+          <a:p>
+            <a:pPr indent="0" lvl="0" marL="0" rtl="0" algn="l">
+              <a:lnSpc>
+                <a:spcPct val="100000"/>
+              </a:lnSpc>
+              <a:spcBef>
+                <a:spcPts val="0"/>
+              </a:spcBef>
+              <a:spcAft>
+                <a:spcPts val="0"/>
+              </a:spcAft>
+              <a:buNone/>
+            </a:pPr>
+            <a:r>
+              <a:rPr b="1" lang="pl" sz="1400">
+                <a:solidFill>
+                  <a:srgbClr val="000000"/>
+                </a:solidFill>
+                <a:latin typeface="Tahoma"/>
+                <a:ea typeface="Tahoma"/>
+                <a:cs typeface="Tahoma"/>
+                <a:sym typeface="Tahoma"/>
+              </a:rPr>
+              <a:t>Jak działa w praktyce:</a:t>
+            </a:r>
+            <a:endParaRPr b="1" sz="1400">
+              <a:solidFill>
+                <a:srgbClr val="000000"/>
+              </a:solidFill>
+              <a:latin typeface="Tahoma"/>
+              <a:ea typeface="Tahoma"/>
+              <a:cs typeface="Tahoma"/>
+              <a:sym typeface="Tahoma"/>
+            </a:endParaRPr>
+          </a:p>
+          <a:p>
+            <a:pPr indent="-317500" lvl="0" marL="457200" rtl="0" algn="l">
+              <a:lnSpc>
+                <a:spcPct val="100000"/>
+              </a:lnSpc>
+              <a:spcBef>
+                <a:spcPts val="0"/>
+              </a:spcBef>
+              <a:spcAft>
+                <a:spcPts val="0"/>
+              </a:spcAft>
+              <a:buClr>
+                <a:srgbClr val="000000"/>
+              </a:buClr>
+              <a:buSzPts val="1400"/>
+              <a:buFont typeface="Tahoma"/>
+              <a:buAutoNum type="arabicPeriod"/>
+            </a:pPr>
+            <a:r>
+              <a:rPr lang="pl" sz="1400">
+                <a:solidFill>
+                  <a:srgbClr val="000000"/>
+                </a:solidFill>
+                <a:latin typeface="Tahoma"/>
+                <a:ea typeface="Tahoma"/>
+                <a:cs typeface="Tahoma"/>
+                <a:sym typeface="Tahoma"/>
+              </a:rPr>
+              <a:t>Nadawca szyfruje wiadomość przy użyciu klucza AES.</a:t>
+            </a:r>
+            <a:endParaRPr sz="1400">
+              <a:solidFill>
+                <a:srgbClr val="000000"/>
+              </a:solidFill>
+              <a:latin typeface="Tahoma"/>
+              <a:ea typeface="Tahoma"/>
+              <a:cs typeface="Tahoma"/>
+              <a:sym typeface="Tahoma"/>
+            </a:endParaRPr>
+          </a:p>
+          <a:p>
+            <a:pPr indent="-317500" lvl="0" marL="457200" rtl="0" algn="l">
+              <a:lnSpc>
+                <a:spcPct val="100000"/>
+              </a:lnSpc>
+              <a:spcBef>
+                <a:spcPts val="0"/>
+              </a:spcBef>
+              <a:spcAft>
+                <a:spcPts val="0"/>
+              </a:spcAft>
+              <a:buClr>
+                <a:srgbClr val="000000"/>
+              </a:buClr>
+              <a:buSzPts val="1400"/>
+              <a:buFont typeface="Arial"/>
+              <a:buAutoNum type="arabicPeriod"/>
+            </a:pPr>
+            <a:r>
+              <a:rPr lang="pl" sz="1400">
+                <a:solidFill>
+                  <a:srgbClr val="000000"/>
+                </a:solidFill>
+                <a:latin typeface="Tahoma"/>
+                <a:ea typeface="Tahoma"/>
+                <a:cs typeface="Tahoma"/>
+                <a:sym typeface="Tahoma"/>
+              </a:rPr>
+              <a:t>Odbiorca używa </a:t>
+            </a:r>
+            <a:r>
+              <a:rPr b="1" lang="pl" sz="1400">
+                <a:solidFill>
+                  <a:srgbClr val="000000"/>
+                </a:solidFill>
+                <a:latin typeface="Tahoma"/>
+                <a:ea typeface="Tahoma"/>
+                <a:cs typeface="Tahoma"/>
+                <a:sym typeface="Tahoma"/>
+              </a:rPr>
+              <a:t>tego samego klucza</a:t>
+            </a:r>
+            <a:r>
+              <a:rPr lang="pl" sz="1400">
+                <a:solidFill>
+                  <a:srgbClr val="000000"/>
+                </a:solidFill>
+                <a:latin typeface="Tahoma"/>
+                <a:ea typeface="Tahoma"/>
+                <a:cs typeface="Tahoma"/>
+                <a:sym typeface="Tahoma"/>
+              </a:rPr>
+              <a:t>, aby odszyfrować wiadomość.</a:t>
+            </a:r>
+            <a:endParaRPr sz="1400">
+              <a:solidFill>
+                <a:srgbClr val="000000"/>
+              </a:solidFill>
+              <a:latin typeface="Tahoma"/>
+              <a:ea typeface="Tahoma"/>
+              <a:cs typeface="Tahoma"/>
+              <a:sym typeface="Tahoma"/>
+            </a:endParaRPr>
+          </a:p>
+          <a:p>
+            <a:pPr indent="0" lvl="0" marL="0" rtl="0" algn="l">
+              <a:lnSpc>
+                <a:spcPct val="100000"/>
+              </a:lnSpc>
+              <a:spcBef>
+                <a:spcPts val="0"/>
+              </a:spcBef>
+              <a:spcAft>
+                <a:spcPts val="0"/>
+              </a:spcAft>
+              <a:buNone/>
+            </a:pPr>
+            <a:r>
+              <a:t/>
+            </a:r>
+            <a:endParaRPr sz="1400">
+              <a:latin typeface="Tahoma"/>
+              <a:ea typeface="Tahoma"/>
+              <a:cs typeface="Tahoma"/>
+              <a:sym typeface="Tahoma"/>
+            </a:endParaRPr>
+          </a:p>
+        </p:txBody>
+      </p:sp>
+    </p:spTree>
+  </p:cSld>
+  <p:clrMapOvr>
+    <a:masterClrMapping/>
+  </p:clrMapOvr>
+</p:sld>
+</file>
+
+<file path=ppt/slides/slide68.xml><?xml version="1.0" encoding="utf-8"?>
+<p:sld xmlns:a="http://schemas.openxmlformats.org/drawingml/2006/main" xmlns:r="http://schemas.openxmlformats.org/officeDocument/2006/relationships" xmlns:mc="http://schemas.openxmlformats.org/markup-compatibility/2006" xmlns:mv="urn:schemas-microsoft-com:mac:vml" xmlns:p="http://schemas.openxmlformats.org/presentationml/2006/main" xmlns:c="http://schemas.openxmlformats.org/drawingml/2006/chart" xmlns:dgm="http://schemas.openxmlformats.org/drawingml/2006/diagram" xmlns:o="urn:schemas-microsoft-com:office:office" xmlns:v="urn:schemas-microsoft-com:vml" xmlns:pvml="urn:schemas-microsoft-com:office:powerpoint" xmlns:com="http://schemas.openxmlformats.org/drawingml/2006/compatibility" xmlns:p14="http://schemas.microsoft.com/office/powerpoint/2010/main" xmlns:p15="http://schemas.microsoft.com/office/powerpoint/2012/main" xmlns:ahyp="http://schemas.microsoft.com/office/drawing/2018/hyperlinkcolor">
+  <p:cSld>
+    <p:spTree>
+      <p:nvGrpSpPr>
+        <p:cNvPr id="491" name="Shape 491"/>
+        <p:cNvGrpSpPr/>
+        <p:nvPr/>
+      </p:nvGrpSpPr>
+      <p:grpSpPr>
+        <a:xfrm>
+          <a:off x="0" y="0"/>
+          <a:ext cx="0" cy="0"/>
+          <a:chOff x="0" y="0"/>
+          <a:chExt cx="0" cy="0"/>
+        </a:xfrm>
+      </p:grpSpPr>
+      <p:sp>
+        <p:nvSpPr>
+          <p:cNvPr id="492" name="Google Shape;492;p80"/>
+          <p:cNvSpPr txBox="1"/>
+          <p:nvPr>
+            <p:ph type="title"/>
+          </p:nvPr>
+        </p:nvSpPr>
+        <p:spPr>
+          <a:xfrm>
+            <a:off x="729450" y="1318650"/>
+            <a:ext cx="7688700" cy="535200"/>
+          </a:xfrm>
+          <a:prstGeom prst="rect">
+            <a:avLst/>
+          </a:prstGeom>
+        </p:spPr>
+        <p:txBody>
+          <a:bodyPr anchorCtr="0" anchor="t" bIns="91425" lIns="91425" spcFirstLastPara="1" rIns="91425" wrap="square" tIns="91425">
+            <a:noAutofit/>
+          </a:bodyPr>
+          <a:lstStyle/>
+          <a:p>
+            <a:pPr indent="0" lvl="0" marL="0" rtl="0" algn="l">
+              <a:lnSpc>
+                <a:spcPct val="115000"/>
+              </a:lnSpc>
+              <a:spcBef>
+                <a:spcPts val="1200"/>
+              </a:spcBef>
+              <a:spcAft>
+                <a:spcPts val="1200"/>
+              </a:spcAft>
+              <a:buNone/>
+            </a:pPr>
+            <a:r>
+              <a:rPr lang="pl" sz="2400">
+                <a:solidFill>
+                  <a:srgbClr val="000000"/>
+                </a:solidFill>
+                <a:latin typeface="Tahoma"/>
+                <a:ea typeface="Tahoma"/>
+                <a:cs typeface="Tahoma"/>
+                <a:sym typeface="Tahoma"/>
+              </a:rPr>
+              <a:t>Jak działa w praktyce:</a:t>
+            </a:r>
+            <a:endParaRPr sz="2400">
+              <a:latin typeface="Tahoma"/>
+              <a:ea typeface="Tahoma"/>
+              <a:cs typeface="Tahoma"/>
+              <a:sym typeface="Tahoma"/>
+            </a:endParaRPr>
+          </a:p>
+        </p:txBody>
+      </p:sp>
+      <p:sp>
+        <p:nvSpPr>
+          <p:cNvPr id="493" name="Google Shape;493;p80"/>
+          <p:cNvSpPr txBox="1"/>
+          <p:nvPr>
+            <p:ph idx="1" type="body"/>
+          </p:nvPr>
+        </p:nvSpPr>
+        <p:spPr>
+          <a:xfrm>
+            <a:off x="729450" y="2078875"/>
+            <a:ext cx="7688700" cy="2261100"/>
+          </a:xfrm>
+          <a:prstGeom prst="rect">
+            <a:avLst/>
+          </a:prstGeom>
+        </p:spPr>
+        <p:txBody>
+          <a:bodyPr anchorCtr="0" anchor="t" bIns="91425" lIns="91425" spcFirstLastPara="1" rIns="91425" wrap="square" tIns="91425">
+            <a:noAutofit/>
+          </a:bodyPr>
+          <a:lstStyle/>
+          <a:p>
+            <a:pPr indent="0" lvl="0" marL="0" rtl="0" algn="l">
+              <a:lnSpc>
+                <a:spcPct val="100000"/>
+              </a:lnSpc>
+              <a:spcBef>
+                <a:spcPts val="0"/>
+              </a:spcBef>
+              <a:spcAft>
+                <a:spcPts val="0"/>
+              </a:spcAft>
+              <a:buNone/>
+            </a:pPr>
+            <a:r>
+              <a:t/>
+            </a:r>
+            <a:endParaRPr b="1" sz="1400">
+              <a:solidFill>
+                <a:srgbClr val="000000"/>
+              </a:solidFill>
+              <a:latin typeface="Tahoma"/>
+              <a:ea typeface="Tahoma"/>
+              <a:cs typeface="Tahoma"/>
+              <a:sym typeface="Tahoma"/>
+            </a:endParaRPr>
+          </a:p>
+          <a:p>
+            <a:pPr indent="-317500" lvl="0" marL="457200" rtl="0" algn="l">
+              <a:lnSpc>
+                <a:spcPct val="100000"/>
+              </a:lnSpc>
+              <a:spcBef>
+                <a:spcPts val="0"/>
+              </a:spcBef>
+              <a:spcAft>
+                <a:spcPts val="0"/>
+              </a:spcAft>
+              <a:buClr>
+                <a:srgbClr val="000000"/>
+              </a:buClr>
+              <a:buSzPts val="1400"/>
+              <a:buFont typeface="Tahoma"/>
+              <a:buAutoNum type="arabicPeriod"/>
+            </a:pPr>
+            <a:r>
+              <a:rPr lang="pl" sz="1400">
+                <a:solidFill>
+                  <a:srgbClr val="000000"/>
+                </a:solidFill>
+                <a:latin typeface="Tahoma"/>
+                <a:ea typeface="Tahoma"/>
+                <a:cs typeface="Tahoma"/>
+                <a:sym typeface="Tahoma"/>
+              </a:rPr>
+              <a:t>Nadawca szyfruje wiadomość za pomocą klucza symetrycznego.</a:t>
+            </a:r>
+            <a:endParaRPr sz="1400">
+              <a:solidFill>
+                <a:srgbClr val="000000"/>
+              </a:solidFill>
+              <a:latin typeface="Tahoma"/>
+              <a:ea typeface="Tahoma"/>
+              <a:cs typeface="Tahoma"/>
+              <a:sym typeface="Tahoma"/>
+            </a:endParaRPr>
+          </a:p>
+          <a:p>
+            <a:pPr indent="-317500" lvl="0" marL="457200" rtl="0" algn="l">
+              <a:lnSpc>
+                <a:spcPct val="100000"/>
+              </a:lnSpc>
+              <a:spcBef>
+                <a:spcPts val="0"/>
+              </a:spcBef>
+              <a:spcAft>
+                <a:spcPts val="0"/>
+              </a:spcAft>
+              <a:buClr>
+                <a:srgbClr val="000000"/>
+              </a:buClr>
+              <a:buSzPts val="1400"/>
+              <a:buFont typeface="Tahoma"/>
+              <a:buAutoNum type="arabicPeriod"/>
+            </a:pPr>
+            <a:r>
+              <a:rPr lang="pl" sz="1400">
+                <a:solidFill>
+                  <a:srgbClr val="000000"/>
+                </a:solidFill>
+                <a:latin typeface="Tahoma"/>
+                <a:ea typeface="Tahoma"/>
+                <a:cs typeface="Tahoma"/>
+                <a:sym typeface="Tahoma"/>
+              </a:rPr>
+              <a:t>Wiadomość trafia do odbiorcy.</a:t>
+            </a:r>
+            <a:endParaRPr sz="1400">
+              <a:solidFill>
+                <a:srgbClr val="000000"/>
+              </a:solidFill>
+              <a:latin typeface="Tahoma"/>
+              <a:ea typeface="Tahoma"/>
+              <a:cs typeface="Tahoma"/>
+              <a:sym typeface="Tahoma"/>
+            </a:endParaRPr>
+          </a:p>
+          <a:p>
+            <a:pPr indent="-317500" lvl="0" marL="457200" rtl="0" algn="l">
+              <a:lnSpc>
+                <a:spcPct val="100000"/>
+              </a:lnSpc>
+              <a:spcBef>
+                <a:spcPts val="0"/>
+              </a:spcBef>
+              <a:spcAft>
+                <a:spcPts val="0"/>
+              </a:spcAft>
+              <a:buClr>
+                <a:srgbClr val="000000"/>
+              </a:buClr>
+              <a:buSzPts val="1400"/>
+              <a:buFont typeface="Tahoma"/>
+              <a:buAutoNum type="arabicPeriod"/>
+            </a:pPr>
+            <a:r>
+              <a:rPr lang="pl" sz="1400">
+                <a:solidFill>
+                  <a:srgbClr val="000000"/>
+                </a:solidFill>
+                <a:latin typeface="Tahoma"/>
+                <a:ea typeface="Tahoma"/>
+                <a:cs typeface="Tahoma"/>
+                <a:sym typeface="Tahoma"/>
+              </a:rPr>
+              <a:t>Odbiorca używa tego samego klucza, aby odszyfrować wiadomość.</a:t>
+            </a:r>
+            <a:br>
+              <a:rPr lang="pl" sz="1400">
+                <a:solidFill>
+                  <a:srgbClr val="000000"/>
+                </a:solidFill>
+                <a:latin typeface="Tahoma"/>
+                <a:ea typeface="Tahoma"/>
+                <a:cs typeface="Tahoma"/>
+                <a:sym typeface="Tahoma"/>
+              </a:rPr>
+            </a:br>
+            <a:endParaRPr sz="1400">
+              <a:solidFill>
+                <a:srgbClr val="000000"/>
+              </a:solidFill>
+              <a:latin typeface="Tahoma"/>
+              <a:ea typeface="Tahoma"/>
+              <a:cs typeface="Tahoma"/>
+              <a:sym typeface="Tahoma"/>
+            </a:endParaRPr>
+          </a:p>
+          <a:p>
+            <a:pPr indent="0" lvl="0" marL="457200" rtl="0" algn="l">
+              <a:lnSpc>
+                <a:spcPct val="100000"/>
+              </a:lnSpc>
+              <a:spcBef>
+                <a:spcPts val="0"/>
+              </a:spcBef>
+              <a:spcAft>
+                <a:spcPts val="0"/>
+              </a:spcAft>
+              <a:buNone/>
+            </a:pPr>
+            <a:r>
+              <a:t/>
+            </a:r>
+            <a:endParaRPr sz="1400">
+              <a:solidFill>
+                <a:srgbClr val="000000"/>
+              </a:solidFill>
+              <a:latin typeface="Tahoma"/>
+              <a:ea typeface="Tahoma"/>
+              <a:cs typeface="Tahoma"/>
+              <a:sym typeface="Tahoma"/>
+            </a:endParaRPr>
+          </a:p>
+          <a:p>
+            <a:pPr indent="0" lvl="0" marL="0" rtl="0" algn="l">
+              <a:lnSpc>
+                <a:spcPct val="100000"/>
+              </a:lnSpc>
+              <a:spcBef>
+                <a:spcPts val="0"/>
+              </a:spcBef>
+              <a:spcAft>
+                <a:spcPts val="0"/>
+              </a:spcAft>
+              <a:buNone/>
+            </a:pPr>
+            <a:r>
+              <a:rPr b="1" lang="pl" sz="1400">
+                <a:solidFill>
+                  <a:srgbClr val="000000"/>
+                </a:solidFill>
+                <a:latin typeface="Tahoma"/>
+                <a:ea typeface="Tahoma"/>
+                <a:cs typeface="Tahoma"/>
+                <a:sym typeface="Tahoma"/>
+              </a:rPr>
+              <a:t>Zalety:</a:t>
+            </a:r>
+            <a:endParaRPr b="1" sz="1400">
+              <a:solidFill>
+                <a:srgbClr val="000000"/>
+              </a:solidFill>
+              <a:latin typeface="Tahoma"/>
+              <a:ea typeface="Tahoma"/>
+              <a:cs typeface="Tahoma"/>
+              <a:sym typeface="Tahoma"/>
+            </a:endParaRPr>
+          </a:p>
+          <a:p>
+            <a:pPr indent="-317500" lvl="0" marL="457200" rtl="0" algn="l">
+              <a:lnSpc>
+                <a:spcPct val="100000"/>
+              </a:lnSpc>
+              <a:spcBef>
+                <a:spcPts val="0"/>
+              </a:spcBef>
+              <a:spcAft>
+                <a:spcPts val="0"/>
+              </a:spcAft>
+              <a:buClr>
+                <a:srgbClr val="000000"/>
+              </a:buClr>
+              <a:buSzPts val="1400"/>
+              <a:buFont typeface="Tahoma"/>
+              <a:buChar char="●"/>
+            </a:pPr>
+            <a:r>
+              <a:rPr lang="pl" sz="1400">
+                <a:solidFill>
+                  <a:srgbClr val="000000"/>
+                </a:solidFill>
+                <a:latin typeface="Tahoma"/>
+                <a:ea typeface="Tahoma"/>
+                <a:cs typeface="Tahoma"/>
+                <a:sym typeface="Tahoma"/>
+              </a:rPr>
+              <a:t>Szybkie szyfrowanie i odszyfrowywanie (wydajne dla dużych danych).</a:t>
+            </a:r>
+            <a:br>
+              <a:rPr lang="pl" sz="1400">
+                <a:solidFill>
+                  <a:srgbClr val="000000"/>
+                </a:solidFill>
+                <a:latin typeface="Tahoma"/>
+                <a:ea typeface="Tahoma"/>
+                <a:cs typeface="Tahoma"/>
+                <a:sym typeface="Tahoma"/>
+              </a:rPr>
+            </a:br>
+            <a:endParaRPr sz="1400">
+              <a:solidFill>
+                <a:srgbClr val="000000"/>
+              </a:solidFill>
+              <a:latin typeface="Tahoma"/>
+              <a:ea typeface="Tahoma"/>
+              <a:cs typeface="Tahoma"/>
+              <a:sym typeface="Tahoma"/>
+            </a:endParaRPr>
+          </a:p>
+          <a:p>
+            <a:pPr indent="0" lvl="0" marL="0" rtl="0" algn="l">
+              <a:lnSpc>
+                <a:spcPct val="100000"/>
+              </a:lnSpc>
+              <a:spcBef>
+                <a:spcPts val="0"/>
+              </a:spcBef>
+              <a:spcAft>
+                <a:spcPts val="0"/>
+              </a:spcAft>
+              <a:buNone/>
+            </a:pPr>
+            <a:r>
+              <a:rPr b="1" lang="pl" sz="1400">
+                <a:solidFill>
+                  <a:srgbClr val="000000"/>
+                </a:solidFill>
+                <a:latin typeface="Tahoma"/>
+                <a:ea typeface="Tahoma"/>
+                <a:cs typeface="Tahoma"/>
+                <a:sym typeface="Tahoma"/>
+              </a:rPr>
+              <a:t>Wady:</a:t>
+            </a:r>
+            <a:endParaRPr b="1" sz="1400">
+              <a:solidFill>
+                <a:srgbClr val="000000"/>
+              </a:solidFill>
+              <a:latin typeface="Tahoma"/>
+              <a:ea typeface="Tahoma"/>
+              <a:cs typeface="Tahoma"/>
+              <a:sym typeface="Tahoma"/>
+            </a:endParaRPr>
+          </a:p>
+          <a:p>
+            <a:pPr indent="-317500" lvl="0" marL="457200" rtl="0" algn="l">
+              <a:lnSpc>
+                <a:spcPct val="100000"/>
+              </a:lnSpc>
+              <a:spcBef>
+                <a:spcPts val="0"/>
+              </a:spcBef>
+              <a:spcAft>
+                <a:spcPts val="0"/>
+              </a:spcAft>
+              <a:buClr>
+                <a:srgbClr val="000000"/>
+              </a:buClr>
+              <a:buSzPts val="1400"/>
+              <a:buFont typeface="Tahoma"/>
+              <a:buChar char="●"/>
+            </a:pPr>
+            <a:r>
+              <a:rPr lang="pl" sz="1400">
+                <a:solidFill>
+                  <a:srgbClr val="000000"/>
+                </a:solidFill>
+                <a:latin typeface="Tahoma"/>
+                <a:ea typeface="Tahoma"/>
+                <a:cs typeface="Tahoma"/>
+                <a:sym typeface="Tahoma"/>
+              </a:rPr>
+              <a:t>Problem z bezpiecznym przesłaniem klucza – jeśli ktoś przechwyci klucz, może odczytać wszystkie wiadomości.</a:t>
+            </a:r>
+            <a:endParaRPr sz="1400">
+              <a:solidFill>
+                <a:srgbClr val="000000"/>
+              </a:solidFill>
+              <a:latin typeface="Tahoma"/>
+              <a:ea typeface="Tahoma"/>
+              <a:cs typeface="Tahoma"/>
+              <a:sym typeface="Tahoma"/>
+            </a:endParaRPr>
+          </a:p>
+          <a:p>
+            <a:pPr indent="0" lvl="0" marL="0" rtl="0" algn="l">
+              <a:lnSpc>
+                <a:spcPct val="100000"/>
+              </a:lnSpc>
+              <a:spcBef>
+                <a:spcPts val="0"/>
+              </a:spcBef>
+              <a:spcAft>
+                <a:spcPts val="0"/>
+              </a:spcAft>
+              <a:buNone/>
+            </a:pPr>
+            <a:r>
+              <a:t/>
+            </a:r>
+            <a:endParaRPr sz="1400">
+              <a:latin typeface="Tahoma"/>
+              <a:ea typeface="Tahoma"/>
+              <a:cs typeface="Tahoma"/>
+              <a:sym typeface="Tahoma"/>
+            </a:endParaRPr>
+          </a:p>
+        </p:txBody>
+      </p:sp>
+    </p:spTree>
+  </p:cSld>
+  <p:clrMapOvr>
+    <a:masterClrMapping/>
+  </p:clrMapOvr>
+</p:sld>
+</file>
+
+<file path=ppt/slides/slide69.xml><?xml version="1.0" encoding="utf-8"?>
+<p:sld xmlns:a="http://schemas.openxmlformats.org/drawingml/2006/main" xmlns:r="http://schemas.openxmlformats.org/officeDocument/2006/relationships" xmlns:mc="http://schemas.openxmlformats.org/markup-compatibility/2006" xmlns:mv="urn:schemas-microsoft-com:mac:vml" xmlns:p="http://schemas.openxmlformats.org/presentationml/2006/main" xmlns:c="http://schemas.openxmlformats.org/drawingml/2006/chart" xmlns:dgm="http://schemas.openxmlformats.org/drawingml/2006/diagram" xmlns:o="urn:schemas-microsoft-com:office:office" xmlns:v="urn:schemas-microsoft-com:vml" xmlns:pvml="urn:schemas-microsoft-com:office:powerpoint" xmlns:com="http://schemas.openxmlformats.org/drawingml/2006/compatibility" xmlns:p14="http://schemas.microsoft.com/office/powerpoint/2010/main" xmlns:p15="http://schemas.microsoft.com/office/powerpoint/2012/main" xmlns:ahyp="http://schemas.microsoft.com/office/drawing/2018/hyperlinkcolor">
+  <p:cSld>
+    <p:spTree>
+      <p:nvGrpSpPr>
+        <p:cNvPr id="497" name="Shape 497"/>
+        <p:cNvGrpSpPr/>
+        <p:nvPr/>
+      </p:nvGrpSpPr>
+      <p:grpSpPr>
+        <a:xfrm>
+          <a:off x="0" y="0"/>
+          <a:ext cx="0" cy="0"/>
+          <a:chOff x="0" y="0"/>
+          <a:chExt cx="0" cy="0"/>
+        </a:xfrm>
+      </p:grpSpPr>
+      <p:sp>
+        <p:nvSpPr>
+          <p:cNvPr id="498" name="Google Shape;498;p81"/>
+          <p:cNvSpPr txBox="1"/>
+          <p:nvPr>
+            <p:ph type="title"/>
+          </p:nvPr>
+        </p:nvSpPr>
+        <p:spPr>
+          <a:xfrm>
+            <a:off x="729450" y="1318650"/>
+            <a:ext cx="7688700" cy="535200"/>
+          </a:xfrm>
+          <a:prstGeom prst="rect">
+            <a:avLst/>
+          </a:prstGeom>
+        </p:spPr>
+        <p:txBody>
+          <a:bodyPr anchorCtr="0" anchor="t" bIns="91425" lIns="91425" spcFirstLastPara="1" rIns="91425" wrap="square" tIns="91425">
+            <a:noAutofit/>
+          </a:bodyPr>
+          <a:lstStyle/>
+          <a:p>
+            <a:pPr indent="0" lvl="0" marL="0" rtl="0" algn="l">
+              <a:spcBef>
+                <a:spcPts val="0"/>
+              </a:spcBef>
+              <a:spcAft>
+                <a:spcPts val="0"/>
+              </a:spcAft>
+              <a:buSzPts val="990"/>
+              <a:buNone/>
+            </a:pPr>
+            <a:r>
+              <a:rPr lang="pl" sz="2440">
+                <a:latin typeface="Tahoma"/>
+                <a:ea typeface="Tahoma"/>
+                <a:cs typeface="Tahoma"/>
+                <a:sym typeface="Tahoma"/>
+              </a:rPr>
+              <a:t>Klucz asymetryczny (Asymmetric Key)</a:t>
+            </a:r>
+            <a:endParaRPr sz="2440">
+              <a:latin typeface="Tahoma"/>
+              <a:ea typeface="Tahoma"/>
+              <a:cs typeface="Tahoma"/>
+              <a:sym typeface="Tahoma"/>
+            </a:endParaRPr>
+          </a:p>
+        </p:txBody>
+      </p:sp>
+      <p:sp>
+        <p:nvSpPr>
+          <p:cNvPr id="499" name="Google Shape;499;p81"/>
+          <p:cNvSpPr txBox="1"/>
+          <p:nvPr>
+            <p:ph idx="1" type="body"/>
+          </p:nvPr>
+        </p:nvSpPr>
+        <p:spPr>
+          <a:xfrm>
+            <a:off x="729450" y="2078875"/>
+            <a:ext cx="7688700" cy="2261100"/>
+          </a:xfrm>
+          <a:prstGeom prst="rect">
+            <a:avLst/>
+          </a:prstGeom>
+        </p:spPr>
+        <p:txBody>
+          <a:bodyPr anchorCtr="0" anchor="t" bIns="91425" lIns="91425" spcFirstLastPara="1" rIns="91425" wrap="square" tIns="91425">
+            <a:noAutofit/>
+          </a:bodyPr>
+          <a:lstStyle/>
+          <a:p>
+            <a:pPr indent="0" lvl="0" marL="0" rtl="0" algn="l">
+              <a:lnSpc>
+                <a:spcPct val="100000"/>
+              </a:lnSpc>
+              <a:spcBef>
+                <a:spcPts val="0"/>
+              </a:spcBef>
+              <a:spcAft>
+                <a:spcPts val="0"/>
+              </a:spcAft>
+              <a:buNone/>
+            </a:pPr>
+            <a:r>
+              <a:rPr lang="pl" sz="1400">
+                <a:solidFill>
+                  <a:srgbClr val="000000"/>
+                </a:solidFill>
+                <a:latin typeface="Tahoma"/>
+                <a:ea typeface="Tahoma"/>
+                <a:cs typeface="Tahoma"/>
+                <a:sym typeface="Tahoma"/>
+              </a:rPr>
+              <a:t>W kryptografii asymetrycznej używa się </a:t>
+            </a:r>
+            <a:r>
+              <a:rPr b="1" lang="pl" sz="1400">
+                <a:solidFill>
+                  <a:srgbClr val="000000"/>
+                </a:solidFill>
+                <a:latin typeface="Tahoma"/>
+                <a:ea typeface="Tahoma"/>
+                <a:cs typeface="Tahoma"/>
+                <a:sym typeface="Tahoma"/>
+              </a:rPr>
+              <a:t>pary kluczy</a:t>
+            </a:r>
+            <a:r>
+              <a:rPr lang="pl" sz="1400">
+                <a:solidFill>
+                  <a:srgbClr val="000000"/>
+                </a:solidFill>
+                <a:latin typeface="Tahoma"/>
+                <a:ea typeface="Tahoma"/>
+                <a:cs typeface="Tahoma"/>
+                <a:sym typeface="Tahoma"/>
+              </a:rPr>
+              <a:t>:</a:t>
+            </a:r>
+            <a:br>
+              <a:rPr lang="pl" sz="1400">
+                <a:solidFill>
+                  <a:srgbClr val="000000"/>
+                </a:solidFill>
+                <a:latin typeface="Tahoma"/>
+                <a:ea typeface="Tahoma"/>
+                <a:cs typeface="Tahoma"/>
+                <a:sym typeface="Tahoma"/>
+              </a:rPr>
+            </a:br>
+            <a:endParaRPr sz="1400">
+              <a:solidFill>
+                <a:srgbClr val="000000"/>
+              </a:solidFill>
+              <a:latin typeface="Tahoma"/>
+              <a:ea typeface="Tahoma"/>
+              <a:cs typeface="Tahoma"/>
+              <a:sym typeface="Tahoma"/>
+            </a:endParaRPr>
+          </a:p>
+          <a:p>
+            <a:pPr indent="-317500" lvl="0" marL="457200" rtl="0" algn="l">
+              <a:lnSpc>
+                <a:spcPct val="100000"/>
+              </a:lnSpc>
+              <a:spcBef>
+                <a:spcPts val="0"/>
+              </a:spcBef>
+              <a:spcAft>
+                <a:spcPts val="0"/>
+              </a:spcAft>
+              <a:buClr>
+                <a:srgbClr val="000000"/>
+              </a:buClr>
+              <a:buSzPts val="1400"/>
+              <a:buFont typeface="Arial"/>
+              <a:buAutoNum type="arabicPeriod"/>
+            </a:pPr>
+            <a:r>
+              <a:rPr b="1" lang="pl" sz="1400">
+                <a:solidFill>
+                  <a:srgbClr val="000000"/>
+                </a:solidFill>
+                <a:latin typeface="Tahoma"/>
+                <a:ea typeface="Tahoma"/>
+                <a:cs typeface="Tahoma"/>
+                <a:sym typeface="Tahoma"/>
+              </a:rPr>
+              <a:t>Klucz publiczny</a:t>
+            </a:r>
+            <a:r>
+              <a:rPr lang="pl" sz="1400">
+                <a:solidFill>
+                  <a:srgbClr val="000000"/>
+                </a:solidFill>
+                <a:latin typeface="Tahoma"/>
+                <a:ea typeface="Tahoma"/>
+                <a:cs typeface="Tahoma"/>
+                <a:sym typeface="Tahoma"/>
+              </a:rPr>
+              <a:t> – do szyfrowania wiadomości.</a:t>
+            </a:r>
+            <a:br>
+              <a:rPr lang="pl" sz="1400">
+                <a:solidFill>
+                  <a:srgbClr val="000000"/>
+                </a:solidFill>
+                <a:latin typeface="Tahoma"/>
+                <a:ea typeface="Tahoma"/>
+                <a:cs typeface="Tahoma"/>
+                <a:sym typeface="Tahoma"/>
+              </a:rPr>
+            </a:br>
+            <a:endParaRPr sz="1400">
+              <a:solidFill>
+                <a:srgbClr val="000000"/>
+              </a:solidFill>
+              <a:latin typeface="Tahoma"/>
+              <a:ea typeface="Tahoma"/>
+              <a:cs typeface="Tahoma"/>
+              <a:sym typeface="Tahoma"/>
+            </a:endParaRPr>
+          </a:p>
+          <a:p>
+            <a:pPr indent="-317500" lvl="0" marL="457200" rtl="0" algn="l">
+              <a:lnSpc>
+                <a:spcPct val="100000"/>
+              </a:lnSpc>
+              <a:spcBef>
+                <a:spcPts val="0"/>
+              </a:spcBef>
+              <a:spcAft>
+                <a:spcPts val="0"/>
+              </a:spcAft>
+              <a:buClr>
+                <a:srgbClr val="000000"/>
+              </a:buClr>
+              <a:buSzPts val="1400"/>
+              <a:buFont typeface="Arial"/>
+              <a:buAutoNum type="arabicPeriod"/>
+            </a:pPr>
+            <a:r>
+              <a:rPr b="1" lang="pl" sz="1400">
+                <a:solidFill>
+                  <a:srgbClr val="000000"/>
+                </a:solidFill>
+                <a:latin typeface="Tahoma"/>
+                <a:ea typeface="Tahoma"/>
+                <a:cs typeface="Tahoma"/>
+                <a:sym typeface="Tahoma"/>
+              </a:rPr>
+              <a:t>Klucz prywatny</a:t>
+            </a:r>
+            <a:r>
+              <a:rPr lang="pl" sz="1400">
+                <a:solidFill>
+                  <a:srgbClr val="000000"/>
+                </a:solidFill>
+                <a:latin typeface="Tahoma"/>
+                <a:ea typeface="Tahoma"/>
+                <a:cs typeface="Tahoma"/>
+                <a:sym typeface="Tahoma"/>
+              </a:rPr>
+              <a:t> – do odszyfrowania wiadomości.</a:t>
+            </a:r>
+            <a:br>
+              <a:rPr lang="pl" sz="1400">
+                <a:solidFill>
+                  <a:srgbClr val="000000"/>
+                </a:solidFill>
+                <a:latin typeface="Tahoma"/>
+                <a:ea typeface="Tahoma"/>
+                <a:cs typeface="Tahoma"/>
+                <a:sym typeface="Tahoma"/>
+              </a:rPr>
+            </a:br>
+            <a:endParaRPr sz="1400">
+              <a:solidFill>
+                <a:srgbClr val="000000"/>
+              </a:solidFill>
+              <a:latin typeface="Tahoma"/>
+              <a:ea typeface="Tahoma"/>
+              <a:cs typeface="Tahoma"/>
+              <a:sym typeface="Tahoma"/>
+            </a:endParaRPr>
+          </a:p>
+          <a:p>
+            <a:pPr indent="0" lvl="0" marL="0" rtl="0" algn="l">
+              <a:lnSpc>
+                <a:spcPct val="100000"/>
+              </a:lnSpc>
+              <a:spcBef>
+                <a:spcPts val="0"/>
+              </a:spcBef>
+              <a:spcAft>
+                <a:spcPts val="0"/>
+              </a:spcAft>
+              <a:buNone/>
+            </a:pPr>
+            <a:r>
+              <a:rPr lang="pl" sz="1400">
+                <a:solidFill>
+                  <a:srgbClr val="000000"/>
+                </a:solidFill>
+                <a:latin typeface="Tahoma"/>
+                <a:ea typeface="Tahoma"/>
+                <a:cs typeface="Tahoma"/>
+                <a:sym typeface="Tahoma"/>
+              </a:rPr>
+              <a:t>Klucz publiczny może być </a:t>
+            </a:r>
+            <a:r>
+              <a:rPr b="1" lang="pl" sz="1400">
+                <a:solidFill>
+                  <a:srgbClr val="000000"/>
+                </a:solidFill>
+                <a:latin typeface="Tahoma"/>
+                <a:ea typeface="Tahoma"/>
+                <a:cs typeface="Tahoma"/>
+                <a:sym typeface="Tahoma"/>
+              </a:rPr>
+              <a:t>udostępniany każdemu</a:t>
+            </a:r>
+            <a:r>
+              <a:rPr lang="pl" sz="1400">
+                <a:solidFill>
+                  <a:srgbClr val="000000"/>
+                </a:solidFill>
+                <a:latin typeface="Tahoma"/>
+                <a:ea typeface="Tahoma"/>
+                <a:cs typeface="Tahoma"/>
+                <a:sym typeface="Tahoma"/>
+              </a:rPr>
+              <a:t>, a klucz prywatny </a:t>
+            </a:r>
+            <a:r>
+              <a:rPr b="1" lang="pl" sz="1400">
+                <a:solidFill>
+                  <a:srgbClr val="000000"/>
+                </a:solidFill>
+                <a:latin typeface="Tahoma"/>
+                <a:ea typeface="Tahoma"/>
+                <a:cs typeface="Tahoma"/>
+                <a:sym typeface="Tahoma"/>
+              </a:rPr>
+              <a:t>pozostaje tajny</a:t>
+            </a:r>
+            <a:r>
+              <a:rPr lang="pl" sz="1400">
+                <a:solidFill>
+                  <a:srgbClr val="000000"/>
+                </a:solidFill>
+                <a:latin typeface="Tahoma"/>
+                <a:ea typeface="Tahoma"/>
+                <a:cs typeface="Tahoma"/>
+                <a:sym typeface="Tahoma"/>
+              </a:rPr>
+              <a:t>.</a:t>
+            </a:r>
+            <a:endParaRPr sz="1400">
+              <a:solidFill>
+                <a:srgbClr val="000000"/>
+              </a:solidFill>
+              <a:latin typeface="Tahoma"/>
+              <a:ea typeface="Tahoma"/>
+              <a:cs typeface="Tahoma"/>
+              <a:sym typeface="Tahoma"/>
+            </a:endParaRPr>
+          </a:p>
+          <a:p>
+            <a:pPr indent="0" lvl="0" marL="0" rtl="0" algn="l">
+              <a:lnSpc>
+                <a:spcPct val="100000"/>
+              </a:lnSpc>
+              <a:spcBef>
+                <a:spcPts val="0"/>
+              </a:spcBef>
+              <a:spcAft>
+                <a:spcPts val="0"/>
+              </a:spcAft>
+              <a:buNone/>
+            </a:pPr>
+            <a:r>
+              <a:t/>
+            </a:r>
+            <a:endParaRPr sz="1400">
+              <a:solidFill>
+                <a:srgbClr val="000000"/>
+              </a:solidFill>
+              <a:latin typeface="Tahoma"/>
+              <a:ea typeface="Tahoma"/>
+              <a:cs typeface="Tahoma"/>
+              <a:sym typeface="Tahoma"/>
+            </a:endParaRPr>
+          </a:p>
+          <a:p>
+            <a:pPr indent="0" lvl="0" marL="0" rtl="0" algn="l">
+              <a:lnSpc>
+                <a:spcPct val="100000"/>
+              </a:lnSpc>
+              <a:spcBef>
+                <a:spcPts val="0"/>
+              </a:spcBef>
+              <a:spcAft>
+                <a:spcPts val="0"/>
+              </a:spcAft>
+              <a:buNone/>
+            </a:pPr>
+            <a:r>
+              <a:rPr b="1" lang="pl" sz="1400">
+                <a:solidFill>
+                  <a:srgbClr val="000000"/>
+                </a:solidFill>
+                <a:latin typeface="Tahoma"/>
+                <a:ea typeface="Tahoma"/>
+                <a:cs typeface="Tahoma"/>
+                <a:sym typeface="Tahoma"/>
+              </a:rPr>
+              <a:t>Przykłady algorytmów:</a:t>
+            </a:r>
+            <a:r>
+              <a:rPr lang="pl" sz="1400">
+                <a:solidFill>
+                  <a:srgbClr val="000000"/>
+                </a:solidFill>
+                <a:latin typeface="Tahoma"/>
+                <a:ea typeface="Tahoma"/>
+                <a:cs typeface="Tahoma"/>
+                <a:sym typeface="Tahoma"/>
+              </a:rPr>
+              <a:t> RSA, ECC.</a:t>
+            </a:r>
+            <a:endParaRPr sz="1400">
+              <a:solidFill>
+                <a:srgbClr val="000000"/>
+              </a:solidFill>
+              <a:latin typeface="Tahoma"/>
+              <a:ea typeface="Tahoma"/>
+              <a:cs typeface="Tahoma"/>
+              <a:sym typeface="Tahoma"/>
+            </a:endParaRPr>
+          </a:p>
+          <a:p>
+            <a:pPr indent="0" lvl="0" marL="0" rtl="0" algn="l">
+              <a:lnSpc>
+                <a:spcPct val="100000"/>
+              </a:lnSpc>
+              <a:spcBef>
+                <a:spcPts val="0"/>
+              </a:spcBef>
+              <a:spcAft>
+                <a:spcPts val="0"/>
+              </a:spcAft>
+              <a:buNone/>
+            </a:pPr>
+            <a:r>
+              <a:t/>
+            </a:r>
+            <a:endParaRPr sz="1400">
+              <a:latin typeface="Tahoma"/>
+              <a:ea typeface="Tahoma"/>
+              <a:cs typeface="Tahoma"/>
+              <a:sym typeface="Tahoma"/>
+            </a:endParaRPr>
+          </a:p>
+        </p:txBody>
+      </p:sp>
+    </p:spTree>
+  </p:cSld>
+  <p:clrMapOvr>
+    <a:masterClrMapping/>
+  </p:clrMapOvr>
+</p:sld>
+</file>
+
 <file path=ppt/slides/slide7.xml><?xml version="1.0" encoding="utf-8"?>
 <p:sld xmlns:a="http://schemas.openxmlformats.org/drawingml/2006/main" xmlns:r="http://schemas.openxmlformats.org/officeDocument/2006/relationships" xmlns:mc="http://schemas.openxmlformats.org/markup-compatibility/2006" xmlns:mv="urn:schemas-microsoft-com:mac:vml" xmlns:p="http://schemas.openxmlformats.org/presentationml/2006/main" xmlns:c="http://schemas.openxmlformats.org/drawingml/2006/chart" xmlns:dgm="http://schemas.openxmlformats.org/drawingml/2006/diagram" xmlns:o="urn:schemas-microsoft-com:office:office" xmlns:v="urn:schemas-microsoft-com:vml" xmlns:pvml="urn:schemas-microsoft-com:office:powerpoint" xmlns:com="http://schemas.openxmlformats.org/drawingml/2006/compatibility" xmlns:p14="http://schemas.microsoft.com/office/powerpoint/2010/main" xmlns:p15="http://schemas.microsoft.com/office/powerpoint/2012/main" xmlns:ahyp="http://schemas.microsoft.com/office/drawing/2018/hyperlinkcolor">
   <p:cSld>
@@ -39240,6 +42452,1075 @@
               <a:ea typeface="Arial"/>
               <a:cs typeface="Arial"/>
               <a:sym typeface="Arial"/>
+            </a:endParaRPr>
+          </a:p>
+        </p:txBody>
+      </p:sp>
+    </p:spTree>
+  </p:cSld>
+  <p:clrMapOvr>
+    <a:masterClrMapping/>
+  </p:clrMapOvr>
+</p:sld>
+</file>
+
+<file path=ppt/slides/slide70.xml><?xml version="1.0" encoding="utf-8"?>
+<p:sld xmlns:a="http://schemas.openxmlformats.org/drawingml/2006/main" xmlns:r="http://schemas.openxmlformats.org/officeDocument/2006/relationships" xmlns:mc="http://schemas.openxmlformats.org/markup-compatibility/2006" xmlns:mv="urn:schemas-microsoft-com:mac:vml" xmlns:p="http://schemas.openxmlformats.org/presentationml/2006/main" xmlns:c="http://schemas.openxmlformats.org/drawingml/2006/chart" xmlns:dgm="http://schemas.openxmlformats.org/drawingml/2006/diagram" xmlns:o="urn:schemas-microsoft-com:office:office" xmlns:v="urn:schemas-microsoft-com:vml" xmlns:pvml="urn:schemas-microsoft-com:office:powerpoint" xmlns:com="http://schemas.openxmlformats.org/drawingml/2006/compatibility" xmlns:p14="http://schemas.microsoft.com/office/powerpoint/2010/main" xmlns:p15="http://schemas.microsoft.com/office/powerpoint/2012/main" xmlns:ahyp="http://schemas.microsoft.com/office/drawing/2018/hyperlinkcolor">
+  <p:cSld>
+    <p:spTree>
+      <p:nvGrpSpPr>
+        <p:cNvPr id="503" name="Shape 503"/>
+        <p:cNvGrpSpPr/>
+        <p:nvPr/>
+      </p:nvGrpSpPr>
+      <p:grpSpPr>
+        <a:xfrm>
+          <a:off x="0" y="0"/>
+          <a:ext cx="0" cy="0"/>
+          <a:chOff x="0" y="0"/>
+          <a:chExt cx="0" cy="0"/>
+        </a:xfrm>
+      </p:grpSpPr>
+      <p:sp>
+        <p:nvSpPr>
+          <p:cNvPr id="504" name="Google Shape;504;p82"/>
+          <p:cNvSpPr txBox="1"/>
+          <p:nvPr>
+            <p:ph type="title"/>
+          </p:nvPr>
+        </p:nvSpPr>
+        <p:spPr>
+          <a:xfrm>
+            <a:off x="729450" y="1318650"/>
+            <a:ext cx="7688700" cy="535200"/>
+          </a:xfrm>
+          <a:prstGeom prst="rect">
+            <a:avLst/>
+          </a:prstGeom>
+        </p:spPr>
+        <p:txBody>
+          <a:bodyPr anchorCtr="0" anchor="t" bIns="91425" lIns="91425" spcFirstLastPara="1" rIns="91425" wrap="square" tIns="91425">
+            <a:noAutofit/>
+          </a:bodyPr>
+          <a:lstStyle/>
+          <a:p>
+            <a:pPr indent="0" lvl="0" marL="0" rtl="0" algn="l">
+              <a:lnSpc>
+                <a:spcPct val="115000"/>
+              </a:lnSpc>
+              <a:spcBef>
+                <a:spcPts val="1400"/>
+              </a:spcBef>
+              <a:spcAft>
+                <a:spcPts val="400"/>
+              </a:spcAft>
+              <a:buNone/>
+            </a:pPr>
+            <a:r>
+              <a:rPr lang="pl" sz="2400">
+                <a:solidFill>
+                  <a:srgbClr val="000000"/>
+                </a:solidFill>
+                <a:latin typeface="Tahoma"/>
+                <a:ea typeface="Tahoma"/>
+                <a:cs typeface="Tahoma"/>
+                <a:sym typeface="Tahoma"/>
+              </a:rPr>
+              <a:t> RSA (Rivest–Shamir–Adleman)</a:t>
+            </a:r>
+            <a:endParaRPr sz="2400">
+              <a:latin typeface="Tahoma"/>
+              <a:ea typeface="Tahoma"/>
+              <a:cs typeface="Tahoma"/>
+              <a:sym typeface="Tahoma"/>
+            </a:endParaRPr>
+          </a:p>
+        </p:txBody>
+      </p:sp>
+      <p:sp>
+        <p:nvSpPr>
+          <p:cNvPr id="505" name="Google Shape;505;p82"/>
+          <p:cNvSpPr txBox="1"/>
+          <p:nvPr>
+            <p:ph idx="1" type="body"/>
+          </p:nvPr>
+        </p:nvSpPr>
+        <p:spPr>
+          <a:xfrm>
+            <a:off x="729450" y="2078875"/>
+            <a:ext cx="7688700" cy="2261100"/>
+          </a:xfrm>
+          <a:prstGeom prst="rect">
+            <a:avLst/>
+          </a:prstGeom>
+        </p:spPr>
+        <p:txBody>
+          <a:bodyPr anchorCtr="0" anchor="t" bIns="91425" lIns="91425" spcFirstLastPara="1" rIns="91425" wrap="square" tIns="91425">
+            <a:noAutofit/>
+          </a:bodyPr>
+          <a:lstStyle/>
+          <a:p>
+            <a:pPr indent="0" lvl="0" marL="0" rtl="0" algn="l">
+              <a:lnSpc>
+                <a:spcPct val="100000"/>
+              </a:lnSpc>
+              <a:spcBef>
+                <a:spcPts val="0"/>
+              </a:spcBef>
+              <a:spcAft>
+                <a:spcPts val="0"/>
+              </a:spcAft>
+              <a:buNone/>
+            </a:pPr>
+            <a:r>
+              <a:rPr lang="pl" sz="1400">
+                <a:solidFill>
+                  <a:srgbClr val="000000"/>
+                </a:solidFill>
+                <a:latin typeface="Tahoma"/>
+                <a:ea typeface="Tahoma"/>
+                <a:cs typeface="Tahoma"/>
+                <a:sym typeface="Tahoma"/>
+              </a:rPr>
+              <a:t>RSA to </a:t>
+            </a:r>
+            <a:r>
+              <a:rPr b="1" lang="pl" sz="1400">
+                <a:solidFill>
+                  <a:srgbClr val="000000"/>
+                </a:solidFill>
+                <a:latin typeface="Tahoma"/>
+                <a:ea typeface="Tahoma"/>
+                <a:cs typeface="Tahoma"/>
+                <a:sym typeface="Tahoma"/>
+              </a:rPr>
+              <a:t>asymetryczny algorytm szyfrowania</a:t>
+            </a:r>
+            <a:r>
+              <a:rPr lang="pl" sz="1400">
+                <a:solidFill>
+                  <a:srgbClr val="000000"/>
+                </a:solidFill>
+                <a:latin typeface="Tahoma"/>
+                <a:ea typeface="Tahoma"/>
+                <a:cs typeface="Tahoma"/>
+                <a:sym typeface="Tahoma"/>
+              </a:rPr>
+              <a:t>, który używa </a:t>
+            </a:r>
+            <a:r>
+              <a:rPr b="1" lang="pl" sz="1400">
+                <a:solidFill>
+                  <a:srgbClr val="000000"/>
+                </a:solidFill>
+                <a:latin typeface="Tahoma"/>
+                <a:ea typeface="Tahoma"/>
+                <a:cs typeface="Tahoma"/>
+                <a:sym typeface="Tahoma"/>
+              </a:rPr>
+              <a:t>pary kluczy</a:t>
+            </a:r>
+            <a:r>
+              <a:rPr lang="pl" sz="1400">
+                <a:solidFill>
+                  <a:srgbClr val="000000"/>
+                </a:solidFill>
+                <a:latin typeface="Tahoma"/>
+                <a:ea typeface="Tahoma"/>
+                <a:cs typeface="Tahoma"/>
+                <a:sym typeface="Tahoma"/>
+              </a:rPr>
+              <a:t>:</a:t>
+            </a:r>
+            <a:endParaRPr sz="1400">
+              <a:solidFill>
+                <a:srgbClr val="000000"/>
+              </a:solidFill>
+              <a:latin typeface="Tahoma"/>
+              <a:ea typeface="Tahoma"/>
+              <a:cs typeface="Tahoma"/>
+              <a:sym typeface="Tahoma"/>
+            </a:endParaRPr>
+          </a:p>
+          <a:p>
+            <a:pPr indent="-317500" lvl="1" marL="914400" rtl="0" algn="l">
+              <a:lnSpc>
+                <a:spcPct val="100000"/>
+              </a:lnSpc>
+              <a:spcBef>
+                <a:spcPts val="0"/>
+              </a:spcBef>
+              <a:spcAft>
+                <a:spcPts val="0"/>
+              </a:spcAft>
+              <a:buClr>
+                <a:srgbClr val="000000"/>
+              </a:buClr>
+              <a:buSzPts val="1400"/>
+              <a:buFont typeface="Arial"/>
+              <a:buChar char="○"/>
+            </a:pPr>
+            <a:r>
+              <a:rPr b="1" lang="pl" sz="1400">
+                <a:solidFill>
+                  <a:srgbClr val="000000"/>
+                </a:solidFill>
+                <a:latin typeface="Tahoma"/>
+                <a:ea typeface="Tahoma"/>
+                <a:cs typeface="Tahoma"/>
+                <a:sym typeface="Tahoma"/>
+              </a:rPr>
+              <a:t>Klucz publiczny</a:t>
+            </a:r>
+            <a:r>
+              <a:rPr lang="pl" sz="1400">
+                <a:solidFill>
+                  <a:srgbClr val="000000"/>
+                </a:solidFill>
+                <a:latin typeface="Tahoma"/>
+                <a:ea typeface="Tahoma"/>
+                <a:cs typeface="Tahoma"/>
+                <a:sym typeface="Tahoma"/>
+              </a:rPr>
+              <a:t> → do szyfrowania wiadomości.</a:t>
+            </a:r>
+            <a:br>
+              <a:rPr lang="pl" sz="1400">
+                <a:solidFill>
+                  <a:srgbClr val="000000"/>
+                </a:solidFill>
+                <a:latin typeface="Tahoma"/>
+                <a:ea typeface="Tahoma"/>
+                <a:cs typeface="Tahoma"/>
+                <a:sym typeface="Tahoma"/>
+              </a:rPr>
+            </a:br>
+            <a:endParaRPr sz="1400">
+              <a:solidFill>
+                <a:srgbClr val="000000"/>
+              </a:solidFill>
+              <a:latin typeface="Tahoma"/>
+              <a:ea typeface="Tahoma"/>
+              <a:cs typeface="Tahoma"/>
+              <a:sym typeface="Tahoma"/>
+            </a:endParaRPr>
+          </a:p>
+          <a:p>
+            <a:pPr indent="-317500" lvl="1" marL="914400" rtl="0" algn="l">
+              <a:lnSpc>
+                <a:spcPct val="100000"/>
+              </a:lnSpc>
+              <a:spcBef>
+                <a:spcPts val="0"/>
+              </a:spcBef>
+              <a:spcAft>
+                <a:spcPts val="0"/>
+              </a:spcAft>
+              <a:buClr>
+                <a:srgbClr val="000000"/>
+              </a:buClr>
+              <a:buSzPts val="1400"/>
+              <a:buFont typeface="Arial"/>
+              <a:buChar char="○"/>
+            </a:pPr>
+            <a:r>
+              <a:rPr b="1" lang="pl" sz="1400">
+                <a:solidFill>
+                  <a:srgbClr val="000000"/>
+                </a:solidFill>
+                <a:latin typeface="Tahoma"/>
+                <a:ea typeface="Tahoma"/>
+                <a:cs typeface="Tahoma"/>
+                <a:sym typeface="Tahoma"/>
+              </a:rPr>
+              <a:t>Klucz prywatny</a:t>
+            </a:r>
+            <a:r>
+              <a:rPr lang="pl" sz="1400">
+                <a:solidFill>
+                  <a:srgbClr val="000000"/>
+                </a:solidFill>
+                <a:latin typeface="Tahoma"/>
+                <a:ea typeface="Tahoma"/>
+                <a:cs typeface="Tahoma"/>
+                <a:sym typeface="Tahoma"/>
+              </a:rPr>
+              <a:t> → do odszyfrowania wiadomości.</a:t>
+            </a:r>
+            <a:endParaRPr sz="1400">
+              <a:solidFill>
+                <a:srgbClr val="000000"/>
+              </a:solidFill>
+              <a:latin typeface="Tahoma"/>
+              <a:ea typeface="Tahoma"/>
+              <a:cs typeface="Tahoma"/>
+              <a:sym typeface="Tahoma"/>
+            </a:endParaRPr>
+          </a:p>
+          <a:p>
+            <a:pPr indent="0" lvl="0" marL="0" rtl="0" algn="l">
+              <a:lnSpc>
+                <a:spcPct val="100000"/>
+              </a:lnSpc>
+              <a:spcBef>
+                <a:spcPts val="0"/>
+              </a:spcBef>
+              <a:spcAft>
+                <a:spcPts val="0"/>
+              </a:spcAft>
+              <a:buNone/>
+            </a:pPr>
+            <a:r>
+              <a:rPr lang="pl" sz="1400">
+                <a:solidFill>
+                  <a:srgbClr val="000000"/>
+                </a:solidFill>
+                <a:latin typeface="Tahoma"/>
+                <a:ea typeface="Tahoma"/>
+                <a:cs typeface="Tahoma"/>
+                <a:sym typeface="Tahoma"/>
+              </a:rPr>
+              <a:t>Umożliwia bezpieczne przesyłanie danych nawet przez niezabezpieczone kanały.</a:t>
+            </a:r>
+            <a:br>
+              <a:rPr lang="pl" sz="1400">
+                <a:solidFill>
+                  <a:srgbClr val="000000"/>
+                </a:solidFill>
+                <a:latin typeface="Tahoma"/>
+                <a:ea typeface="Tahoma"/>
+                <a:cs typeface="Tahoma"/>
+                <a:sym typeface="Tahoma"/>
+              </a:rPr>
+            </a:br>
+            <a:endParaRPr sz="1400">
+              <a:solidFill>
+                <a:srgbClr val="000000"/>
+              </a:solidFill>
+              <a:latin typeface="Tahoma"/>
+              <a:ea typeface="Tahoma"/>
+              <a:cs typeface="Tahoma"/>
+              <a:sym typeface="Tahoma"/>
+            </a:endParaRPr>
+          </a:p>
+          <a:p>
+            <a:pPr indent="0" lvl="0" marL="0" rtl="0" algn="l">
+              <a:lnSpc>
+                <a:spcPct val="100000"/>
+              </a:lnSpc>
+              <a:spcBef>
+                <a:spcPts val="0"/>
+              </a:spcBef>
+              <a:spcAft>
+                <a:spcPts val="0"/>
+              </a:spcAft>
+              <a:buNone/>
+            </a:pPr>
+            <a:r>
+              <a:t/>
+            </a:r>
+            <a:endParaRPr sz="1400">
+              <a:solidFill>
+                <a:srgbClr val="000000"/>
+              </a:solidFill>
+              <a:latin typeface="Tahoma"/>
+              <a:ea typeface="Tahoma"/>
+              <a:cs typeface="Tahoma"/>
+              <a:sym typeface="Tahoma"/>
+            </a:endParaRPr>
+          </a:p>
+          <a:p>
+            <a:pPr indent="0" lvl="0" marL="0" rtl="0" algn="l">
+              <a:lnSpc>
+                <a:spcPct val="100000"/>
+              </a:lnSpc>
+              <a:spcBef>
+                <a:spcPts val="0"/>
+              </a:spcBef>
+              <a:spcAft>
+                <a:spcPts val="0"/>
+              </a:spcAft>
+              <a:buNone/>
+            </a:pPr>
+            <a:r>
+              <a:rPr b="1" lang="pl" sz="1400">
+                <a:solidFill>
+                  <a:srgbClr val="000000"/>
+                </a:solidFill>
+                <a:latin typeface="Tahoma"/>
+                <a:ea typeface="Tahoma"/>
+                <a:cs typeface="Tahoma"/>
+                <a:sym typeface="Tahoma"/>
+              </a:rPr>
+              <a:t>Jak działa w praktyce:</a:t>
+            </a:r>
+            <a:endParaRPr b="1" sz="1400">
+              <a:solidFill>
+                <a:srgbClr val="000000"/>
+              </a:solidFill>
+              <a:latin typeface="Tahoma"/>
+              <a:ea typeface="Tahoma"/>
+              <a:cs typeface="Tahoma"/>
+              <a:sym typeface="Tahoma"/>
+            </a:endParaRPr>
+          </a:p>
+          <a:p>
+            <a:pPr indent="-317500" lvl="0" marL="457200" rtl="0" algn="l">
+              <a:lnSpc>
+                <a:spcPct val="100000"/>
+              </a:lnSpc>
+              <a:spcBef>
+                <a:spcPts val="0"/>
+              </a:spcBef>
+              <a:spcAft>
+                <a:spcPts val="0"/>
+              </a:spcAft>
+              <a:buClr>
+                <a:srgbClr val="000000"/>
+              </a:buClr>
+              <a:buSzPts val="1400"/>
+              <a:buFont typeface="Tahoma"/>
+              <a:buAutoNum type="arabicPeriod"/>
+            </a:pPr>
+            <a:r>
+              <a:rPr lang="pl" sz="1400">
+                <a:solidFill>
+                  <a:srgbClr val="000000"/>
+                </a:solidFill>
+                <a:latin typeface="Tahoma"/>
+                <a:ea typeface="Tahoma"/>
+                <a:cs typeface="Tahoma"/>
+                <a:sym typeface="Tahoma"/>
+              </a:rPr>
+              <a:t>Nadawca szyfruje wiadomość kluczem publicznym odbiorcy.</a:t>
+            </a:r>
+            <a:br>
+              <a:rPr lang="pl" sz="1400">
+                <a:solidFill>
+                  <a:srgbClr val="000000"/>
+                </a:solidFill>
+                <a:latin typeface="Tahoma"/>
+                <a:ea typeface="Tahoma"/>
+                <a:cs typeface="Tahoma"/>
+                <a:sym typeface="Tahoma"/>
+              </a:rPr>
+            </a:br>
+            <a:endParaRPr sz="1400">
+              <a:solidFill>
+                <a:srgbClr val="000000"/>
+              </a:solidFill>
+              <a:latin typeface="Tahoma"/>
+              <a:ea typeface="Tahoma"/>
+              <a:cs typeface="Tahoma"/>
+              <a:sym typeface="Tahoma"/>
+            </a:endParaRPr>
+          </a:p>
+          <a:p>
+            <a:pPr indent="-317500" lvl="0" marL="457200" rtl="0" algn="l">
+              <a:lnSpc>
+                <a:spcPct val="100000"/>
+              </a:lnSpc>
+              <a:spcBef>
+                <a:spcPts val="0"/>
+              </a:spcBef>
+              <a:spcAft>
+                <a:spcPts val="0"/>
+              </a:spcAft>
+              <a:buClr>
+                <a:srgbClr val="000000"/>
+              </a:buClr>
+              <a:buSzPts val="1400"/>
+              <a:buFont typeface="Tahoma"/>
+              <a:buAutoNum type="arabicPeriod"/>
+            </a:pPr>
+            <a:r>
+              <a:rPr lang="pl" sz="1400">
+                <a:solidFill>
+                  <a:srgbClr val="000000"/>
+                </a:solidFill>
+                <a:latin typeface="Tahoma"/>
+                <a:ea typeface="Tahoma"/>
+                <a:cs typeface="Tahoma"/>
+                <a:sym typeface="Tahoma"/>
+              </a:rPr>
+              <a:t>Odbiorca używa swojego klucza prywatnego, aby odszyfrować wiadomość.</a:t>
+            </a:r>
+            <a:endParaRPr sz="1400">
+              <a:solidFill>
+                <a:srgbClr val="000000"/>
+              </a:solidFill>
+              <a:latin typeface="Tahoma"/>
+              <a:ea typeface="Tahoma"/>
+              <a:cs typeface="Tahoma"/>
+              <a:sym typeface="Tahoma"/>
+            </a:endParaRPr>
+          </a:p>
+          <a:p>
+            <a:pPr indent="0" lvl="0" marL="0" rtl="0" algn="l">
+              <a:lnSpc>
+                <a:spcPct val="100000"/>
+              </a:lnSpc>
+              <a:spcBef>
+                <a:spcPts val="0"/>
+              </a:spcBef>
+              <a:spcAft>
+                <a:spcPts val="0"/>
+              </a:spcAft>
+              <a:buNone/>
+            </a:pPr>
+            <a:r>
+              <a:t/>
+            </a:r>
+            <a:endParaRPr sz="1400">
+              <a:latin typeface="Tahoma"/>
+              <a:ea typeface="Tahoma"/>
+              <a:cs typeface="Tahoma"/>
+              <a:sym typeface="Tahoma"/>
+            </a:endParaRPr>
+          </a:p>
+        </p:txBody>
+      </p:sp>
+    </p:spTree>
+  </p:cSld>
+  <p:clrMapOvr>
+    <a:masterClrMapping/>
+  </p:clrMapOvr>
+</p:sld>
+</file>
+
+<file path=ppt/slides/slide71.xml><?xml version="1.0" encoding="utf-8"?>
+<p:sld xmlns:a="http://schemas.openxmlformats.org/drawingml/2006/main" xmlns:r="http://schemas.openxmlformats.org/officeDocument/2006/relationships" xmlns:mc="http://schemas.openxmlformats.org/markup-compatibility/2006" xmlns:mv="urn:schemas-microsoft-com:mac:vml" xmlns:p="http://schemas.openxmlformats.org/presentationml/2006/main" xmlns:c="http://schemas.openxmlformats.org/drawingml/2006/chart" xmlns:dgm="http://schemas.openxmlformats.org/drawingml/2006/diagram" xmlns:o="urn:schemas-microsoft-com:office:office" xmlns:v="urn:schemas-microsoft-com:vml" xmlns:pvml="urn:schemas-microsoft-com:office:powerpoint" xmlns:com="http://schemas.openxmlformats.org/drawingml/2006/compatibility" xmlns:p14="http://schemas.microsoft.com/office/powerpoint/2010/main" xmlns:p15="http://schemas.microsoft.com/office/powerpoint/2012/main" xmlns:ahyp="http://schemas.microsoft.com/office/drawing/2018/hyperlinkcolor">
+  <p:cSld>
+    <p:spTree>
+      <p:nvGrpSpPr>
+        <p:cNvPr id="509" name="Shape 509"/>
+        <p:cNvGrpSpPr/>
+        <p:nvPr/>
+      </p:nvGrpSpPr>
+      <p:grpSpPr>
+        <a:xfrm>
+          <a:off x="0" y="0"/>
+          <a:ext cx="0" cy="0"/>
+          <a:chOff x="0" y="0"/>
+          <a:chExt cx="0" cy="0"/>
+        </a:xfrm>
+      </p:grpSpPr>
+      <p:sp>
+        <p:nvSpPr>
+          <p:cNvPr id="510" name="Google Shape;510;p83"/>
+          <p:cNvSpPr txBox="1"/>
+          <p:nvPr>
+            <p:ph type="title"/>
+          </p:nvPr>
+        </p:nvSpPr>
+        <p:spPr>
+          <a:xfrm>
+            <a:off x="729450" y="1318650"/>
+            <a:ext cx="7688700" cy="535200"/>
+          </a:xfrm>
+          <a:prstGeom prst="rect">
+            <a:avLst/>
+          </a:prstGeom>
+        </p:spPr>
+        <p:txBody>
+          <a:bodyPr anchorCtr="0" anchor="t" bIns="91425" lIns="91425" spcFirstLastPara="1" rIns="91425" wrap="square" tIns="91425">
+            <a:noAutofit/>
+          </a:bodyPr>
+          <a:lstStyle/>
+          <a:p>
+            <a:pPr indent="0" lvl="0" marL="0" rtl="0" algn="l">
+              <a:lnSpc>
+                <a:spcPct val="115000"/>
+              </a:lnSpc>
+              <a:spcBef>
+                <a:spcPts val="1200"/>
+              </a:spcBef>
+              <a:spcAft>
+                <a:spcPts val="1200"/>
+              </a:spcAft>
+              <a:buNone/>
+            </a:pPr>
+            <a:r>
+              <a:rPr lang="pl" sz="2400">
+                <a:solidFill>
+                  <a:srgbClr val="000000"/>
+                </a:solidFill>
+                <a:latin typeface="Tahoma"/>
+                <a:ea typeface="Tahoma"/>
+                <a:cs typeface="Tahoma"/>
+                <a:sym typeface="Tahoma"/>
+              </a:rPr>
+              <a:t>Jak działa w praktyce:</a:t>
+            </a:r>
+            <a:endParaRPr sz="2400">
+              <a:latin typeface="Tahoma"/>
+              <a:ea typeface="Tahoma"/>
+              <a:cs typeface="Tahoma"/>
+              <a:sym typeface="Tahoma"/>
+            </a:endParaRPr>
+          </a:p>
+        </p:txBody>
+      </p:sp>
+      <p:sp>
+        <p:nvSpPr>
+          <p:cNvPr id="511" name="Google Shape;511;p83"/>
+          <p:cNvSpPr txBox="1"/>
+          <p:nvPr>
+            <p:ph idx="1" type="body"/>
+          </p:nvPr>
+        </p:nvSpPr>
+        <p:spPr>
+          <a:xfrm>
+            <a:off x="729450" y="2078875"/>
+            <a:ext cx="7688700" cy="2261100"/>
+          </a:xfrm>
+          <a:prstGeom prst="rect">
+            <a:avLst/>
+          </a:prstGeom>
+        </p:spPr>
+        <p:txBody>
+          <a:bodyPr anchorCtr="0" anchor="t" bIns="91425" lIns="91425" spcFirstLastPara="1" rIns="91425" wrap="square" tIns="91425">
+            <a:noAutofit/>
+          </a:bodyPr>
+          <a:lstStyle/>
+          <a:p>
+            <a:pPr indent="0" lvl="0" marL="0" rtl="0" algn="l">
+              <a:lnSpc>
+                <a:spcPct val="100000"/>
+              </a:lnSpc>
+              <a:spcBef>
+                <a:spcPts val="0"/>
+              </a:spcBef>
+              <a:spcAft>
+                <a:spcPts val="0"/>
+              </a:spcAft>
+              <a:buNone/>
+            </a:pPr>
+            <a:r>
+              <a:t/>
+            </a:r>
+            <a:endParaRPr b="1" sz="1400">
+              <a:solidFill>
+                <a:srgbClr val="000000"/>
+              </a:solidFill>
+              <a:latin typeface="Tahoma"/>
+              <a:ea typeface="Tahoma"/>
+              <a:cs typeface="Tahoma"/>
+              <a:sym typeface="Tahoma"/>
+            </a:endParaRPr>
+          </a:p>
+          <a:p>
+            <a:pPr indent="-317500" lvl="0" marL="457200" rtl="0" algn="l">
+              <a:lnSpc>
+                <a:spcPct val="100000"/>
+              </a:lnSpc>
+              <a:spcBef>
+                <a:spcPts val="0"/>
+              </a:spcBef>
+              <a:spcAft>
+                <a:spcPts val="0"/>
+              </a:spcAft>
+              <a:buClr>
+                <a:srgbClr val="000000"/>
+              </a:buClr>
+              <a:buSzPts val="1400"/>
+              <a:buFont typeface="Arial"/>
+              <a:buAutoNum type="arabicPeriod"/>
+            </a:pPr>
+            <a:r>
+              <a:rPr lang="pl" sz="1400">
+                <a:solidFill>
+                  <a:srgbClr val="000000"/>
+                </a:solidFill>
+                <a:latin typeface="Tahoma"/>
+                <a:ea typeface="Tahoma"/>
+                <a:cs typeface="Tahoma"/>
+                <a:sym typeface="Tahoma"/>
+              </a:rPr>
+              <a:t>Nadawca szyfruje wiadomość kluczem </a:t>
+            </a:r>
+            <a:r>
+              <a:rPr b="1" lang="pl" sz="1400">
+                <a:solidFill>
+                  <a:srgbClr val="000000"/>
+                </a:solidFill>
+                <a:latin typeface="Tahoma"/>
+                <a:ea typeface="Tahoma"/>
+                <a:cs typeface="Tahoma"/>
+                <a:sym typeface="Tahoma"/>
+              </a:rPr>
+              <a:t>publicznym odbiorcy</a:t>
+            </a:r>
+            <a:r>
+              <a:rPr lang="pl" sz="1400">
+                <a:solidFill>
+                  <a:srgbClr val="000000"/>
+                </a:solidFill>
+                <a:latin typeface="Tahoma"/>
+                <a:ea typeface="Tahoma"/>
+                <a:cs typeface="Tahoma"/>
+                <a:sym typeface="Tahoma"/>
+              </a:rPr>
+              <a:t>.</a:t>
+            </a:r>
+            <a:endParaRPr sz="1400">
+              <a:solidFill>
+                <a:srgbClr val="000000"/>
+              </a:solidFill>
+              <a:latin typeface="Tahoma"/>
+              <a:ea typeface="Tahoma"/>
+              <a:cs typeface="Tahoma"/>
+              <a:sym typeface="Tahoma"/>
+            </a:endParaRPr>
+          </a:p>
+          <a:p>
+            <a:pPr indent="-317500" lvl="0" marL="457200" rtl="0" algn="l">
+              <a:lnSpc>
+                <a:spcPct val="100000"/>
+              </a:lnSpc>
+              <a:spcBef>
+                <a:spcPts val="0"/>
+              </a:spcBef>
+              <a:spcAft>
+                <a:spcPts val="0"/>
+              </a:spcAft>
+              <a:buClr>
+                <a:srgbClr val="000000"/>
+              </a:buClr>
+              <a:buSzPts val="1400"/>
+              <a:buFont typeface="Tahoma"/>
+              <a:buAutoNum type="arabicPeriod"/>
+            </a:pPr>
+            <a:r>
+              <a:rPr lang="pl" sz="1400">
+                <a:solidFill>
+                  <a:srgbClr val="000000"/>
+                </a:solidFill>
+                <a:latin typeface="Tahoma"/>
+                <a:ea typeface="Tahoma"/>
+                <a:cs typeface="Tahoma"/>
+                <a:sym typeface="Tahoma"/>
+              </a:rPr>
+              <a:t>Wiadomość trafia w formie zaszyfrowanej.</a:t>
+            </a:r>
+            <a:endParaRPr sz="1400">
+              <a:solidFill>
+                <a:srgbClr val="000000"/>
+              </a:solidFill>
+              <a:latin typeface="Tahoma"/>
+              <a:ea typeface="Tahoma"/>
+              <a:cs typeface="Tahoma"/>
+              <a:sym typeface="Tahoma"/>
+            </a:endParaRPr>
+          </a:p>
+          <a:p>
+            <a:pPr indent="-317500" lvl="0" marL="457200" rtl="0" algn="l">
+              <a:lnSpc>
+                <a:spcPct val="100000"/>
+              </a:lnSpc>
+              <a:spcBef>
+                <a:spcPts val="0"/>
+              </a:spcBef>
+              <a:spcAft>
+                <a:spcPts val="0"/>
+              </a:spcAft>
+              <a:buClr>
+                <a:srgbClr val="000000"/>
+              </a:buClr>
+              <a:buSzPts val="1400"/>
+              <a:buFont typeface="Arial"/>
+              <a:buAutoNum type="arabicPeriod"/>
+            </a:pPr>
+            <a:r>
+              <a:rPr lang="pl" sz="1400">
+                <a:solidFill>
+                  <a:srgbClr val="000000"/>
+                </a:solidFill>
+                <a:latin typeface="Tahoma"/>
+                <a:ea typeface="Tahoma"/>
+                <a:cs typeface="Tahoma"/>
+                <a:sym typeface="Tahoma"/>
+              </a:rPr>
+              <a:t>Odbiorca używa swojego </a:t>
+            </a:r>
+            <a:r>
+              <a:rPr b="1" lang="pl" sz="1400">
+                <a:solidFill>
+                  <a:srgbClr val="000000"/>
+                </a:solidFill>
+                <a:latin typeface="Tahoma"/>
+                <a:ea typeface="Tahoma"/>
+                <a:cs typeface="Tahoma"/>
+                <a:sym typeface="Tahoma"/>
+              </a:rPr>
+              <a:t>klucza prywatnego</a:t>
+            </a:r>
+            <a:r>
+              <a:rPr lang="pl" sz="1400">
+                <a:solidFill>
+                  <a:srgbClr val="000000"/>
+                </a:solidFill>
+                <a:latin typeface="Tahoma"/>
+                <a:ea typeface="Tahoma"/>
+                <a:cs typeface="Tahoma"/>
+                <a:sym typeface="Tahoma"/>
+              </a:rPr>
+              <a:t>, aby odszyfrować wiadomość.</a:t>
+            </a:r>
+            <a:br>
+              <a:rPr lang="pl" sz="1400">
+                <a:solidFill>
+                  <a:srgbClr val="000000"/>
+                </a:solidFill>
+                <a:latin typeface="Tahoma"/>
+                <a:ea typeface="Tahoma"/>
+                <a:cs typeface="Tahoma"/>
+                <a:sym typeface="Tahoma"/>
+              </a:rPr>
+            </a:br>
+            <a:endParaRPr sz="1400">
+              <a:solidFill>
+                <a:srgbClr val="000000"/>
+              </a:solidFill>
+              <a:latin typeface="Tahoma"/>
+              <a:ea typeface="Tahoma"/>
+              <a:cs typeface="Tahoma"/>
+              <a:sym typeface="Tahoma"/>
+            </a:endParaRPr>
+          </a:p>
+          <a:p>
+            <a:pPr indent="0" lvl="0" marL="0" rtl="0" algn="l">
+              <a:lnSpc>
+                <a:spcPct val="100000"/>
+              </a:lnSpc>
+              <a:spcBef>
+                <a:spcPts val="0"/>
+              </a:spcBef>
+              <a:spcAft>
+                <a:spcPts val="0"/>
+              </a:spcAft>
+              <a:buNone/>
+            </a:pPr>
+            <a:r>
+              <a:rPr b="1" lang="pl" sz="1400">
+                <a:solidFill>
+                  <a:srgbClr val="000000"/>
+                </a:solidFill>
+                <a:latin typeface="Tahoma"/>
+                <a:ea typeface="Tahoma"/>
+                <a:cs typeface="Tahoma"/>
+                <a:sym typeface="Tahoma"/>
+              </a:rPr>
+              <a:t>Zalety:</a:t>
+            </a:r>
+            <a:endParaRPr b="1" sz="1400">
+              <a:solidFill>
+                <a:srgbClr val="000000"/>
+              </a:solidFill>
+              <a:latin typeface="Tahoma"/>
+              <a:ea typeface="Tahoma"/>
+              <a:cs typeface="Tahoma"/>
+              <a:sym typeface="Tahoma"/>
+            </a:endParaRPr>
+          </a:p>
+          <a:p>
+            <a:pPr indent="-317500" lvl="0" marL="457200" rtl="0" algn="l">
+              <a:lnSpc>
+                <a:spcPct val="100000"/>
+              </a:lnSpc>
+              <a:spcBef>
+                <a:spcPts val="0"/>
+              </a:spcBef>
+              <a:spcAft>
+                <a:spcPts val="0"/>
+              </a:spcAft>
+              <a:buClr>
+                <a:srgbClr val="000000"/>
+              </a:buClr>
+              <a:buSzPts val="1400"/>
+              <a:buFont typeface="Tahoma"/>
+              <a:buChar char="●"/>
+            </a:pPr>
+            <a:r>
+              <a:rPr lang="pl" sz="1400">
+                <a:solidFill>
+                  <a:srgbClr val="000000"/>
+                </a:solidFill>
+                <a:latin typeface="Tahoma"/>
+                <a:ea typeface="Tahoma"/>
+                <a:cs typeface="Tahoma"/>
+                <a:sym typeface="Tahoma"/>
+              </a:rPr>
+              <a:t>Bezpieczne przesyłanie wiadomości, nawet jeśli klucz publiczny jest znany wszystkim.</a:t>
+            </a:r>
+            <a:br>
+              <a:rPr lang="pl" sz="1400">
+                <a:solidFill>
+                  <a:srgbClr val="000000"/>
+                </a:solidFill>
+                <a:latin typeface="Tahoma"/>
+                <a:ea typeface="Tahoma"/>
+                <a:cs typeface="Tahoma"/>
+                <a:sym typeface="Tahoma"/>
+              </a:rPr>
+            </a:br>
+            <a:endParaRPr sz="1400">
+              <a:solidFill>
+                <a:srgbClr val="000000"/>
+              </a:solidFill>
+              <a:latin typeface="Tahoma"/>
+              <a:ea typeface="Tahoma"/>
+              <a:cs typeface="Tahoma"/>
+              <a:sym typeface="Tahoma"/>
+            </a:endParaRPr>
+          </a:p>
+          <a:p>
+            <a:pPr indent="-317500" lvl="0" marL="457200" rtl="0" algn="l">
+              <a:lnSpc>
+                <a:spcPct val="100000"/>
+              </a:lnSpc>
+              <a:spcBef>
+                <a:spcPts val="0"/>
+              </a:spcBef>
+              <a:spcAft>
+                <a:spcPts val="0"/>
+              </a:spcAft>
+              <a:buClr>
+                <a:srgbClr val="000000"/>
+              </a:buClr>
+              <a:buSzPts val="1400"/>
+              <a:buFont typeface="Tahoma"/>
+              <a:buChar char="●"/>
+            </a:pPr>
+            <a:r>
+              <a:rPr lang="pl" sz="1400">
+                <a:solidFill>
+                  <a:srgbClr val="000000"/>
+                </a:solidFill>
+                <a:latin typeface="Tahoma"/>
+                <a:ea typeface="Tahoma"/>
+                <a:cs typeface="Tahoma"/>
+                <a:sym typeface="Tahoma"/>
+              </a:rPr>
+              <a:t>Idealne dla komunikacji w Internecie (np. E2EE).</a:t>
+            </a:r>
+            <a:br>
+              <a:rPr lang="pl" sz="1400">
+                <a:solidFill>
+                  <a:srgbClr val="000000"/>
+                </a:solidFill>
+                <a:latin typeface="Tahoma"/>
+                <a:ea typeface="Tahoma"/>
+                <a:cs typeface="Tahoma"/>
+                <a:sym typeface="Tahoma"/>
+              </a:rPr>
+            </a:br>
+            <a:endParaRPr sz="1400">
+              <a:solidFill>
+                <a:srgbClr val="000000"/>
+              </a:solidFill>
+              <a:latin typeface="Tahoma"/>
+              <a:ea typeface="Tahoma"/>
+              <a:cs typeface="Tahoma"/>
+              <a:sym typeface="Tahoma"/>
+            </a:endParaRPr>
+          </a:p>
+          <a:p>
+            <a:pPr indent="0" lvl="0" marL="0" rtl="0" algn="l">
+              <a:lnSpc>
+                <a:spcPct val="100000"/>
+              </a:lnSpc>
+              <a:spcBef>
+                <a:spcPts val="0"/>
+              </a:spcBef>
+              <a:spcAft>
+                <a:spcPts val="0"/>
+              </a:spcAft>
+              <a:buNone/>
+            </a:pPr>
+            <a:r>
+              <a:rPr b="1" lang="pl" sz="1400">
+                <a:solidFill>
+                  <a:srgbClr val="000000"/>
+                </a:solidFill>
+                <a:latin typeface="Tahoma"/>
+                <a:ea typeface="Tahoma"/>
+                <a:cs typeface="Tahoma"/>
+                <a:sym typeface="Tahoma"/>
+              </a:rPr>
+              <a:t>Wady:</a:t>
+            </a:r>
+            <a:endParaRPr b="1" sz="1400">
+              <a:solidFill>
+                <a:srgbClr val="000000"/>
+              </a:solidFill>
+              <a:latin typeface="Tahoma"/>
+              <a:ea typeface="Tahoma"/>
+              <a:cs typeface="Tahoma"/>
+              <a:sym typeface="Tahoma"/>
+            </a:endParaRPr>
+          </a:p>
+          <a:p>
+            <a:pPr indent="-317500" lvl="0" marL="457200" rtl="0" algn="l">
+              <a:lnSpc>
+                <a:spcPct val="100000"/>
+              </a:lnSpc>
+              <a:spcBef>
+                <a:spcPts val="0"/>
+              </a:spcBef>
+              <a:spcAft>
+                <a:spcPts val="0"/>
+              </a:spcAft>
+              <a:buClr>
+                <a:srgbClr val="000000"/>
+              </a:buClr>
+              <a:buSzPts val="1400"/>
+              <a:buFont typeface="Tahoma"/>
+              <a:buChar char="●"/>
+            </a:pPr>
+            <a:r>
+              <a:rPr lang="pl" sz="1400">
+                <a:solidFill>
+                  <a:srgbClr val="000000"/>
+                </a:solidFill>
+                <a:latin typeface="Tahoma"/>
+                <a:ea typeface="Tahoma"/>
+                <a:cs typeface="Tahoma"/>
+                <a:sym typeface="Tahoma"/>
+              </a:rPr>
+              <a:t>Wolniejsze niż szyfrowanie symetryczne, szczególnie dla dużych plików.</a:t>
+            </a:r>
+            <a:endParaRPr sz="1400">
+              <a:solidFill>
+                <a:srgbClr val="000000"/>
+              </a:solidFill>
+              <a:latin typeface="Tahoma"/>
+              <a:ea typeface="Tahoma"/>
+              <a:cs typeface="Tahoma"/>
+              <a:sym typeface="Tahoma"/>
+            </a:endParaRPr>
+          </a:p>
+          <a:p>
+            <a:pPr indent="0" lvl="0" marL="0" rtl="0" algn="l">
+              <a:lnSpc>
+                <a:spcPct val="100000"/>
+              </a:lnSpc>
+              <a:spcBef>
+                <a:spcPts val="0"/>
+              </a:spcBef>
+              <a:spcAft>
+                <a:spcPts val="0"/>
+              </a:spcAft>
+              <a:buNone/>
+            </a:pPr>
+            <a:r>
+              <a:t/>
+            </a:r>
+            <a:endParaRPr sz="1400">
+              <a:latin typeface="Tahoma"/>
+              <a:ea typeface="Tahoma"/>
+              <a:cs typeface="Tahoma"/>
+              <a:sym typeface="Tahoma"/>
             </a:endParaRPr>
           </a:p>
         </p:txBody>

</xml_diff>